<commit_message>
modified:   Ken_ DC LiveLab Instructor Interview.pptx
</commit_message>
<xml_diff>
--- a/Ken_ DC LiveLab Instructor Interview.pptx
+++ b/Ken_ DC LiveLab Instructor Interview.pptx
@@ -5,7 +5,7 @@
     <p:sldMasterId id="2147483659" r:id="rId1"/>
   </p:sldMasterIdLst>
   <p:notesMasterIdLst>
-    <p:notesMasterId r:id="rId9"/>
+    <p:notesMasterId r:id="rId10"/>
   </p:notesMasterIdLst>
   <p:sldIdLst>
     <p:sldId id="256" r:id="rId2"/>
@@ -13,49 +13,50 @@
     <p:sldId id="258" r:id="rId4"/>
     <p:sldId id="259" r:id="rId5"/>
     <p:sldId id="260" r:id="rId6"/>
-    <p:sldId id="262" r:id="rId7"/>
-    <p:sldId id="261" r:id="rId8"/>
+    <p:sldId id="261" r:id="rId7"/>
+    <p:sldId id="262" r:id="rId8"/>
+    <p:sldId id="263" r:id="rId9"/>
   </p:sldIdLst>
   <p:sldSz cx="9144000" cy="5143500" type="screen16x9"/>
   <p:notesSz cx="6858000" cy="9144000"/>
   <p:embeddedFontLst>
     <p:embeddedFont>
       <p:font typeface="Inconsolata Medium" panose="020F0502020204030204" pitchFamily="34" charset="0"/>
-      <p:regular r:id="rId10"/>
-      <p:bold r:id="rId11"/>
+      <p:regular r:id="rId11"/>
+      <p:bold r:id="rId12"/>
     </p:embeddedFont>
     <p:embeddedFont>
       <p:font typeface="Plus Jakarta Sans" pitchFamily="2" charset="77"/>
-      <p:regular r:id="rId12"/>
-      <p:bold r:id="rId13"/>
-      <p:italic r:id="rId14"/>
-      <p:boldItalic r:id="rId15"/>
+      <p:regular r:id="rId13"/>
+      <p:bold r:id="rId14"/>
+      <p:italic r:id="rId15"/>
+      <p:boldItalic r:id="rId16"/>
     </p:embeddedFont>
     <p:embeddedFont>
       <p:font typeface="Plus Jakarta Sans ExtraBold" pitchFamily="2" charset="77"/>
-      <p:bold r:id="rId16"/>
-      <p:italic r:id="rId17"/>
-      <p:boldItalic r:id="rId18"/>
+      <p:bold r:id="rId17"/>
+      <p:italic r:id="rId18"/>
+      <p:boldItalic r:id="rId19"/>
     </p:embeddedFont>
     <p:embeddedFont>
       <p:font typeface="Plus Jakarta Sans Medium" pitchFamily="2" charset="77"/>
-      <p:regular r:id="rId19"/>
-      <p:bold r:id="rId20"/>
-      <p:italic r:id="rId21"/>
-      <p:boldItalic r:id="rId22"/>
+      <p:regular r:id="rId20"/>
+      <p:bold r:id="rId21"/>
+      <p:italic r:id="rId22"/>
+      <p:boldItalic r:id="rId23"/>
     </p:embeddedFont>
     <p:embeddedFont>
       <p:font typeface="Poppins" pitchFamily="2" charset="77"/>
-      <p:regular r:id="rId23"/>
-      <p:bold r:id="rId24"/>
-      <p:italic r:id="rId25"/>
-      <p:boldItalic r:id="rId26"/>
+      <p:regular r:id="rId24"/>
+      <p:bold r:id="rId25"/>
+      <p:italic r:id="rId26"/>
+      <p:boldItalic r:id="rId27"/>
     </p:embeddedFont>
     <p:embeddedFont>
       <p:font typeface="Poppins ExtraBold" panose="020B0604020202020204" pitchFamily="34" charset="0"/>
-      <p:bold r:id="rId27"/>
-      <p:italic r:id="rId28"/>
-      <p:boldItalic r:id="rId29"/>
+      <p:bold r:id="rId28"/>
+      <p:italic r:id="rId29"/>
+      <p:boldItalic r:id="rId30"/>
     </p:embeddedFont>
   </p:embeddedFontLst>
   <p:defaultTextStyle>
@@ -2220,6 +2221,230 @@
   <p:cSld>
     <p:spTree>
       <p:nvGrpSpPr>
+        <p:cNvPr id="1" name="Shape 93"/>
+        <p:cNvGrpSpPr/>
+        <p:nvPr/>
+      </p:nvGrpSpPr>
+      <p:grpSpPr>
+        <a:xfrm>
+          <a:off x="0" y="0"/>
+          <a:ext cx="0" cy="0"/>
+          <a:chOff x="0" y="0"/>
+          <a:chExt cx="0" cy="0"/>
+        </a:xfrm>
+      </p:grpSpPr>
+      <p:sp>
+        <p:nvSpPr>
+          <p:cNvPr id="94" name="Google Shape;94;g24cca0ebfde_0_218:notes"/>
+          <p:cNvSpPr>
+            <a:spLocks noGrp="1" noRot="1" noChangeAspect="1"/>
+          </p:cNvSpPr>
+          <p:nvPr>
+            <p:ph type="sldImg" idx="2"/>
+          </p:nvPr>
+        </p:nvSpPr>
+        <p:spPr>
+          <a:xfrm>
+            <a:off x="381000" y="685800"/>
+            <a:ext cx="6096000" cy="3429000"/>
+          </a:xfrm>
+          <a:custGeom>
+            <a:avLst/>
+            <a:gdLst/>
+            <a:ahLst/>
+            <a:cxnLst/>
+            <a:rect l="l" t="t" r="r" b="b"/>
+            <a:pathLst>
+              <a:path w="120000" h="120000" extrusionOk="0">
+                <a:moveTo>
+                  <a:pt x="0" y="0"/>
+                </a:moveTo>
+                <a:lnTo>
+                  <a:pt x="120000" y="0"/>
+                </a:lnTo>
+                <a:lnTo>
+                  <a:pt x="120000" y="120000"/>
+                </a:lnTo>
+                <a:lnTo>
+                  <a:pt x="0" y="120000"/>
+                </a:lnTo>
+                <a:close/>
+              </a:path>
+            </a:pathLst>
+          </a:custGeom>
+        </p:spPr>
+      </p:sp>
+      <p:sp>
+        <p:nvSpPr>
+          <p:cNvPr id="95" name="Google Shape;95;g24cca0ebfde_0_218:notes"/>
+          <p:cNvSpPr txBox="1">
+            <a:spLocks noGrp="1"/>
+          </p:cNvSpPr>
+          <p:nvPr>
+            <p:ph type="body" idx="1"/>
+          </p:nvPr>
+        </p:nvSpPr>
+        <p:spPr>
+          <a:xfrm>
+            <a:off x="685800" y="4343400"/>
+            <a:ext cx="5486400" cy="4114800"/>
+          </a:xfrm>
+          <a:prstGeom prst="rect">
+            <a:avLst/>
+          </a:prstGeom>
+        </p:spPr>
+        <p:txBody>
+          <a:bodyPr spcFirstLastPara="1" wrap="square" lIns="91425" tIns="91425" rIns="91425" bIns="91425" anchor="t" anchorCtr="0">
+            <a:noAutofit/>
+          </a:bodyPr>
+          <a:lstStyle/>
+          <a:p>
+            <a:pPr marL="0" lvl="0" indent="0" algn="l" rtl="0">
+              <a:spcBef>
+                <a:spcPts val="0"/>
+              </a:spcBef>
+              <a:spcAft>
+                <a:spcPts val="0"/>
+              </a:spcAft>
+              <a:buNone/>
+            </a:pPr>
+            <a:r>
+              <a:rPr lang="en">
+                <a:solidFill>
+                  <a:schemeClr val="dk1"/>
+                </a:solidFill>
+              </a:rPr>
+              <a:t>Present goal of LiveLab to students: t</a:t>
+            </a:r>
+            <a:r>
+              <a:rPr lang="en"/>
+              <a:t>he Headspace marketing team is super interested in gaining insights on the conversion rates of organic acquisitions compared to paid acquisitions in terms of becoming paid subscribers. </a:t>
+            </a:r>
+            <a:endParaRPr/>
+          </a:p>
+          <a:p>
+            <a:pPr marL="0" lvl="0" indent="0" algn="l" rtl="0">
+              <a:spcBef>
+                <a:spcPts val="0"/>
+              </a:spcBef>
+              <a:spcAft>
+                <a:spcPts val="0"/>
+              </a:spcAft>
+              <a:buNone/>
+            </a:pPr>
+            <a:endParaRPr/>
+          </a:p>
+          <a:p>
+            <a:pPr marL="0" lvl="0" indent="0" algn="l" rtl="0">
+              <a:spcBef>
+                <a:spcPts val="0"/>
+              </a:spcBef>
+              <a:spcAft>
+                <a:spcPts val="0"/>
+              </a:spcAft>
+              <a:buNone/>
+            </a:pPr>
+            <a:r>
+              <a:rPr lang="en"/>
+              <a:t>They believe a better understanding of this will provide valuable insights for future marketing strategies. </a:t>
+            </a:r>
+            <a:endParaRPr/>
+          </a:p>
+          <a:p>
+            <a:pPr marL="0" lvl="0" indent="0" algn="l" rtl="0">
+              <a:spcBef>
+                <a:spcPts val="0"/>
+              </a:spcBef>
+              <a:spcAft>
+                <a:spcPts val="0"/>
+              </a:spcAft>
+              <a:buNone/>
+            </a:pPr>
+            <a:endParaRPr/>
+          </a:p>
+          <a:p>
+            <a:pPr marL="0" lvl="0" indent="0" algn="l" rtl="0">
+              <a:spcBef>
+                <a:spcPts val="0"/>
+              </a:spcBef>
+              <a:spcAft>
+                <a:spcPts val="0"/>
+              </a:spcAft>
+              <a:buNone/>
+            </a:pPr>
+            <a:r>
+              <a:rPr lang="en" b="1"/>
+              <a:t>Note to candidate: </a:t>
+            </a:r>
+            <a:r>
+              <a:rPr lang="en"/>
+              <a:t>Transition here to the .ipynb file, walk through the remainder of the LiveLab! We’ve given you a file with solutions in it, but in your sample teach, those solutions should not be there. You’ll arrive at the solutions </a:t>
+            </a:r>
+            <a:r>
+              <a:rPr lang="en" i="1"/>
+              <a:t>with your students.</a:t>
+            </a:r>
+            <a:r>
+              <a:rPr lang="en"/>
+              <a:t> Keep this scenario top of mind. Students </a:t>
+            </a:r>
+            <a:r>
+              <a:rPr lang="en" b="1"/>
+              <a:t>always</a:t>
+            </a:r>
+            <a:r>
+              <a:rPr lang="en"/>
+              <a:t> like to know </a:t>
+            </a:r>
+            <a:r>
+              <a:rPr lang="en" i="1"/>
+              <a:t>why</a:t>
+            </a:r>
+            <a:r>
+              <a:rPr lang="en"/>
+              <a:t> they are doing something. And </a:t>
+            </a:r>
+            <a:r>
+              <a:rPr lang="en">
+                <a:solidFill>
+                  <a:schemeClr val="dk1"/>
+                </a:solidFill>
+              </a:rPr>
+              <a:t> remember: LiveLab is </a:t>
+            </a:r>
+            <a:r>
+              <a:rPr lang="en" b="1">
+                <a:solidFill>
+                  <a:schemeClr val="dk1"/>
+                </a:solidFill>
+              </a:rPr>
+              <a:t>not</a:t>
+            </a:r>
+            <a:r>
+              <a:rPr lang="en">
+                <a:solidFill>
+                  <a:schemeClr val="dk1"/>
+                </a:solidFill>
+              </a:rPr>
+              <a:t> where students are learning content for the first time, it’s where they’re applying what they’re learning in parallel. </a:t>
+            </a:r>
+            <a:endParaRPr/>
+          </a:p>
+        </p:txBody>
+      </p:sp>
+    </p:spTree>
+  </p:cSld>
+  <p:clrMapOvr>
+    <a:masterClrMapping/>
+  </p:clrMapOvr>
+</p:notes>
+</file>
+
+<file path=ppt/notesSlides/notesSlide7.xml><?xml version="1.0" encoding="utf-8"?>
+<p:notes xmlns:a="http://schemas.openxmlformats.org/drawingml/2006/main" xmlns:r="http://schemas.openxmlformats.org/officeDocument/2006/relationships" xmlns:p="http://schemas.openxmlformats.org/presentationml/2006/main" showMasterSp="0" showMasterPhAnim="0">
+  <p:cSld>
+    <p:spTree>
+      <p:nvGrpSpPr>
         <p:cNvPr id="1" name="Shape 83">
           <a:extLst>
             <a:ext uri="{FF2B5EF4-FFF2-40B4-BE49-F238E27FC236}">
@@ -2933,12 +3158,18 @@
 </p:notes>
 </file>
 
-<file path=ppt/notesSlides/notesSlide7.xml><?xml version="1.0" encoding="utf-8"?>
+<file path=ppt/notesSlides/notesSlide8.xml><?xml version="1.0" encoding="utf-8"?>
 <p:notes xmlns:a="http://schemas.openxmlformats.org/drawingml/2006/main" xmlns:r="http://schemas.openxmlformats.org/officeDocument/2006/relationships" xmlns:p="http://schemas.openxmlformats.org/presentationml/2006/main" showMasterSp="0" showMasterPhAnim="0">
   <p:cSld>
     <p:spTree>
       <p:nvGrpSpPr>
-        <p:cNvPr id="1" name="Shape 93"/>
+        <p:cNvPr id="1" name="Shape 93">
+          <a:extLst>
+            <a:ext uri="{FF2B5EF4-FFF2-40B4-BE49-F238E27FC236}">
+              <a16:creationId xmlns:a16="http://schemas.microsoft.com/office/drawing/2014/main" id="{8DA1123D-797C-49D1-E811-D6E17BE18E11}"/>
+            </a:ext>
+          </a:extLst>
+        </p:cNvPr>
         <p:cNvGrpSpPr/>
         <p:nvPr/>
       </p:nvGrpSpPr>
@@ -2952,7 +3183,13 @@
       </p:grpSpPr>
       <p:sp>
         <p:nvSpPr>
-          <p:cNvPr id="94" name="Google Shape;94;g24cca0ebfde_0_218:notes"/>
+          <p:cNvPr id="94" name="Google Shape;94;g24cca0ebfde_0_218:notes">
+            <a:extLst>
+              <a:ext uri="{FF2B5EF4-FFF2-40B4-BE49-F238E27FC236}">
+                <a16:creationId xmlns:a16="http://schemas.microsoft.com/office/drawing/2014/main" id="{F128EE63-F996-9D1A-0E23-BA235673FA40}"/>
+              </a:ext>
+            </a:extLst>
+          </p:cNvPr>
           <p:cNvSpPr>
             <a:spLocks noGrp="1" noRot="1" noChangeAspect="1"/>
           </p:cNvSpPr>
@@ -2962,7 +3199,7 @@
         </p:nvSpPr>
         <p:spPr>
           <a:xfrm>
-            <a:off x="381300" y="685800"/>
+            <a:off x="381000" y="685800"/>
             <a:ext cx="6096000" cy="3429000"/>
           </a:xfrm>
           <a:custGeom>
@@ -2993,7 +3230,13 @@
       </p:sp>
       <p:sp>
         <p:nvSpPr>
-          <p:cNvPr id="95" name="Google Shape;95;g24cca0ebfde_0_218:notes"/>
+          <p:cNvPr id="95" name="Google Shape;95;g24cca0ebfde_0_218:notes">
+            <a:extLst>
+              <a:ext uri="{FF2B5EF4-FFF2-40B4-BE49-F238E27FC236}">
+                <a16:creationId xmlns:a16="http://schemas.microsoft.com/office/drawing/2014/main" id="{47B63B01-D392-B19A-D5E7-6B5FB702AA78}"/>
+              </a:ext>
+            </a:extLst>
+          </p:cNvPr>
           <p:cNvSpPr txBox="1">
             <a:spLocks noGrp="1"/>
           </p:cNvSpPr>
@@ -3150,6 +3393,11 @@
         </p:txBody>
       </p:sp>
     </p:spTree>
+    <p:extLst>
+      <p:ext uri="{BB962C8B-B14F-4D97-AF65-F5344CB8AC3E}">
+        <p14:creationId xmlns:p14="http://schemas.microsoft.com/office/powerpoint/2010/main" val="130657084"/>
+      </p:ext>
+    </p:extLst>
   </p:cSld>
   <p:clrMapOvr>
     <a:masterClrMapping/>
@@ -9615,7 +9863,7 @@
               <a:buNone/>
             </a:pPr>
             <a:r>
-              <a:rPr lang="en" sz="1600" b="1" i="0" u="none" strike="noStrike" cap="none">
+              <a:rPr lang="en" sz="1600" b="1" i="0" u="none" strike="noStrike" cap="none" dirty="0">
                 <a:solidFill>
                   <a:srgbClr val="C3E8F3"/>
                 </a:solidFill>
@@ -9627,7 +9875,7 @@
               <a:t>Paid </a:t>
             </a:r>
             <a:r>
-              <a:rPr lang="en" sz="1600" b="1">
+              <a:rPr lang="en" sz="1600" b="1" dirty="0">
                 <a:solidFill>
                   <a:srgbClr val="C3E8F3"/>
                 </a:solidFill>
@@ -9639,7 +9887,7 @@
               <a:t>Acquisition</a:t>
             </a:r>
             <a:r>
-              <a:rPr lang="en" sz="1600">
+              <a:rPr lang="en" sz="1600" dirty="0">
                 <a:solidFill>
                   <a:srgbClr val="C3E8F3"/>
                 </a:solidFill>
@@ -9650,7 +9898,7 @@
               </a:rPr>
               <a:t>:</a:t>
             </a:r>
-            <a:endParaRPr sz="1600">
+            <a:endParaRPr sz="1600" dirty="0">
               <a:solidFill>
                 <a:schemeClr val="lt1"/>
               </a:solidFill>
@@ -9679,7 +9927,7 @@
               <a:buNone/>
             </a:pPr>
             <a:r>
-              <a:rPr lang="en" sz="1600">
+              <a:rPr lang="en" sz="1600" dirty="0">
                 <a:solidFill>
                   <a:schemeClr val="lt1"/>
                 </a:solidFill>
@@ -9690,7 +9938,7 @@
               </a:rPr>
               <a:t>Acquire new customers by paying to acquire them</a:t>
             </a:r>
-            <a:endParaRPr sz="1600">
+            <a:endParaRPr sz="1600" dirty="0">
               <a:solidFill>
                 <a:schemeClr val="lt1"/>
               </a:solidFill>
@@ -9698,6 +9946,710 @@
               <a:ea typeface="Plus Jakarta Sans"/>
               <a:cs typeface="Plus Jakarta Sans"/>
               <a:sym typeface="Plus Jakarta Sans"/>
+            </a:endParaRPr>
+          </a:p>
+        </p:txBody>
+      </p:sp>
+    </p:spTree>
+  </p:cSld>
+  <p:clrMapOvr>
+    <a:masterClrMapping/>
+  </p:clrMapOvr>
+  <p:timing>
+    <p:tnLst>
+      <p:par>
+        <p:cTn id="1" dur="indefinite" restart="never" nodeType="tmRoot">
+          <p:childTnLst>
+            <p:seq concurrent="1" nextAc="seek">
+              <p:cTn id="2" dur="indefinite" nodeType="mainSeq">
+                <p:childTnLst>
+                  <p:par>
+                    <p:cTn id="3" fill="hold">
+                      <p:stCondLst>
+                        <p:cond delay="indefinite"/>
+                      </p:stCondLst>
+                      <p:childTnLst>
+                        <p:par>
+                          <p:cTn id="4" fill="hold">
+                            <p:stCondLst>
+                              <p:cond delay="0"/>
+                            </p:stCondLst>
+                            <p:childTnLst>
+                              <p:par>
+                                <p:cTn id="5" presetID="9" presetClass="entr" presetSubtype="0" fill="hold" grpId="0" nodeType="clickEffect">
+                                  <p:stCondLst>
+                                    <p:cond delay="0"/>
+                                  </p:stCondLst>
+                                  <p:childTnLst>
+                                    <p:set>
+                                      <p:cBhvr>
+                                        <p:cTn id="6" dur="1" fill="hold">
+                                          <p:stCondLst>
+                                            <p:cond delay="0"/>
+                                          </p:stCondLst>
+                                        </p:cTn>
+                                        <p:tgtEl>
+                                          <p:spTgt spid="89"/>
+                                        </p:tgtEl>
+                                        <p:attrNameLst>
+                                          <p:attrName>style.visibility</p:attrName>
+                                        </p:attrNameLst>
+                                      </p:cBhvr>
+                                      <p:to>
+                                        <p:strVal val="visible"/>
+                                      </p:to>
+                                    </p:set>
+                                    <p:animEffect transition="in" filter="dissolve">
+                                      <p:cBhvr>
+                                        <p:cTn id="7" dur="500"/>
+                                        <p:tgtEl>
+                                          <p:spTgt spid="89"/>
+                                        </p:tgtEl>
+                                      </p:cBhvr>
+                                    </p:animEffect>
+                                  </p:childTnLst>
+                                </p:cTn>
+                              </p:par>
+                              <p:par>
+                                <p:cTn id="8" presetID="9" presetClass="entr" presetSubtype="0" fill="hold" grpId="0" nodeType="withEffect">
+                                  <p:stCondLst>
+                                    <p:cond delay="0"/>
+                                  </p:stCondLst>
+                                  <p:childTnLst>
+                                    <p:set>
+                                      <p:cBhvr>
+                                        <p:cTn id="9" dur="1" fill="hold">
+                                          <p:stCondLst>
+                                            <p:cond delay="0"/>
+                                          </p:stCondLst>
+                                        </p:cTn>
+                                        <p:tgtEl>
+                                          <p:spTgt spid="91"/>
+                                        </p:tgtEl>
+                                        <p:attrNameLst>
+                                          <p:attrName>style.visibility</p:attrName>
+                                        </p:attrNameLst>
+                                      </p:cBhvr>
+                                      <p:to>
+                                        <p:strVal val="visible"/>
+                                      </p:to>
+                                    </p:set>
+                                    <p:animEffect transition="in" filter="dissolve">
+                                      <p:cBhvr>
+                                        <p:cTn id="10" dur="500"/>
+                                        <p:tgtEl>
+                                          <p:spTgt spid="91"/>
+                                        </p:tgtEl>
+                                      </p:cBhvr>
+                                    </p:animEffect>
+                                  </p:childTnLst>
+                                </p:cTn>
+                              </p:par>
+                            </p:childTnLst>
+                          </p:cTn>
+                        </p:par>
+                      </p:childTnLst>
+                    </p:cTn>
+                  </p:par>
+                  <p:par>
+                    <p:cTn id="11" fill="hold">
+                      <p:stCondLst>
+                        <p:cond delay="indefinite"/>
+                      </p:stCondLst>
+                      <p:childTnLst>
+                        <p:par>
+                          <p:cTn id="12" fill="hold">
+                            <p:stCondLst>
+                              <p:cond delay="0"/>
+                            </p:stCondLst>
+                            <p:childTnLst>
+                              <p:par>
+                                <p:cTn id="13" presetID="9" presetClass="entr" presetSubtype="0" fill="hold" grpId="0" nodeType="clickEffect">
+                                  <p:stCondLst>
+                                    <p:cond delay="0"/>
+                                  </p:stCondLst>
+                                  <p:childTnLst>
+                                    <p:set>
+                                      <p:cBhvr>
+                                        <p:cTn id="14" dur="1" fill="hold">
+                                          <p:stCondLst>
+                                            <p:cond delay="0"/>
+                                          </p:stCondLst>
+                                        </p:cTn>
+                                        <p:tgtEl>
+                                          <p:spTgt spid="92"/>
+                                        </p:tgtEl>
+                                        <p:attrNameLst>
+                                          <p:attrName>style.visibility</p:attrName>
+                                        </p:attrNameLst>
+                                      </p:cBhvr>
+                                      <p:to>
+                                        <p:strVal val="visible"/>
+                                      </p:to>
+                                    </p:set>
+                                    <p:animEffect transition="in" filter="dissolve">
+                                      <p:cBhvr>
+                                        <p:cTn id="15" dur="500"/>
+                                        <p:tgtEl>
+                                          <p:spTgt spid="92"/>
+                                        </p:tgtEl>
+                                      </p:cBhvr>
+                                    </p:animEffect>
+                                  </p:childTnLst>
+                                </p:cTn>
+                              </p:par>
+                              <p:par>
+                                <p:cTn id="16" presetID="9" presetClass="entr" presetSubtype="0" fill="hold" grpId="0" nodeType="withEffect">
+                                  <p:stCondLst>
+                                    <p:cond delay="0"/>
+                                  </p:stCondLst>
+                                  <p:childTnLst>
+                                    <p:set>
+                                      <p:cBhvr>
+                                        <p:cTn id="17" dur="1" fill="hold">
+                                          <p:stCondLst>
+                                            <p:cond delay="0"/>
+                                          </p:stCondLst>
+                                        </p:cTn>
+                                        <p:tgtEl>
+                                          <p:spTgt spid="90"/>
+                                        </p:tgtEl>
+                                        <p:attrNameLst>
+                                          <p:attrName>style.visibility</p:attrName>
+                                        </p:attrNameLst>
+                                      </p:cBhvr>
+                                      <p:to>
+                                        <p:strVal val="visible"/>
+                                      </p:to>
+                                    </p:set>
+                                    <p:animEffect transition="in" filter="dissolve">
+                                      <p:cBhvr>
+                                        <p:cTn id="18" dur="500"/>
+                                        <p:tgtEl>
+                                          <p:spTgt spid="90"/>
+                                        </p:tgtEl>
+                                      </p:cBhvr>
+                                    </p:animEffect>
+                                  </p:childTnLst>
+                                </p:cTn>
+                              </p:par>
+                            </p:childTnLst>
+                          </p:cTn>
+                        </p:par>
+                      </p:childTnLst>
+                    </p:cTn>
+                  </p:par>
+                </p:childTnLst>
+              </p:cTn>
+              <p:prevCondLst>
+                <p:cond evt="onPrev" delay="0">
+                  <p:tgtEl>
+                    <p:sldTgt/>
+                  </p:tgtEl>
+                </p:cond>
+              </p:prevCondLst>
+              <p:nextCondLst>
+                <p:cond evt="onNext" delay="0">
+                  <p:tgtEl>
+                    <p:sldTgt/>
+                  </p:tgtEl>
+                </p:cond>
+              </p:nextCondLst>
+            </p:seq>
+          </p:childTnLst>
+        </p:cTn>
+      </p:par>
+    </p:tnLst>
+    <p:bldLst>
+      <p:bldP spid="89" grpId="0" animBg="1"/>
+      <p:bldP spid="90" grpId="0" animBg="1"/>
+      <p:bldP spid="91" grpId="0"/>
+      <p:bldP spid="92" grpId="0"/>
+    </p:bldLst>
+  </p:timing>
+</p:sld>
+</file>
+
+<file path=ppt/slides/slide6.xml><?xml version="1.0" encoding="utf-8"?>
+<p:sld xmlns:a="http://schemas.openxmlformats.org/drawingml/2006/main" xmlns:r="http://schemas.openxmlformats.org/officeDocument/2006/relationships" xmlns:p="http://schemas.openxmlformats.org/presentationml/2006/main">
+  <p:cSld>
+    <p:bg>
+      <p:bgPr>
+        <a:solidFill>
+          <a:schemeClr val="dk1"/>
+        </a:solidFill>
+        <a:effectLst/>
+      </p:bgPr>
+    </p:bg>
+    <p:spTree>
+      <p:nvGrpSpPr>
+        <p:cNvPr id="1" name="Shape 96"/>
+        <p:cNvGrpSpPr/>
+        <p:nvPr/>
+      </p:nvGrpSpPr>
+      <p:grpSpPr>
+        <a:xfrm>
+          <a:off x="0" y="0"/>
+          <a:ext cx="0" cy="0"/>
+          <a:chOff x="0" y="0"/>
+          <a:chExt cx="0" cy="0"/>
+        </a:xfrm>
+      </p:grpSpPr>
+      <p:pic>
+        <p:nvPicPr>
+          <p:cNvPr id="97" name="Google Shape;97;p18"/>
+          <p:cNvPicPr preferRelativeResize="0"/>
+          <p:nvPr/>
+        </p:nvPicPr>
+        <p:blipFill rotWithShape="1">
+          <a:blip r:embed="rId3">
+            <a:alphaModFix/>
+          </a:blip>
+          <a:srcRect/>
+          <a:stretch/>
+        </p:blipFill>
+        <p:spPr>
+          <a:xfrm rot="-7200012">
+            <a:off x="-239314" y="3069734"/>
+            <a:ext cx="3461853" cy="4147532"/>
+          </a:xfrm>
+          <a:prstGeom prst="rect">
+            <a:avLst/>
+          </a:prstGeom>
+          <a:noFill/>
+          <a:ln>
+            <a:noFill/>
+          </a:ln>
+        </p:spPr>
+      </p:pic>
+      <p:pic>
+        <p:nvPicPr>
+          <p:cNvPr id="98" name="Google Shape;98;p18"/>
+          <p:cNvPicPr preferRelativeResize="0"/>
+          <p:nvPr/>
+        </p:nvPicPr>
+        <p:blipFill rotWithShape="1">
+          <a:blip r:embed="rId4">
+            <a:alphaModFix/>
+          </a:blip>
+          <a:srcRect/>
+          <a:stretch/>
+        </p:blipFill>
+        <p:spPr>
+          <a:xfrm>
+            <a:off x="3965" y="0"/>
+            <a:ext cx="9136072" cy="5143501"/>
+          </a:xfrm>
+          <a:prstGeom prst="rect">
+            <a:avLst/>
+          </a:prstGeom>
+          <a:noFill/>
+          <a:ln>
+            <a:noFill/>
+          </a:ln>
+        </p:spPr>
+      </p:pic>
+      <p:sp>
+        <p:nvSpPr>
+          <p:cNvPr id="99" name="Google Shape;99;p18"/>
+          <p:cNvSpPr txBox="1"/>
+          <p:nvPr/>
+        </p:nvSpPr>
+        <p:spPr>
+          <a:xfrm>
+            <a:off x="576900" y="258012"/>
+            <a:ext cx="1951800" cy="338700"/>
+          </a:xfrm>
+          <a:prstGeom prst="rect">
+            <a:avLst/>
+          </a:prstGeom>
+          <a:noFill/>
+          <a:ln>
+            <a:noFill/>
+          </a:ln>
+        </p:spPr>
+        <p:txBody>
+          <a:bodyPr spcFirstLastPara="1" wrap="square" lIns="91425" tIns="91425" rIns="91425" bIns="91425" anchor="t" anchorCtr="0">
+            <a:spAutoFit/>
+          </a:bodyPr>
+          <a:lstStyle/>
+          <a:p>
+            <a:pPr marL="0" marR="0" lvl="0" indent="0" algn="l" rtl="0">
+              <a:lnSpc>
+                <a:spcPct val="100000"/>
+              </a:lnSpc>
+              <a:spcBef>
+                <a:spcPts val="0"/>
+              </a:spcBef>
+              <a:spcAft>
+                <a:spcPts val="0"/>
+              </a:spcAft>
+              <a:buClr>
+                <a:srgbClr val="000000"/>
+              </a:buClr>
+              <a:buSzPts val="1000"/>
+              <a:buFont typeface="Arial"/>
+              <a:buNone/>
+            </a:pPr>
+            <a:endParaRPr sz="1000" b="0" i="1" u="none" strike="noStrike" cap="none">
+              <a:solidFill>
+                <a:schemeClr val="dk1"/>
+              </a:solidFill>
+              <a:latin typeface="Plus Jakarta Sans Medium"/>
+              <a:ea typeface="Plus Jakarta Sans Medium"/>
+              <a:cs typeface="Plus Jakarta Sans Medium"/>
+              <a:sym typeface="Plus Jakarta Sans Medium"/>
+            </a:endParaRPr>
+          </a:p>
+        </p:txBody>
+      </p:sp>
+      <p:cxnSp>
+        <p:nvCxnSpPr>
+          <p:cNvPr id="100" name="Google Shape;100;p18"/>
+          <p:cNvCxnSpPr/>
+          <p:nvPr/>
+        </p:nvCxnSpPr>
+        <p:spPr>
+          <a:xfrm rot="10800000">
+            <a:off x="145800" y="418013"/>
+            <a:ext cx="431100" cy="0"/>
+          </a:xfrm>
+          <a:prstGeom prst="straightConnector1">
+            <a:avLst/>
+          </a:prstGeom>
+          <a:noFill/>
+          <a:ln w="28575" cap="flat" cmpd="sng">
+            <a:solidFill>
+              <a:srgbClr val="EA476D"/>
+            </a:solidFill>
+            <a:prstDash val="solid"/>
+            <a:round/>
+            <a:headEnd type="none" w="sm" len="sm"/>
+            <a:tailEnd type="none" w="sm" len="sm"/>
+          </a:ln>
+        </p:spPr>
+      </p:cxnSp>
+      <p:sp>
+        <p:nvSpPr>
+          <p:cNvPr id="101" name="Google Shape;101;p18"/>
+          <p:cNvSpPr/>
+          <p:nvPr/>
+        </p:nvSpPr>
+        <p:spPr>
+          <a:xfrm>
+            <a:off x="905550" y="1778200"/>
+            <a:ext cx="7332900" cy="2574428"/>
+          </a:xfrm>
+          <a:prstGeom prst="roundRect">
+            <a:avLst>
+              <a:gd name="adj" fmla="val 10085"/>
+            </a:avLst>
+          </a:prstGeom>
+          <a:solidFill>
+            <a:schemeClr val="dk1"/>
+          </a:solidFill>
+          <a:ln w="9525" cap="flat" cmpd="sng">
+            <a:solidFill>
+              <a:schemeClr val="lt1"/>
+            </a:solidFill>
+            <a:prstDash val="solid"/>
+            <a:round/>
+            <a:headEnd type="none" w="sm" len="sm"/>
+            <a:tailEnd type="none" w="sm" len="sm"/>
+          </a:ln>
+        </p:spPr>
+        <p:txBody>
+          <a:bodyPr spcFirstLastPara="1" wrap="square" lIns="91425" tIns="91425" rIns="91425" bIns="91425" anchor="ctr" anchorCtr="0">
+            <a:noAutofit/>
+          </a:bodyPr>
+          <a:lstStyle/>
+          <a:p>
+            <a:pPr lvl="0">
+              <a:lnSpc>
+                <a:spcPct val="115000"/>
+              </a:lnSpc>
+              <a:buSzPts val="1800"/>
+            </a:pPr>
+            <a:r>
+              <a:rPr lang="en" sz="2400" dirty="0">
+                <a:solidFill>
+                  <a:schemeClr val="lt1"/>
+                </a:solidFill>
+                <a:latin typeface="Plus Jakarta Sans"/>
+                <a:ea typeface="Plus Jakarta Sans"/>
+                <a:cs typeface="Plus Jakarta Sans"/>
+                <a:sym typeface="Plus Jakarta Sans"/>
+              </a:rPr>
+              <a:t>In an effort to determine which acquis</a:t>
+            </a:r>
+            <a:r>
+              <a:rPr lang="en-US" sz="2400" dirty="0" err="1">
+                <a:solidFill>
+                  <a:schemeClr val="lt1"/>
+                </a:solidFill>
+                <a:latin typeface="Plus Jakarta Sans"/>
+                <a:ea typeface="Plus Jakarta Sans"/>
+                <a:cs typeface="Plus Jakarta Sans"/>
+                <a:sym typeface="Plus Jakarta Sans"/>
+              </a:rPr>
+              <a:t>i</a:t>
+            </a:r>
+            <a:r>
+              <a:rPr lang="en" sz="2400" dirty="0" err="1">
+                <a:solidFill>
+                  <a:schemeClr val="lt1"/>
+                </a:solidFill>
+                <a:latin typeface="Plus Jakarta Sans"/>
+                <a:ea typeface="Plus Jakarta Sans"/>
+                <a:cs typeface="Plus Jakarta Sans"/>
+                <a:sym typeface="Plus Jakarta Sans"/>
+              </a:rPr>
+              <a:t>tion</a:t>
+            </a:r>
+            <a:r>
+              <a:rPr lang="en" sz="2400" dirty="0">
+                <a:solidFill>
+                  <a:schemeClr val="lt1"/>
+                </a:solidFill>
+                <a:latin typeface="Plus Jakarta Sans"/>
+                <a:ea typeface="Plus Jakarta Sans"/>
+                <a:cs typeface="Plus Jakarta Sans"/>
+                <a:sym typeface="Plus Jakarta Sans"/>
+              </a:rPr>
+              <a:t> group is more likely to become </a:t>
+            </a:r>
+            <a:r>
+              <a:rPr lang="en" sz="2400" i="1" dirty="0">
+                <a:solidFill>
+                  <a:schemeClr val="accent6"/>
+                </a:solidFill>
+                <a:latin typeface="Plus Jakarta Sans"/>
+                <a:ea typeface="Plus Jakarta Sans"/>
+                <a:cs typeface="Plus Jakarta Sans"/>
+                <a:sym typeface="Plus Jakarta Sans"/>
+              </a:rPr>
+              <a:t>paid</a:t>
+            </a:r>
+            <a:r>
+              <a:rPr lang="en" sz="2400" dirty="0">
+                <a:solidFill>
+                  <a:schemeClr val="lt1"/>
+                </a:solidFill>
+                <a:latin typeface="Plus Jakarta Sans"/>
+                <a:ea typeface="Plus Jakarta Sans"/>
+                <a:cs typeface="Plus Jakarta Sans"/>
+                <a:sym typeface="Plus Jakarta Sans"/>
+              </a:rPr>
+              <a:t> Headspace subscribers, the marketing team has requested that we compare and evaluate the </a:t>
+            </a:r>
+            <a:r>
+              <a:rPr lang="en" sz="2400" dirty="0">
+                <a:solidFill>
+                  <a:schemeClr val="accent6"/>
+                </a:solidFill>
+                <a:latin typeface="Plus Jakarta Sans"/>
+                <a:ea typeface="Plus Jakarta Sans"/>
+                <a:cs typeface="Plus Jakarta Sans"/>
+                <a:sym typeface="Plus Jakarta Sans"/>
+              </a:rPr>
+              <a:t>conversion rates </a:t>
+            </a:r>
+            <a:r>
+              <a:rPr lang="en" sz="2400" dirty="0">
+                <a:solidFill>
+                  <a:schemeClr val="lt1"/>
+                </a:solidFill>
+                <a:latin typeface="Plus Jakarta Sans"/>
+                <a:ea typeface="Plus Jakarta Sans"/>
+                <a:cs typeface="Plus Jakarta Sans"/>
+                <a:sym typeface="Plus Jakarta Sans"/>
+              </a:rPr>
+              <a:t>of </a:t>
+            </a:r>
+            <a:r>
+              <a:rPr lang="en" sz="2400" dirty="0">
+                <a:solidFill>
+                  <a:schemeClr val="accent6"/>
+                </a:solidFill>
+                <a:latin typeface="Plus Jakarta Sans ExtraBold"/>
+                <a:ea typeface="Plus Jakarta Sans ExtraBold"/>
+                <a:cs typeface="Plus Jakarta Sans ExtraBold"/>
+                <a:sym typeface="Plus Jakarta Sans ExtraBold"/>
+              </a:rPr>
+              <a:t>organic acquisitions </a:t>
+            </a:r>
+            <a:r>
+              <a:rPr lang="en" sz="2400" dirty="0">
+                <a:solidFill>
+                  <a:schemeClr val="lt1"/>
+                </a:solidFill>
+                <a:latin typeface="Plus Jakarta Sans"/>
+                <a:ea typeface="Plus Jakarta Sans"/>
+                <a:cs typeface="Plus Jakarta Sans"/>
+                <a:sym typeface="Plus Jakarta Sans"/>
+              </a:rPr>
+              <a:t>and </a:t>
+            </a:r>
+            <a:r>
+              <a:rPr lang="en" sz="2400" dirty="0">
+                <a:solidFill>
+                  <a:schemeClr val="accent6"/>
+                </a:solidFill>
+                <a:latin typeface="Plus Jakarta Sans ExtraBold"/>
+                <a:ea typeface="Plus Jakarta Sans ExtraBold"/>
+                <a:cs typeface="Plus Jakarta Sans ExtraBold"/>
+                <a:sym typeface="Plus Jakarta Sans ExtraBold"/>
+              </a:rPr>
+              <a:t>paid acquisitions</a:t>
+            </a:r>
+            <a:r>
+              <a:rPr lang="en" sz="2400" dirty="0">
+                <a:solidFill>
+                  <a:schemeClr val="lt1"/>
+                </a:solidFill>
+                <a:latin typeface="Plus Jakarta Sans"/>
+                <a:cs typeface="Plus Jakarta Sans"/>
+                <a:sym typeface="Plus Jakarta Sans ExtraBold"/>
+              </a:rPr>
+              <a:t>.</a:t>
+            </a:r>
+            <a:endParaRPr sz="2400" dirty="0">
+              <a:solidFill>
+                <a:schemeClr val="lt1"/>
+              </a:solidFill>
+              <a:latin typeface="Plus Jakarta Sans"/>
+              <a:cs typeface="Plus Jakarta Sans"/>
+              <a:sym typeface="Plus Jakarta Sans"/>
+            </a:endParaRPr>
+          </a:p>
+        </p:txBody>
+      </p:sp>
+      <p:sp>
+        <p:nvSpPr>
+          <p:cNvPr id="102" name="Google Shape;102;p18"/>
+          <p:cNvSpPr/>
+          <p:nvPr/>
+        </p:nvSpPr>
+        <p:spPr>
+          <a:xfrm>
+            <a:off x="2770414" y="1046850"/>
+            <a:ext cx="3603172" cy="555300"/>
+          </a:xfrm>
+          <a:prstGeom prst="roundRect">
+            <a:avLst>
+              <a:gd name="adj" fmla="val 50000"/>
+            </a:avLst>
+          </a:prstGeom>
+          <a:solidFill>
+            <a:srgbClr val="EA476D"/>
+          </a:solidFill>
+          <a:ln>
+            <a:noFill/>
+          </a:ln>
+        </p:spPr>
+        <p:txBody>
+          <a:bodyPr spcFirstLastPara="1" wrap="square" lIns="45725" tIns="45725" rIns="45725" bIns="45725" anchor="ctr" anchorCtr="0">
+            <a:noAutofit/>
+          </a:bodyPr>
+          <a:lstStyle/>
+          <a:p>
+            <a:pPr marL="0" marR="0" lvl="0" indent="0" algn="ctr" rtl="0">
+              <a:lnSpc>
+                <a:spcPct val="100000"/>
+              </a:lnSpc>
+              <a:spcBef>
+                <a:spcPts val="0"/>
+              </a:spcBef>
+              <a:spcAft>
+                <a:spcPts val="0"/>
+              </a:spcAft>
+              <a:buClr>
+                <a:srgbClr val="000000"/>
+              </a:buClr>
+              <a:buSzPts val="1800"/>
+              <a:buFont typeface="Arial"/>
+              <a:buNone/>
+            </a:pPr>
+            <a:r>
+              <a:rPr lang="en" sz="2400" b="1" i="0" u="none" strike="noStrike" cap="none" dirty="0">
+                <a:solidFill>
+                  <a:srgbClr val="FFFFFF"/>
+                </a:solidFill>
+                <a:latin typeface="Poppins"/>
+                <a:ea typeface="Poppins"/>
+                <a:cs typeface="Poppins"/>
+                <a:sym typeface="Poppins"/>
+              </a:rPr>
+              <a:t>Problem Statement</a:t>
+            </a:r>
+            <a:endParaRPr sz="2400" b="1" i="0" u="none" strike="noStrike" cap="none" dirty="0">
+              <a:solidFill>
+                <a:srgbClr val="FFFFFF"/>
+              </a:solidFill>
+              <a:latin typeface="Poppins"/>
+              <a:ea typeface="Poppins"/>
+              <a:cs typeface="Poppins"/>
+              <a:sym typeface="Poppins"/>
+            </a:endParaRPr>
+          </a:p>
+        </p:txBody>
+      </p:sp>
+      <p:sp>
+        <p:nvSpPr>
+          <p:cNvPr id="103" name="Google Shape;103;p18"/>
+          <p:cNvSpPr/>
+          <p:nvPr/>
+        </p:nvSpPr>
+        <p:spPr>
+          <a:xfrm>
+            <a:off x="6343375" y="-2771428"/>
+            <a:ext cx="3933600" cy="3933600"/>
+          </a:xfrm>
+          <a:prstGeom prst="ellipse">
+            <a:avLst/>
+          </a:prstGeom>
+          <a:noFill/>
+          <a:ln w="38100" cap="flat" cmpd="sng">
+            <a:solidFill>
+              <a:srgbClr val="72CFED"/>
+            </a:solidFill>
+            <a:prstDash val="solid"/>
+            <a:round/>
+            <a:headEnd type="none" w="sm" len="sm"/>
+            <a:tailEnd type="none" w="sm" len="sm"/>
+          </a:ln>
+        </p:spPr>
+        <p:txBody>
+          <a:bodyPr spcFirstLastPara="1" wrap="square" lIns="91425" tIns="91425" rIns="91425" bIns="91425" anchor="ctr" anchorCtr="0">
+            <a:noAutofit/>
+          </a:bodyPr>
+          <a:lstStyle/>
+          <a:p>
+            <a:pPr marL="0" marR="0" lvl="0" indent="0" algn="l" rtl="0">
+              <a:lnSpc>
+                <a:spcPct val="100000"/>
+              </a:lnSpc>
+              <a:spcBef>
+                <a:spcPts val="0"/>
+              </a:spcBef>
+              <a:spcAft>
+                <a:spcPts val="0"/>
+              </a:spcAft>
+              <a:buClr>
+                <a:srgbClr val="000000"/>
+              </a:buClr>
+              <a:buSzPts val="1400"/>
+              <a:buFont typeface="Arial"/>
+              <a:buNone/>
+            </a:pPr>
+            <a:endParaRPr sz="1400" b="0" i="0" u="none" strike="noStrike" cap="none">
+              <a:solidFill>
+                <a:srgbClr val="000000"/>
+              </a:solidFill>
+              <a:latin typeface="Arial"/>
+              <a:ea typeface="Arial"/>
+              <a:cs typeface="Arial"/>
+              <a:sym typeface="Arial"/>
             </a:endParaRPr>
           </a:p>
         </p:txBody>
@@ -9710,7 +10662,7 @@
 </p:sld>
 </file>
 
-<file path=ppt/slides/slide6.xml><?xml version="1.0" encoding="utf-8"?>
+<file path=ppt/slides/slide7.xml><?xml version="1.0" encoding="utf-8"?>
 <p:sld xmlns:a="http://schemas.openxmlformats.org/drawingml/2006/main" xmlns:r="http://schemas.openxmlformats.org/officeDocument/2006/relationships" xmlns:p="http://schemas.openxmlformats.org/presentationml/2006/main">
   <p:cSld>
     <p:bg>
@@ -9789,7 +10741,7 @@
         <p:spPr>
           <a:xfrm>
             <a:off x="512710" y="775500"/>
-            <a:ext cx="8118600" cy="738900"/>
+            <a:ext cx="8118600" cy="1292631"/>
           </a:xfrm>
           <a:prstGeom prst="rect">
             <a:avLst/>
@@ -9832,7 +10784,38 @@
                 <a:cs typeface="Poppins ExtraBold"/>
                 <a:sym typeface="Poppins ExtraBold"/>
               </a:rPr>
-              <a:t>Conversion Rates</a:t>
+              <a:t>So….How Do We Calculate</a:t>
+            </a:r>
+          </a:p>
+          <a:p>
+            <a:pPr marL="0" marR="0" lvl="0" indent="0" algn="ctr" rtl="0">
+              <a:lnSpc>
+                <a:spcPct val="100000"/>
+              </a:lnSpc>
+              <a:spcBef>
+                <a:spcPts val="0"/>
+              </a:spcBef>
+              <a:spcAft>
+                <a:spcPts val="0"/>
+              </a:spcAft>
+              <a:buClr>
+                <a:schemeClr val="dk1"/>
+              </a:buClr>
+              <a:buSzPts val="1100"/>
+              <a:buFont typeface="Arial"/>
+              <a:buNone/>
+            </a:pPr>
+            <a:r>
+              <a:rPr lang="en" sz="3600" dirty="0">
+                <a:solidFill>
+                  <a:srgbClr val="F7E141"/>
+                </a:solidFill>
+                <a:latin typeface="Poppins ExtraBold"/>
+                <a:ea typeface="Poppins ExtraBold"/>
+                <a:cs typeface="Poppins ExtraBold"/>
+                <a:sym typeface="Poppins ExtraBold"/>
+              </a:rPr>
+              <a:t>Conversion Rates?</a:t>
             </a:r>
             <a:endParaRPr sz="3600" b="0" i="0" u="none" strike="noStrike" cap="none" dirty="0">
               <a:solidFill>
@@ -10448,10 +11431,292 @@
   <p:clrMapOvr>
     <a:masterClrMapping/>
   </p:clrMapOvr>
+  <p:timing>
+    <p:tnLst>
+      <p:par>
+        <p:cTn id="1" dur="indefinite" restart="never" nodeType="tmRoot">
+          <p:childTnLst>
+            <p:seq concurrent="1" nextAc="seek">
+              <p:cTn id="2" dur="indefinite" nodeType="mainSeq">
+                <p:childTnLst>
+                  <p:par>
+                    <p:cTn id="3" fill="hold">
+                      <p:stCondLst>
+                        <p:cond delay="indefinite"/>
+                      </p:stCondLst>
+                      <p:childTnLst>
+                        <p:par>
+                          <p:cTn id="4" fill="hold">
+                            <p:stCondLst>
+                              <p:cond delay="0"/>
+                            </p:stCondLst>
+                            <p:childTnLst>
+                              <p:par>
+                                <p:cTn id="5" presetID="9" presetClass="entr" presetSubtype="0" fill="hold" grpId="0" nodeType="clickEffect">
+                                  <p:stCondLst>
+                                    <p:cond delay="0"/>
+                                  </p:stCondLst>
+                                  <p:childTnLst>
+                                    <p:set>
+                                      <p:cBhvr>
+                                        <p:cTn id="6" dur="1" fill="hold">
+                                          <p:stCondLst>
+                                            <p:cond delay="0"/>
+                                          </p:stCondLst>
+                                        </p:cTn>
+                                        <p:tgtEl>
+                                          <p:spTgt spid="89"/>
+                                        </p:tgtEl>
+                                        <p:attrNameLst>
+                                          <p:attrName>style.visibility</p:attrName>
+                                        </p:attrNameLst>
+                                      </p:cBhvr>
+                                      <p:to>
+                                        <p:strVal val="visible"/>
+                                      </p:to>
+                                    </p:set>
+                                    <p:animEffect transition="in" filter="dissolve">
+                                      <p:cBhvr>
+                                        <p:cTn id="7" dur="500"/>
+                                        <p:tgtEl>
+                                          <p:spTgt spid="89"/>
+                                        </p:tgtEl>
+                                      </p:cBhvr>
+                                    </p:animEffect>
+                                  </p:childTnLst>
+                                </p:cTn>
+                              </p:par>
+                              <p:par>
+                                <p:cTn id="8" presetID="9" presetClass="entr" presetSubtype="0" fill="hold" grpId="0" nodeType="withEffect">
+                                  <p:stCondLst>
+                                    <p:cond delay="0"/>
+                                  </p:stCondLst>
+                                  <p:childTnLst>
+                                    <p:set>
+                                      <p:cBhvr>
+                                        <p:cTn id="9" dur="1" fill="hold">
+                                          <p:stCondLst>
+                                            <p:cond delay="0"/>
+                                          </p:stCondLst>
+                                        </p:cTn>
+                                        <p:tgtEl>
+                                          <p:spTgt spid="91"/>
+                                        </p:tgtEl>
+                                        <p:attrNameLst>
+                                          <p:attrName>style.visibility</p:attrName>
+                                        </p:attrNameLst>
+                                      </p:cBhvr>
+                                      <p:to>
+                                        <p:strVal val="visible"/>
+                                      </p:to>
+                                    </p:set>
+                                    <p:animEffect transition="in" filter="dissolve">
+                                      <p:cBhvr>
+                                        <p:cTn id="10" dur="500"/>
+                                        <p:tgtEl>
+                                          <p:spTgt spid="91"/>
+                                        </p:tgtEl>
+                                      </p:cBhvr>
+                                    </p:animEffect>
+                                  </p:childTnLst>
+                                </p:cTn>
+                              </p:par>
+                              <p:par>
+                                <p:cTn id="11" presetID="9" presetClass="entr" presetSubtype="0" fill="hold" nodeType="withEffect">
+                                  <p:stCondLst>
+                                    <p:cond delay="0"/>
+                                  </p:stCondLst>
+                                  <p:childTnLst>
+                                    <p:set>
+                                      <p:cBhvr>
+                                        <p:cTn id="12" dur="1" fill="hold">
+                                          <p:stCondLst>
+                                            <p:cond delay="0"/>
+                                          </p:stCondLst>
+                                        </p:cTn>
+                                        <p:tgtEl>
+                                          <p:spTgt spid="3"/>
+                                        </p:tgtEl>
+                                        <p:attrNameLst>
+                                          <p:attrName>style.visibility</p:attrName>
+                                        </p:attrNameLst>
+                                      </p:cBhvr>
+                                      <p:to>
+                                        <p:strVal val="visible"/>
+                                      </p:to>
+                                    </p:set>
+                                    <p:animEffect transition="in" filter="dissolve">
+                                      <p:cBhvr>
+                                        <p:cTn id="13" dur="500"/>
+                                        <p:tgtEl>
+                                          <p:spTgt spid="3"/>
+                                        </p:tgtEl>
+                                      </p:cBhvr>
+                                    </p:animEffect>
+                                  </p:childTnLst>
+                                </p:cTn>
+                              </p:par>
+                            </p:childTnLst>
+                          </p:cTn>
+                        </p:par>
+                      </p:childTnLst>
+                    </p:cTn>
+                  </p:par>
+                  <p:par>
+                    <p:cTn id="14" fill="hold">
+                      <p:stCondLst>
+                        <p:cond delay="indefinite"/>
+                      </p:stCondLst>
+                      <p:childTnLst>
+                        <p:par>
+                          <p:cTn id="15" fill="hold">
+                            <p:stCondLst>
+                              <p:cond delay="0"/>
+                            </p:stCondLst>
+                            <p:childTnLst>
+                              <p:par>
+                                <p:cTn id="16" presetID="9" presetClass="entr" presetSubtype="0" fill="hold" grpId="0" nodeType="clickEffect">
+                                  <p:stCondLst>
+                                    <p:cond delay="0"/>
+                                  </p:stCondLst>
+                                  <p:childTnLst>
+                                    <p:set>
+                                      <p:cBhvr>
+                                        <p:cTn id="17" dur="1" fill="hold">
+                                          <p:stCondLst>
+                                            <p:cond delay="0"/>
+                                          </p:stCondLst>
+                                        </p:cTn>
+                                        <p:tgtEl>
+                                          <p:spTgt spid="90"/>
+                                        </p:tgtEl>
+                                        <p:attrNameLst>
+                                          <p:attrName>style.visibility</p:attrName>
+                                        </p:attrNameLst>
+                                      </p:cBhvr>
+                                      <p:to>
+                                        <p:strVal val="visible"/>
+                                      </p:to>
+                                    </p:set>
+                                    <p:animEffect transition="in" filter="dissolve">
+                                      <p:cBhvr>
+                                        <p:cTn id="18" dur="500"/>
+                                        <p:tgtEl>
+                                          <p:spTgt spid="90"/>
+                                        </p:tgtEl>
+                                      </p:cBhvr>
+                                    </p:animEffect>
+                                  </p:childTnLst>
+                                </p:cTn>
+                              </p:par>
+                              <p:par>
+                                <p:cTn id="19" presetID="9" presetClass="entr" presetSubtype="0" fill="hold" grpId="0" nodeType="withEffect">
+                                  <p:stCondLst>
+                                    <p:cond delay="0"/>
+                                  </p:stCondLst>
+                                  <p:childTnLst>
+                                    <p:set>
+                                      <p:cBhvr>
+                                        <p:cTn id="20" dur="1" fill="hold">
+                                          <p:stCondLst>
+                                            <p:cond delay="0"/>
+                                          </p:stCondLst>
+                                        </p:cTn>
+                                        <p:tgtEl>
+                                          <p:spTgt spid="92"/>
+                                        </p:tgtEl>
+                                        <p:attrNameLst>
+                                          <p:attrName>style.visibility</p:attrName>
+                                        </p:attrNameLst>
+                                      </p:cBhvr>
+                                      <p:to>
+                                        <p:strVal val="visible"/>
+                                      </p:to>
+                                    </p:set>
+                                    <p:animEffect transition="in" filter="dissolve">
+                                      <p:cBhvr>
+                                        <p:cTn id="21" dur="500"/>
+                                        <p:tgtEl>
+                                          <p:spTgt spid="92"/>
+                                        </p:tgtEl>
+                                      </p:cBhvr>
+                                    </p:animEffect>
+                                  </p:childTnLst>
+                                </p:cTn>
+                              </p:par>
+                              <p:par>
+                                <p:cTn id="22" presetID="9" presetClass="entr" presetSubtype="0" fill="hold" nodeType="withEffect">
+                                  <p:stCondLst>
+                                    <p:cond delay="0"/>
+                                  </p:stCondLst>
+                                  <p:childTnLst>
+                                    <p:set>
+                                      <p:cBhvr>
+                                        <p:cTn id="23" dur="1" fill="hold">
+                                          <p:stCondLst>
+                                            <p:cond delay="0"/>
+                                          </p:stCondLst>
+                                        </p:cTn>
+                                        <p:tgtEl>
+                                          <p:spTgt spid="6"/>
+                                        </p:tgtEl>
+                                        <p:attrNameLst>
+                                          <p:attrName>style.visibility</p:attrName>
+                                        </p:attrNameLst>
+                                      </p:cBhvr>
+                                      <p:to>
+                                        <p:strVal val="visible"/>
+                                      </p:to>
+                                    </p:set>
+                                    <p:animEffect transition="in" filter="dissolve">
+                                      <p:cBhvr>
+                                        <p:cTn id="24" dur="500"/>
+                                        <p:tgtEl>
+                                          <p:spTgt spid="6"/>
+                                        </p:tgtEl>
+                                      </p:cBhvr>
+                                    </p:animEffect>
+                                  </p:childTnLst>
+                                </p:cTn>
+                              </p:par>
+                            </p:childTnLst>
+                          </p:cTn>
+                        </p:par>
+                      </p:childTnLst>
+                    </p:cTn>
+                  </p:par>
+                </p:childTnLst>
+              </p:cTn>
+              <p:prevCondLst>
+                <p:cond evt="onPrev" delay="0">
+                  <p:tgtEl>
+                    <p:sldTgt/>
+                  </p:tgtEl>
+                </p:cond>
+              </p:prevCondLst>
+              <p:nextCondLst>
+                <p:cond evt="onNext" delay="0">
+                  <p:tgtEl>
+                    <p:sldTgt/>
+                  </p:tgtEl>
+                </p:cond>
+              </p:nextCondLst>
+            </p:seq>
+          </p:childTnLst>
+        </p:cTn>
+      </p:par>
+    </p:tnLst>
+    <p:bldLst>
+      <p:bldP spid="89" grpId="0" animBg="1"/>
+      <p:bldP spid="90" grpId="0" animBg="1"/>
+      <p:bldP spid="91" grpId="0"/>
+      <p:bldP spid="92" grpId="0"/>
+    </p:bldLst>
+  </p:timing>
 </p:sld>
 </file>
 
-<file path=ppt/slides/slide7.xml><?xml version="1.0" encoding="utf-8"?>
+<file path=ppt/slides/slide8.xml><?xml version="1.0" encoding="utf-8"?>
 <p:sld xmlns:a="http://schemas.openxmlformats.org/drawingml/2006/main" xmlns:r="http://schemas.openxmlformats.org/officeDocument/2006/relationships" xmlns:p="http://schemas.openxmlformats.org/presentationml/2006/main">
   <p:cSld>
     <p:bg>
@@ -10464,7 +11729,13 @@
     </p:bg>
     <p:spTree>
       <p:nvGrpSpPr>
-        <p:cNvPr id="1" name="Shape 96"/>
+        <p:cNvPr id="1" name="Shape 96">
+          <a:extLst>
+            <a:ext uri="{FF2B5EF4-FFF2-40B4-BE49-F238E27FC236}">
+              <a16:creationId xmlns:a16="http://schemas.microsoft.com/office/drawing/2014/main" id="{C6D9C94D-8BF8-DA5E-6222-64AE48D11A98}"/>
+            </a:ext>
+          </a:extLst>
+        </p:cNvPr>
         <p:cNvGrpSpPr/>
         <p:nvPr/>
       </p:nvGrpSpPr>
@@ -10478,7 +11749,13 @@
       </p:grpSpPr>
       <p:pic>
         <p:nvPicPr>
-          <p:cNvPr id="97" name="Google Shape;97;p18"/>
+          <p:cNvPr id="97" name="Google Shape;97;p18">
+            <a:extLst>
+              <a:ext uri="{FF2B5EF4-FFF2-40B4-BE49-F238E27FC236}">
+                <a16:creationId xmlns:a16="http://schemas.microsoft.com/office/drawing/2014/main" id="{90E0A4E4-9AB0-F2C3-46CE-5BCE750679AF}"/>
+              </a:ext>
+            </a:extLst>
+          </p:cNvPr>
           <p:cNvPicPr preferRelativeResize="0"/>
           <p:nvPr/>
         </p:nvPicPr>
@@ -10491,7 +11768,7 @@
         </p:blipFill>
         <p:spPr>
           <a:xfrm rot="-7200012">
-            <a:off x="-239314" y="3073924"/>
+            <a:off x="-239314" y="3069734"/>
             <a:ext cx="3461853" cy="4147532"/>
           </a:xfrm>
           <a:prstGeom prst="rect">
@@ -10505,7 +11782,13 @@
       </p:pic>
       <p:pic>
         <p:nvPicPr>
-          <p:cNvPr id="98" name="Google Shape;98;p18"/>
+          <p:cNvPr id="98" name="Google Shape;98;p18">
+            <a:extLst>
+              <a:ext uri="{FF2B5EF4-FFF2-40B4-BE49-F238E27FC236}">
+                <a16:creationId xmlns:a16="http://schemas.microsoft.com/office/drawing/2014/main" id="{06A93DB0-E3BF-E7E4-966D-B246469F54DC}"/>
+              </a:ext>
+            </a:extLst>
+          </p:cNvPr>
           <p:cNvPicPr preferRelativeResize="0"/>
           <p:nvPr/>
         </p:nvPicPr>
@@ -10532,7 +11815,13 @@
       </p:pic>
       <p:sp>
         <p:nvSpPr>
-          <p:cNvPr id="99" name="Google Shape;99;p18"/>
+          <p:cNvPr id="99" name="Google Shape;99;p18">
+            <a:extLst>
+              <a:ext uri="{FF2B5EF4-FFF2-40B4-BE49-F238E27FC236}">
+                <a16:creationId xmlns:a16="http://schemas.microsoft.com/office/drawing/2014/main" id="{E6EBC91A-FC8F-3082-F24A-DB7BA12355A1}"/>
+              </a:ext>
+            </a:extLst>
+          </p:cNvPr>
           <p:cNvSpPr txBox="1"/>
           <p:nvPr/>
         </p:nvSpPr>
@@ -10586,7 +11875,13 @@
       </p:sp>
       <p:cxnSp>
         <p:nvCxnSpPr>
-          <p:cNvPr id="100" name="Google Shape;100;p18"/>
+          <p:cNvPr id="100" name="Google Shape;100;p18">
+            <a:extLst>
+              <a:ext uri="{FF2B5EF4-FFF2-40B4-BE49-F238E27FC236}">
+                <a16:creationId xmlns:a16="http://schemas.microsoft.com/office/drawing/2014/main" id="{BB743CEA-D927-D4AB-ED6C-70B4CB2AB767}"/>
+              </a:ext>
+            </a:extLst>
+          </p:cNvPr>
           <p:cNvCxnSpPr/>
           <p:nvPr/>
         </p:nvCxnSpPr>
@@ -10612,7 +11907,13 @@
       </p:cxnSp>
       <p:sp>
         <p:nvSpPr>
-          <p:cNvPr id="101" name="Google Shape;101;p18"/>
+          <p:cNvPr id="101" name="Google Shape;101;p18">
+            <a:extLst>
+              <a:ext uri="{FF2B5EF4-FFF2-40B4-BE49-F238E27FC236}">
+                <a16:creationId xmlns:a16="http://schemas.microsoft.com/office/drawing/2014/main" id="{989D89E9-DD30-425B-AADC-9F005205A065}"/>
+              </a:ext>
+            </a:extLst>
+          </p:cNvPr>
           <p:cNvSpPr/>
           <p:nvPr/>
         </p:nvSpPr>
@@ -10663,7 +11964,7 @@
               <a:buNone/>
             </a:pPr>
             <a:r>
-              <a:rPr lang="en" sz="2400">
+              <a:rPr lang="en" sz="2400" dirty="0">
                 <a:solidFill>
                   <a:schemeClr val="lt1"/>
                 </a:solidFill>
@@ -10672,12 +11973,36 @@
                 <a:cs typeface="Plus Jakarta Sans"/>
                 <a:sym typeface="Plus Jakarta Sans"/>
               </a:rPr>
-              <a:t>The marketing team wants to compare and evaluate the conversion rates of </a:t>
-            </a:r>
-            <a:r>
-              <a:rPr lang="en" sz="2400">
+              <a:t>The marketing team wants to compare and evaluate the </a:t>
+            </a:r>
+            <a:r>
+              <a:rPr lang="en" sz="2400" dirty="0">
+                <a:solidFill>
+                  <a:schemeClr val="accent6"/>
+                </a:solidFill>
+                <a:latin typeface="Plus Jakarta Sans"/>
+                <a:ea typeface="Plus Jakarta Sans"/>
+                <a:cs typeface="Plus Jakarta Sans"/>
+                <a:sym typeface="Plus Jakarta Sans"/>
+              </a:rPr>
+              <a:t>conversion rates </a:t>
+            </a:r>
+            <a:r>
+              <a:rPr lang="en" sz="2400" dirty="0">
                 <a:solidFill>
                   <a:schemeClr val="lt1"/>
+                </a:solidFill>
+                <a:latin typeface="Plus Jakarta Sans"/>
+                <a:ea typeface="Plus Jakarta Sans"/>
+                <a:cs typeface="Plus Jakarta Sans"/>
+                <a:sym typeface="Plus Jakarta Sans"/>
+              </a:rPr>
+              <a:t>of </a:t>
+            </a:r>
+            <a:r>
+              <a:rPr lang="en" sz="2400" dirty="0">
+                <a:solidFill>
+                  <a:schemeClr val="accent6"/>
                 </a:solidFill>
                 <a:latin typeface="Plus Jakarta Sans ExtraBold"/>
                 <a:ea typeface="Plus Jakarta Sans ExtraBold"/>
@@ -10687,7 +12012,7 @@
               <a:t>organic acquisitions </a:t>
             </a:r>
             <a:r>
-              <a:rPr lang="en" sz="2400">
+              <a:rPr lang="en" sz="2400" dirty="0">
                 <a:solidFill>
                   <a:schemeClr val="lt1"/>
                 </a:solidFill>
@@ -10699,9 +12024,9 @@
               <a:t>and </a:t>
             </a:r>
             <a:r>
-              <a:rPr lang="en" sz="2400">
-                <a:solidFill>
-                  <a:schemeClr val="lt1"/>
+              <a:rPr lang="en" sz="2400" dirty="0">
+                <a:solidFill>
+                  <a:schemeClr val="accent6"/>
                 </a:solidFill>
                 <a:latin typeface="Plus Jakarta Sans ExtraBold"/>
                 <a:ea typeface="Plus Jakarta Sans ExtraBold"/>
@@ -10711,18 +12036,54 @@
               <a:t>paid acquisitions</a:t>
             </a:r>
             <a:r>
-              <a:rPr lang="en" sz="2400">
-                <a:solidFill>
-                  <a:schemeClr val="lt1"/>
+              <a:rPr lang="en" sz="2400" dirty="0">
+                <a:solidFill>
+                  <a:schemeClr val="accent6"/>
                 </a:solidFill>
                 <a:latin typeface="Plus Jakarta Sans"/>
                 <a:ea typeface="Plus Jakarta Sans"/>
                 <a:cs typeface="Plus Jakarta Sans"/>
                 <a:sym typeface="Plus Jakarta Sans"/>
               </a:rPr>
-              <a:t> to determine which group is more likely to become paid Headspace subscribers.</a:t>
-            </a:r>
-            <a:endParaRPr sz="2400" i="0" u="none" strike="noStrike" cap="none">
+              <a:t> </a:t>
+            </a:r>
+            <a:r>
+              <a:rPr lang="en" sz="2400" dirty="0">
+                <a:solidFill>
+                  <a:schemeClr val="lt1"/>
+                </a:solidFill>
+                <a:latin typeface="Plus Jakarta Sans"/>
+                <a:ea typeface="Plus Jakarta Sans"/>
+                <a:cs typeface="Plus Jakarta Sans"/>
+                <a:sym typeface="Plus Jakarta Sans"/>
+              </a:rPr>
+              <a:t>to determine which group is more likely to become </a:t>
+            </a:r>
+            <a:r>
+              <a:rPr lang="en" sz="2400" i="1" dirty="0">
+                <a:solidFill>
+                  <a:schemeClr val="accent6"/>
+                </a:solidFill>
+                <a:latin typeface="Plus Jakarta Sans"/>
+                <a:ea typeface="Plus Jakarta Sans"/>
+                <a:cs typeface="Plus Jakarta Sans"/>
+                <a:sym typeface="Plus Jakarta Sans"/>
+              </a:rPr>
+              <a:t>paid</a:t>
+            </a:r>
+            <a:r>
+              <a:rPr lang="en" sz="2400" dirty="0">
+                <a:solidFill>
+                  <a:schemeClr val="lt1"/>
+                </a:solidFill>
+                <a:latin typeface="Plus Jakarta Sans"/>
+                <a:ea typeface="Plus Jakarta Sans"/>
+                <a:cs typeface="Plus Jakarta Sans"/>
+                <a:sym typeface="Plus Jakarta Sans"/>
+              </a:rPr>
+              <a:t> Headspace subscribers.</a:t>
+            </a:r>
+            <a:endParaRPr sz="2400" i="0" u="none" strike="noStrike" cap="none" dirty="0">
               <a:solidFill>
                 <a:schemeClr val="lt1"/>
               </a:solidFill>
@@ -10736,14 +12097,20 @@
       </p:sp>
       <p:sp>
         <p:nvSpPr>
-          <p:cNvPr id="102" name="Google Shape;102;p18"/>
+          <p:cNvPr id="102" name="Google Shape;102;p18">
+            <a:extLst>
+              <a:ext uri="{FF2B5EF4-FFF2-40B4-BE49-F238E27FC236}">
+                <a16:creationId xmlns:a16="http://schemas.microsoft.com/office/drawing/2014/main" id="{51512AC2-99B7-C5F1-625C-99C1046C70AD}"/>
+              </a:ext>
+            </a:extLst>
+          </p:cNvPr>
           <p:cNvSpPr/>
           <p:nvPr/>
         </p:nvSpPr>
         <p:spPr>
           <a:xfrm>
-            <a:off x="3457800" y="1025900"/>
-            <a:ext cx="2228400" cy="555300"/>
+            <a:off x="2686756" y="969455"/>
+            <a:ext cx="3010733" cy="555300"/>
           </a:xfrm>
           <a:prstGeom prst="roundRect">
             <a:avLst>
@@ -10781,7 +12148,7 @@
               <a:buNone/>
             </a:pPr>
             <a:r>
-              <a:rPr lang="en" sz="2400" b="1">
+              <a:rPr lang="en" sz="2400" b="1" i="0" u="none" strike="noStrike" cap="none" dirty="0" err="1">
                 <a:solidFill>
                   <a:srgbClr val="FFFFFF"/>
                 </a:solidFill>
@@ -10790,9 +12157,33 @@
                 <a:cs typeface="Poppins"/>
                 <a:sym typeface="Poppins"/>
               </a:rPr>
-              <a:t>Scenario</a:t>
-            </a:r>
-            <a:endParaRPr sz="2400" b="1" i="0" u="none" strike="noStrike" cap="none">
+              <a:t>Ps</a:t>
+            </a:r>
+            <a:r>
+              <a:rPr lang="en" sz="2400" b="1" dirty="0" err="1">
+                <a:solidFill>
+                  <a:srgbClr val="FFFFFF"/>
+                </a:solidFill>
+                <a:latin typeface="Poppins"/>
+                <a:ea typeface="Poppins"/>
+                <a:cs typeface="Poppins"/>
+                <a:sym typeface="Poppins"/>
+              </a:rPr>
+              <a:t>eudoCode</a:t>
+            </a:r>
+            <a:r>
+              <a:rPr lang="en" sz="2400" b="1">
+                <a:solidFill>
+                  <a:srgbClr val="FFFFFF"/>
+                </a:solidFill>
+                <a:latin typeface="Poppins"/>
+                <a:ea typeface="Poppins"/>
+                <a:cs typeface="Poppins"/>
+                <a:sym typeface="Poppins"/>
+              </a:rPr>
+              <a:t> </a:t>
+            </a:r>
+            <a:endParaRPr sz="2400" b="1" i="0" u="none" strike="noStrike" cap="none" dirty="0">
               <a:solidFill>
                 <a:srgbClr val="FFFFFF"/>
               </a:solidFill>
@@ -10806,7 +12197,13 @@
       </p:sp>
       <p:sp>
         <p:nvSpPr>
-          <p:cNvPr id="103" name="Google Shape;103;p18"/>
+          <p:cNvPr id="103" name="Google Shape;103;p18">
+            <a:extLst>
+              <a:ext uri="{FF2B5EF4-FFF2-40B4-BE49-F238E27FC236}">
+                <a16:creationId xmlns:a16="http://schemas.microsoft.com/office/drawing/2014/main" id="{C8FE9A87-E313-AB1B-71D9-8BA8AAE60ED6}"/>
+              </a:ext>
+            </a:extLst>
+          </p:cNvPr>
           <p:cNvSpPr/>
           <p:nvPr/>
         </p:nvSpPr>
@@ -10865,6 +12262,11 @@
         </p:txBody>
       </p:sp>
     </p:spTree>
+    <p:extLst>
+      <p:ext uri="{BB962C8B-B14F-4D97-AF65-F5344CB8AC3E}">
+        <p14:creationId xmlns:p14="http://schemas.microsoft.com/office/powerpoint/2010/main" val="308343373"/>
+      </p:ext>
+    </p:extLst>
   </p:cSld>
   <p:clrMapOvr>
     <a:masterClrMapping/>

</xml_diff>

<commit_message>
modified:   Headspace_Podium_Interview.ipynb 	modified:   Ken_ DC LiveLab Instructor Interview.pptx 	new file:   headspace_data.csv
Changes not staged for commit:
	deleted:    headspace_data.csv
</commit_message>
<xml_diff>
--- a/Ken_ DC LiveLab Instructor Interview.pptx
+++ b/Ken_ DC LiveLab Instructor Interview.pptx
@@ -8,14 +8,14 @@
     <p:notesMasterId r:id="rId10"/>
   </p:notesMasterIdLst>
   <p:sldIdLst>
-    <p:sldId id="256" r:id="rId2"/>
-    <p:sldId id="257" r:id="rId3"/>
-    <p:sldId id="258" r:id="rId4"/>
-    <p:sldId id="259" r:id="rId5"/>
-    <p:sldId id="260" r:id="rId6"/>
-    <p:sldId id="261" r:id="rId7"/>
+    <p:sldId id="257" r:id="rId2"/>
+    <p:sldId id="258" r:id="rId3"/>
+    <p:sldId id="259" r:id="rId4"/>
+    <p:sldId id="260" r:id="rId5"/>
+    <p:sldId id="261" r:id="rId6"/>
+    <p:sldId id="263" r:id="rId7"/>
     <p:sldId id="262" r:id="rId8"/>
-    <p:sldId id="263" r:id="rId9"/>
+    <p:sldId id="256" r:id="rId9"/>
   </p:sldIdLst>
   <p:sldSz cx="9144000" cy="5143500" type="screen16x9"/>
   <p:notesSz cx="6858000" cy="9144000"/>
@@ -33,30 +33,24 @@
       <p:boldItalic r:id="rId16"/>
     </p:embeddedFont>
     <p:embeddedFont>
-      <p:font typeface="Plus Jakarta Sans ExtraBold" pitchFamily="2" charset="77"/>
-      <p:bold r:id="rId17"/>
-      <p:italic r:id="rId18"/>
-      <p:boldItalic r:id="rId19"/>
-    </p:embeddedFont>
-    <p:embeddedFont>
       <p:font typeface="Plus Jakarta Sans Medium" pitchFamily="2" charset="77"/>
-      <p:regular r:id="rId20"/>
-      <p:bold r:id="rId21"/>
-      <p:italic r:id="rId22"/>
-      <p:boldItalic r:id="rId23"/>
+      <p:regular r:id="rId17"/>
+      <p:bold r:id="rId18"/>
+      <p:italic r:id="rId19"/>
+      <p:boldItalic r:id="rId20"/>
     </p:embeddedFont>
     <p:embeddedFont>
       <p:font typeface="Poppins" pitchFamily="2" charset="77"/>
-      <p:regular r:id="rId24"/>
+      <p:regular r:id="rId21"/>
+      <p:bold r:id="rId22"/>
+      <p:italic r:id="rId23"/>
+      <p:boldItalic r:id="rId24"/>
+    </p:embeddedFont>
+    <p:embeddedFont>
+      <p:font typeface="Poppins ExtraBold" panose="020B0604020202020204" pitchFamily="34" charset="0"/>
       <p:bold r:id="rId25"/>
       <p:italic r:id="rId26"/>
       <p:boldItalic r:id="rId27"/>
-    </p:embeddedFont>
-    <p:embeddedFont>
-      <p:font typeface="Poppins ExtraBold" panose="020B0604020202020204" pitchFamily="34" charset="0"/>
-      <p:bold r:id="rId28"/>
-      <p:italic r:id="rId29"/>
-      <p:boldItalic r:id="rId30"/>
     </p:embeddedFont>
   </p:embeddedFontLst>
   <p:defaultTextStyle>
@@ -753,110 +747,6 @@
   <p:cSld>
     <p:spTree>
       <p:nvGrpSpPr>
-        <p:cNvPr id="1" name="Shape 50"/>
-        <p:cNvGrpSpPr/>
-        <p:nvPr/>
-      </p:nvGrpSpPr>
-      <p:grpSpPr>
-        <a:xfrm>
-          <a:off x="0" y="0"/>
-          <a:ext cx="0" cy="0"/>
-          <a:chOff x="0" y="0"/>
-          <a:chExt cx="0" cy="0"/>
-        </a:xfrm>
-      </p:grpSpPr>
-      <p:sp>
-        <p:nvSpPr>
-          <p:cNvPr id="51" name="Google Shape;51;g28b322f775d_0_0:notes"/>
-          <p:cNvSpPr>
-            <a:spLocks noGrp="1" noRot="1" noChangeAspect="1"/>
-          </p:cNvSpPr>
-          <p:nvPr>
-            <p:ph type="sldImg" idx="2"/>
-          </p:nvPr>
-        </p:nvSpPr>
-        <p:spPr>
-          <a:xfrm>
-            <a:off x="381300" y="685800"/>
-            <a:ext cx="6096000" cy="3429000"/>
-          </a:xfrm>
-          <a:custGeom>
-            <a:avLst/>
-            <a:gdLst/>
-            <a:ahLst/>
-            <a:cxnLst/>
-            <a:rect l="l" t="t" r="r" b="b"/>
-            <a:pathLst>
-              <a:path w="120000" h="120000" extrusionOk="0">
-                <a:moveTo>
-                  <a:pt x="0" y="0"/>
-                </a:moveTo>
-                <a:lnTo>
-                  <a:pt x="120000" y="0"/>
-                </a:lnTo>
-                <a:lnTo>
-                  <a:pt x="120000" y="120000"/>
-                </a:lnTo>
-                <a:lnTo>
-                  <a:pt x="0" y="120000"/>
-                </a:lnTo>
-                <a:close/>
-              </a:path>
-            </a:pathLst>
-          </a:custGeom>
-        </p:spPr>
-      </p:sp>
-      <p:sp>
-        <p:nvSpPr>
-          <p:cNvPr id="52" name="Google Shape;52;g28b322f775d_0_0:notes"/>
-          <p:cNvSpPr txBox="1">
-            <a:spLocks noGrp="1"/>
-          </p:cNvSpPr>
-          <p:nvPr>
-            <p:ph type="body" idx="1"/>
-          </p:nvPr>
-        </p:nvSpPr>
-        <p:spPr>
-          <a:xfrm>
-            <a:off x="685800" y="4343400"/>
-            <a:ext cx="5486400" cy="4114800"/>
-          </a:xfrm>
-          <a:prstGeom prst="rect">
-            <a:avLst/>
-          </a:prstGeom>
-        </p:spPr>
-        <p:txBody>
-          <a:bodyPr spcFirstLastPara="1" wrap="square" lIns="91425" tIns="91425" rIns="91425" bIns="91425" anchor="t" anchorCtr="0">
-            <a:noAutofit/>
-          </a:bodyPr>
-          <a:lstStyle/>
-          <a:p>
-            <a:pPr marL="0" lvl="0" indent="0" algn="l" rtl="0">
-              <a:spcBef>
-                <a:spcPts val="0"/>
-              </a:spcBef>
-              <a:spcAft>
-                <a:spcPts val="0"/>
-              </a:spcAft>
-              <a:buNone/>
-            </a:pPr>
-            <a:endParaRPr/>
-          </a:p>
-        </p:txBody>
-      </p:sp>
-    </p:spTree>
-  </p:cSld>
-  <p:clrMapOvr>
-    <a:masterClrMapping/>
-  </p:clrMapOvr>
-</p:notes>
-</file>
-
-<file path=ppt/notesSlides/notesSlide2.xml><?xml version="1.0" encoding="utf-8"?>
-<p:notes xmlns:a="http://schemas.openxmlformats.org/drawingml/2006/main" xmlns:r="http://schemas.openxmlformats.org/officeDocument/2006/relationships" xmlns:p="http://schemas.openxmlformats.org/presentationml/2006/main" showMasterSp="0" showMasterPhAnim="0">
-  <p:cSld>
-    <p:spTree>
-      <p:nvGrpSpPr>
         <p:cNvPr id="1" name="Shape 57"/>
         <p:cNvGrpSpPr/>
         <p:nvPr/>
@@ -1052,7 +942,7 @@
 </p:notes>
 </file>
 
-<file path=ppt/notesSlides/notesSlide3.xml><?xml version="1.0" encoding="utf-8"?>
+<file path=ppt/notesSlides/notesSlide2.xml><?xml version="1.0" encoding="utf-8"?>
 <p:notes xmlns:a="http://schemas.openxmlformats.org/drawingml/2006/main" xmlns:r="http://schemas.openxmlformats.org/officeDocument/2006/relationships" xmlns:p="http://schemas.openxmlformats.org/presentationml/2006/main" showMasterSp="0" showMasterPhAnim="0">
   <p:cSld>
     <p:spTree>
@@ -1081,7 +971,7 @@
         </p:nvSpPr>
         <p:spPr>
           <a:xfrm>
-            <a:off x="381300" y="685800"/>
+            <a:off x="381000" y="685800"/>
             <a:ext cx="6096000" cy="3429000"/>
           </a:xfrm>
           <a:custGeom>
@@ -1135,6 +1025,26 @@
           </a:bodyPr>
           <a:lstStyle/>
           <a:p>
+            <a:pPr marL="158750" lvl="0" indent="0" algn="l" rtl="0">
+              <a:spcBef>
+                <a:spcPts val="0"/>
+              </a:spcBef>
+              <a:spcAft>
+                <a:spcPts val="0"/>
+              </a:spcAft>
+              <a:buSzPts val="1100"/>
+              <a:buNone/>
+            </a:pPr>
+            <a:r>
+              <a:rPr lang="en" dirty="0">
+                <a:solidFill>
+                  <a:schemeClr val="dk1"/>
+                </a:solidFill>
+              </a:rPr>
+              <a:t>Headspace is a popular meditation and mindfulness app, provides guided meditation sessions, sleep exercises, and other mindfulness techniques Its mission is to make mindfulness available to everyone, everywhere, and play a role in improving the world's mental wellbeing.  The app offers:</a:t>
+            </a:r>
+          </a:p>
+          <a:p>
             <a:pPr marL="457200" lvl="0" indent="-298450" algn="l" rtl="0">
               <a:spcBef>
                 <a:spcPts val="0"/>
@@ -1143,16 +1053,7 @@
                 <a:spcPts val="0"/>
               </a:spcAft>
               <a:buSzPts val="1100"/>
-              <a:buChar char="-"/>
             </a:pPr>
-            <a:r>
-              <a:rPr lang="en" dirty="0">
-                <a:solidFill>
-                  <a:schemeClr val="dk1"/>
-                </a:solidFill>
-              </a:rPr>
-              <a:t>Headspace is a popular meditation and mindfulness app, provides guided meditation sessions, sleep exercises, and other mindfulness techniques</a:t>
-            </a:r>
             <a:endParaRPr dirty="0">
               <a:solidFill>
                 <a:schemeClr val="dk1"/>
@@ -1171,7 +1072,6 @@
                 <a:schemeClr val="dk1"/>
               </a:buClr>
               <a:buSzPts val="1100"/>
-              <a:buChar char="-"/>
             </a:pPr>
             <a:r>
               <a:rPr lang="en" dirty="0">
@@ -1179,7 +1079,7 @@
                   <a:schemeClr val="dk1"/>
                 </a:solidFill>
               </a:rPr>
-              <a:t>Its mission is to make mindfulness available to everyone, everywhere, and play a role in improving the world's mental wellbeing.</a:t>
+              <a:t>Guided meditations </a:t>
             </a:r>
             <a:endParaRPr dirty="0">
               <a:solidFill>
@@ -1199,7 +1099,6 @@
                 <a:schemeClr val="dk1"/>
               </a:buClr>
               <a:buSzPts val="1100"/>
-              <a:buChar char="-"/>
             </a:pPr>
             <a:r>
               <a:rPr lang="en" dirty="0">
@@ -1207,7 +1106,7 @@
                   <a:schemeClr val="dk1"/>
                 </a:solidFill>
               </a:rPr>
-              <a:t>Guided meditations </a:t>
+              <a:t>Sleepcasts </a:t>
             </a:r>
             <a:endParaRPr dirty="0">
               <a:solidFill>
@@ -1227,7 +1126,6 @@
                 <a:schemeClr val="dk1"/>
               </a:buClr>
               <a:buSzPts val="1100"/>
-              <a:buChar char="-"/>
             </a:pPr>
             <a:r>
               <a:rPr lang="en" dirty="0">
@@ -1235,16 +1133,90 @@
                   <a:schemeClr val="dk1"/>
                 </a:solidFill>
               </a:rPr>
-              <a:t>Sleepcasts </a:t>
-            </a:r>
-            <a:endParaRPr dirty="0">
+              <a:t>Focused music playlists</a:t>
+            </a:r>
+          </a:p>
+          <a:p>
+            <a:pPr marL="457200" marR="0" lvl="0" indent="-298450" algn="l" defTabSz="914400" rtl="0" eaLnBrk="1" fontAlgn="auto" latinLnBrk="0" hangingPunct="1">
+              <a:lnSpc>
+                <a:spcPct val="100000"/>
+              </a:lnSpc>
+              <a:spcBef>
+                <a:spcPts val="0"/>
+              </a:spcBef>
+              <a:spcAft>
+                <a:spcPts val="0"/>
+              </a:spcAft>
+              <a:buClr>
+                <a:schemeClr val="dk1"/>
+              </a:buClr>
+              <a:buSzPts val="1100"/>
+              <a:buFont typeface="Arial"/>
+              <a:buChar char="●"/>
+              <a:tabLst/>
+              <a:defRPr/>
+            </a:pPr>
+            <a:r>
+              <a:rPr lang="en-US" dirty="0"/>
+              <a:t>Offers a combination of free and premium content </a:t>
+            </a:r>
+            <a:r>
+              <a:rPr lang="en" dirty="0">
+                <a:solidFill>
+                  <a:schemeClr val="dk1"/>
+                </a:solidFill>
+              </a:rPr>
+              <a:t>designed to address specific areas such as stress, sleep, anxiety, focus, and relationships</a:t>
+            </a:r>
+            <a:endParaRPr lang="en-US" dirty="0"/>
+          </a:p>
+          <a:p>
+            <a:pPr marL="457200" marR="0" lvl="0" indent="-298450" algn="l" defTabSz="914400" rtl="0" eaLnBrk="1" fontAlgn="auto" latinLnBrk="0" hangingPunct="1">
+              <a:lnSpc>
+                <a:spcPct val="100000"/>
+              </a:lnSpc>
+              <a:spcBef>
+                <a:spcPts val="0"/>
+              </a:spcBef>
+              <a:spcAft>
+                <a:spcPts val="0"/>
+              </a:spcAft>
+              <a:buClr>
+                <a:schemeClr val="dk1"/>
+              </a:buClr>
+              <a:buSzPts val="1100"/>
+              <a:buFont typeface="Arial"/>
+              <a:buChar char="●"/>
+              <a:tabLst/>
+              <a:defRPr/>
+            </a:pPr>
+            <a:r>
+              <a:rPr lang="en-US" dirty="0"/>
+              <a:t>Premium content requires a paid subscription.</a:t>
+            </a:r>
+          </a:p>
+          <a:p>
+            <a:pPr marL="158750" lvl="0" indent="0" algn="l" rtl="0">
+              <a:spcBef>
+                <a:spcPts val="0"/>
+              </a:spcBef>
+              <a:spcAft>
+                <a:spcPts val="0"/>
+              </a:spcAft>
+              <a:buClr>
+                <a:schemeClr val="dk1"/>
+              </a:buClr>
+              <a:buSzPts val="1100"/>
+              <a:buNone/>
+            </a:pPr>
+            <a:endParaRPr lang="en" dirty="0">
               <a:solidFill>
                 <a:schemeClr val="dk1"/>
               </a:solidFill>
             </a:endParaRPr>
           </a:p>
           <a:p>
-            <a:pPr marL="457200" lvl="0" indent="-298450" algn="l" rtl="0">
+            <a:pPr marL="158750" lvl="0" indent="0" algn="l" rtl="0">
               <a:spcBef>
                 <a:spcPts val="0"/>
               </a:spcBef>
@@ -1255,63 +1227,7 @@
                 <a:schemeClr val="dk1"/>
               </a:buClr>
               <a:buSzPts val="1100"/>
-              <a:buChar char="-"/>
-            </a:pPr>
-            <a:r>
-              <a:rPr lang="en" dirty="0">
-                <a:solidFill>
-                  <a:schemeClr val="dk1"/>
-                </a:solidFill>
-              </a:rPr>
-              <a:t>Focused music playlists </a:t>
-            </a:r>
-            <a:endParaRPr dirty="0">
-              <a:solidFill>
-                <a:schemeClr val="dk1"/>
-              </a:solidFill>
-            </a:endParaRPr>
-          </a:p>
-          <a:p>
-            <a:pPr marL="457200" lvl="0" indent="-298450" algn="l" rtl="0">
-              <a:spcBef>
-                <a:spcPts val="0"/>
-              </a:spcBef>
-              <a:spcAft>
-                <a:spcPts val="0"/>
-              </a:spcAft>
-              <a:buClr>
-                <a:schemeClr val="dk1"/>
-              </a:buClr>
-              <a:buSzPts val="1100"/>
-              <a:buChar char="-"/>
-            </a:pPr>
-            <a:r>
-              <a:rPr lang="en" dirty="0">
-                <a:solidFill>
-                  <a:schemeClr val="dk1"/>
-                </a:solidFill>
-              </a:rPr>
-              <a:t>Content designed to address specific areas such as stress, sleep, anxiety, focus, and relationships</a:t>
-            </a:r>
-            <a:endParaRPr dirty="0">
-              <a:solidFill>
-                <a:schemeClr val="dk1"/>
-              </a:solidFill>
-            </a:endParaRPr>
-          </a:p>
-          <a:p>
-            <a:pPr marL="457200" lvl="0" indent="-298450" algn="l" rtl="0">
-              <a:spcBef>
-                <a:spcPts val="0"/>
-              </a:spcBef>
-              <a:spcAft>
-                <a:spcPts val="0"/>
-              </a:spcAft>
-              <a:buClr>
-                <a:schemeClr val="dk1"/>
-              </a:buClr>
-              <a:buSzPts val="1100"/>
-              <a:buChar char="-"/>
+              <a:buNone/>
             </a:pPr>
             <a:r>
               <a:rPr lang="en" dirty="0">
@@ -1324,23 +1240,6 @@
             <a:r>
               <a:rPr lang="en" dirty="0"/>
               <a:t>user-friendly interface, it’s high-quality content, effective approach to meditation … </a:t>
-            </a:r>
-            <a:endParaRPr dirty="0"/>
-          </a:p>
-          <a:p>
-            <a:pPr marL="457200" lvl="0" indent="-298450" algn="l" rtl="0">
-              <a:spcBef>
-                <a:spcPts val="0"/>
-              </a:spcBef>
-              <a:spcAft>
-                <a:spcPts val="0"/>
-              </a:spcAft>
-              <a:buSzPts val="1100"/>
-              <a:buChar char="-"/>
-            </a:pPr>
-            <a:r>
-              <a:rPr lang="en" dirty="0"/>
-              <a:t>Offers a combination of free and premium content. Premium content requires a paid subscription</a:t>
             </a:r>
             <a:endParaRPr dirty="0"/>
           </a:p>
@@ -1366,7 +1265,7 @@
 </p:notes>
 </file>
 
-<file path=ppt/notesSlides/notesSlide4.xml><?xml version="1.0" encoding="utf-8"?>
+<file path=ppt/notesSlides/notesSlide3.xml><?xml version="1.0" encoding="utf-8"?>
 <p:notes xmlns:a="http://schemas.openxmlformats.org/drawingml/2006/main" xmlns:r="http://schemas.openxmlformats.org/officeDocument/2006/relationships" xmlns:p="http://schemas.openxmlformats.org/presentationml/2006/main" showMasterSp="0" showMasterPhAnim="0">
   <p:cSld>
     <p:spTree>
@@ -1395,7 +1294,7 @@
         </p:nvSpPr>
         <p:spPr>
           <a:xfrm>
-            <a:off x="381300" y="685800"/>
+            <a:off x="381000" y="685800"/>
             <a:ext cx="6096000" cy="3429000"/>
           </a:xfrm>
           <a:custGeom>
@@ -1478,14 +1377,14 @@
               <a:buNone/>
             </a:pPr>
             <a:r>
-              <a:rPr lang="en">
+              <a:rPr lang="en" dirty="0">
                 <a:solidFill>
                   <a:schemeClr val="dk1"/>
                 </a:solidFill>
               </a:rPr>
-              <a:t>“Before we dive what the Headspace team needs from us, let’s take a moment to talk only for a second about what marketing teams call organic and paid acquisition.” </a:t>
-            </a:r>
-            <a:endParaRPr>
+              <a:t>“Before we dive into what the Headspace marketing team needs from us, let’s take a moment to talk only for a second about what they call organic and paid acquisition.” </a:t>
+            </a:r>
+            <a:endParaRPr dirty="0">
               <a:solidFill>
                 <a:schemeClr val="dk1"/>
               </a:solidFill>
@@ -1505,7 +1404,7 @@
               <a:buSzPts val="1100"/>
               <a:buNone/>
             </a:pPr>
-            <a:endParaRPr>
+            <a:endParaRPr dirty="0">
               <a:solidFill>
                 <a:schemeClr val="dk1"/>
               </a:solidFill>
@@ -1521,7 +1420,7 @@
 </p:notes>
 </file>
 
-<file path=ppt/notesSlides/notesSlide5.xml><?xml version="1.0" encoding="utf-8"?>
+<file path=ppt/notesSlides/notesSlide4.xml><?xml version="1.0" encoding="utf-8"?>
 <p:notes xmlns:a="http://schemas.openxmlformats.org/drawingml/2006/main" xmlns:r="http://schemas.openxmlformats.org/officeDocument/2006/relationships" xmlns:p="http://schemas.openxmlformats.org/presentationml/2006/main" showMasterSp="0" showMasterPhAnim="0">
   <p:cSld>
     <p:spTree>
@@ -1550,7 +1449,7 @@
         </p:nvSpPr>
         <p:spPr>
           <a:xfrm>
-            <a:off x="381300" y="685800"/>
+            <a:off x="381000" y="685800"/>
             <a:ext cx="6096000" cy="3429000"/>
           </a:xfrm>
           <a:custGeom>
@@ -1633,14 +1532,30 @@
               <a:buNone/>
             </a:pPr>
             <a:r>
-              <a:rPr lang="en">
+              <a:rPr lang="en" dirty="0">
                 <a:solidFill>
                   <a:schemeClr val="dk1"/>
                 </a:solidFill>
               </a:rPr>
               <a:t>Organic acquisition: </a:t>
             </a:r>
-            <a:endParaRPr>
+          </a:p>
+          <a:p>
+            <a:pPr marL="0" lvl="0" indent="0" algn="l" rtl="0">
+              <a:spcBef>
+                <a:spcPts val="0"/>
+              </a:spcBef>
+              <a:spcAft>
+                <a:spcPts val="0"/>
+              </a:spcAft>
+              <a:buClr>
+                <a:schemeClr val="dk1"/>
+              </a:buClr>
+              <a:buSzPts val="1100"/>
+              <a:buFont typeface="Arial"/>
+              <a:buNone/>
+            </a:pPr>
+            <a:endParaRPr dirty="0">
               <a:solidFill>
                 <a:schemeClr val="dk1"/>
               </a:solidFill>
@@ -1661,14 +1576,14 @@
               <a:buChar char="-"/>
             </a:pPr>
             <a:r>
-              <a:rPr lang="en">
+              <a:rPr lang="en" dirty="0">
                 <a:solidFill>
                   <a:schemeClr val="dk1"/>
                 </a:solidFill>
               </a:rPr>
               <a:t>generates traffic to your business overtime for free </a:t>
             </a:r>
-            <a:endParaRPr>
+            <a:endParaRPr dirty="0">
               <a:solidFill>
                 <a:schemeClr val="dk1"/>
               </a:solidFill>
@@ -1689,14 +1604,14 @@
               <a:buChar char="-"/>
             </a:pPr>
             <a:r>
-              <a:rPr lang="en">
+              <a:rPr lang="en" dirty="0">
                 <a:solidFill>
                   <a:schemeClr val="dk1"/>
                 </a:solidFill>
               </a:rPr>
               <a:t>Goal: (typically) to build brand awareness. </a:t>
             </a:r>
-            <a:endParaRPr>
+            <a:endParaRPr dirty="0">
               <a:solidFill>
                 <a:schemeClr val="dk1"/>
               </a:solidFill>
@@ -1717,14 +1632,14 @@
               <a:buChar char="-"/>
             </a:pPr>
             <a:r>
-              <a:rPr lang="en">
+              <a:rPr lang="en" dirty="0">
                 <a:solidFill>
                   <a:schemeClr val="dk1"/>
                 </a:solidFill>
               </a:rPr>
               <a:t>Internet search/SEO</a:t>
             </a:r>
-            <a:endParaRPr>
+            <a:endParaRPr dirty="0">
               <a:solidFill>
                 <a:schemeClr val="dk1"/>
               </a:solidFill>
@@ -1745,14 +1660,14 @@
               <a:buChar char="-"/>
             </a:pPr>
             <a:r>
-              <a:rPr lang="en">
+              <a:rPr lang="en" dirty="0">
                 <a:solidFill>
                   <a:schemeClr val="dk1"/>
                 </a:solidFill>
               </a:rPr>
               <a:t>Blogging</a:t>
             </a:r>
-            <a:endParaRPr>
+            <a:endParaRPr dirty="0">
               <a:solidFill>
                 <a:schemeClr val="dk1"/>
               </a:solidFill>
@@ -1773,14 +1688,14 @@
               <a:buChar char="-"/>
             </a:pPr>
             <a:r>
-              <a:rPr lang="en">
+              <a:rPr lang="en" dirty="0">
                 <a:solidFill>
                   <a:schemeClr val="dk1"/>
                 </a:solidFill>
               </a:rPr>
               <a:t>Social media</a:t>
             </a:r>
-            <a:endParaRPr>
+            <a:endParaRPr dirty="0">
               <a:solidFill>
                 <a:schemeClr val="dk1"/>
               </a:solidFill>
@@ -1801,14 +1716,14 @@
               <a:buChar char="-"/>
             </a:pPr>
             <a:r>
-              <a:rPr lang="en">
+              <a:rPr lang="en" dirty="0">
                 <a:solidFill>
                   <a:schemeClr val="dk1"/>
                 </a:solidFill>
               </a:rPr>
               <a:t>Emails</a:t>
             </a:r>
-            <a:endParaRPr>
+            <a:endParaRPr dirty="0">
               <a:solidFill>
                 <a:schemeClr val="dk1"/>
               </a:solidFill>
@@ -1829,14 +1744,14 @@
               <a:buChar char="-"/>
             </a:pPr>
             <a:r>
-              <a:rPr lang="en">
+              <a:rPr lang="en" dirty="0">
                 <a:solidFill>
                   <a:schemeClr val="dk1"/>
                 </a:solidFill>
               </a:rPr>
               <a:t>Referrals </a:t>
             </a:r>
-            <a:endParaRPr>
+            <a:endParaRPr dirty="0">
               <a:solidFill>
                 <a:schemeClr val="dk1"/>
               </a:solidFill>
@@ -1857,14 +1772,14 @@
               <a:buChar char="-"/>
             </a:pPr>
             <a:r>
-              <a:rPr lang="en">
+              <a:rPr lang="en" dirty="0">
                 <a:solidFill>
                   <a:schemeClr val="dk1"/>
                 </a:solidFill>
               </a:rPr>
               <a:t>Influencer marketing</a:t>
             </a:r>
-            <a:endParaRPr>
+            <a:endParaRPr dirty="0">
               <a:solidFill>
                 <a:schemeClr val="dk1"/>
               </a:solidFill>
@@ -1885,42 +1800,13 @@
               <a:buChar char="-"/>
             </a:pPr>
             <a:r>
-              <a:rPr lang="en">
+              <a:rPr lang="en" dirty="0">
                 <a:solidFill>
                   <a:schemeClr val="dk1"/>
                 </a:solidFill>
               </a:rPr>
               <a:t>Longer term play </a:t>
             </a:r>
-            <a:endParaRPr>
-              <a:solidFill>
-                <a:schemeClr val="dk1"/>
-              </a:solidFill>
-            </a:endParaRPr>
-          </a:p>
-          <a:p>
-            <a:pPr marL="0" lvl="0" indent="0" algn="l" rtl="0">
-              <a:spcBef>
-                <a:spcPts val="0"/>
-              </a:spcBef>
-              <a:spcAft>
-                <a:spcPts val="0"/>
-              </a:spcAft>
-              <a:buNone/>
-            </a:pPr>
-            <a:r>
-              <a:rPr lang="en">
-                <a:solidFill>
-                  <a:schemeClr val="dk1"/>
-                </a:solidFill>
-              </a:rPr>
-              <a:t>Paid acquisition:</a:t>
-            </a:r>
-            <a:endParaRPr>
-              <a:solidFill>
-                <a:schemeClr val="dk1"/>
-              </a:solidFill>
-            </a:endParaRPr>
           </a:p>
           <a:p>
             <a:pPr marL="457200" lvl="0" indent="-298450" algn="l" rtl="0">
@@ -1936,15 +1822,31 @@
               <a:buSzPts val="1100"/>
               <a:buChar char="-"/>
             </a:pPr>
-            <a:r>
-              <a:rPr lang="en">
+            <a:endParaRPr dirty="0">
+              <a:solidFill>
+                <a:schemeClr val="dk1"/>
+              </a:solidFill>
+            </a:endParaRPr>
+          </a:p>
+          <a:p>
+            <a:pPr marL="0" lvl="0" indent="0" algn="l" rtl="0">
+              <a:spcBef>
+                <a:spcPts val="0"/>
+              </a:spcBef>
+              <a:spcAft>
+                <a:spcPts val="0"/>
+              </a:spcAft>
+              <a:buNone/>
+            </a:pPr>
+            <a:r>
+              <a:rPr lang="en" dirty="0">
                 <a:solidFill>
                   <a:schemeClr val="dk1"/>
                 </a:solidFill>
               </a:rPr>
-              <a:t>generates traffic to your business quickly through paid ads. </a:t>
-            </a:r>
-            <a:endParaRPr>
+              <a:t>Paid acquisition:</a:t>
+            </a:r>
+            <a:endParaRPr dirty="0">
               <a:solidFill>
                 <a:schemeClr val="dk1"/>
               </a:solidFill>
@@ -1965,14 +1867,14 @@
               <a:buChar char="-"/>
             </a:pPr>
             <a:r>
-              <a:rPr lang="en">
+              <a:rPr lang="en" dirty="0">
                 <a:solidFill>
                   <a:schemeClr val="dk1"/>
                 </a:solidFill>
               </a:rPr>
-              <a:t>Goal: (typically) to convert audience into sales or leads. </a:t>
-            </a:r>
-            <a:endParaRPr>
+              <a:t>generates traffic to your business quickly through paid ads. </a:t>
+            </a:r>
+            <a:endParaRPr dirty="0">
               <a:solidFill>
                 <a:schemeClr val="dk1"/>
               </a:solidFill>
@@ -1993,14 +1895,14 @@
               <a:buChar char="-"/>
             </a:pPr>
             <a:r>
-              <a:rPr lang="en">
+              <a:rPr lang="en" dirty="0">
                 <a:solidFill>
                   <a:schemeClr val="dk1"/>
                 </a:solidFill>
               </a:rPr>
-              <a:t>social media ads</a:t>
-            </a:r>
-            <a:endParaRPr>
+              <a:t>Goal: (typically) to convert audience into sales or leads. </a:t>
+            </a:r>
+            <a:endParaRPr dirty="0">
               <a:solidFill>
                 <a:schemeClr val="dk1"/>
               </a:solidFill>
@@ -2021,14 +1923,14 @@
               <a:buChar char="-"/>
             </a:pPr>
             <a:r>
-              <a:rPr lang="en">
+              <a:rPr lang="en" dirty="0">
                 <a:solidFill>
                   <a:schemeClr val="dk1"/>
                 </a:solidFill>
               </a:rPr>
-              <a:t>Google ads</a:t>
-            </a:r>
-            <a:endParaRPr>
+              <a:t>social media ads</a:t>
+            </a:r>
+            <a:endParaRPr dirty="0">
               <a:solidFill>
                 <a:schemeClr val="dk1"/>
               </a:solidFill>
@@ -2049,14 +1951,14 @@
               <a:buChar char="-"/>
             </a:pPr>
             <a:r>
-              <a:rPr lang="en">
+              <a:rPr lang="en" dirty="0">
                 <a:solidFill>
                   <a:schemeClr val="dk1"/>
                 </a:solidFill>
               </a:rPr>
-              <a:t>TV commercials</a:t>
-            </a:r>
-            <a:endParaRPr>
+              <a:t>Google ads</a:t>
+            </a:r>
+            <a:endParaRPr dirty="0">
               <a:solidFill>
                 <a:schemeClr val="dk1"/>
               </a:solidFill>
@@ -2077,14 +1979,14 @@
               <a:buChar char="-"/>
             </a:pPr>
             <a:r>
-              <a:rPr lang="en">
+              <a:rPr lang="en" dirty="0">
                 <a:solidFill>
                   <a:schemeClr val="dk1"/>
                 </a:solidFill>
               </a:rPr>
-              <a:t>Print ads</a:t>
-            </a:r>
-            <a:endParaRPr>
+              <a:t>TV commercials</a:t>
+            </a:r>
+            <a:endParaRPr dirty="0">
               <a:solidFill>
                 <a:schemeClr val="dk1"/>
               </a:solidFill>
@@ -2105,20 +2007,48 @@
               <a:buChar char="-"/>
             </a:pPr>
             <a:r>
-              <a:rPr lang="en">
+              <a:rPr lang="en" dirty="0">
                 <a:solidFill>
                   <a:schemeClr val="dk1"/>
                 </a:solidFill>
               </a:rPr>
-              <a:t>Billboards</a:t>
-            </a:r>
-            <a:endParaRPr>
+              <a:t>Print ads</a:t>
+            </a:r>
+            <a:endParaRPr dirty="0">
               <a:solidFill>
                 <a:schemeClr val="dk1"/>
               </a:solidFill>
             </a:endParaRPr>
           </a:p>
           <a:p>
+            <a:pPr marL="457200" lvl="0" indent="-298450" algn="l" rtl="0">
+              <a:spcBef>
+                <a:spcPts val="0"/>
+              </a:spcBef>
+              <a:spcAft>
+                <a:spcPts val="0"/>
+              </a:spcAft>
+              <a:buClr>
+                <a:schemeClr val="dk1"/>
+              </a:buClr>
+              <a:buSzPts val="1100"/>
+              <a:buChar char="-"/>
+            </a:pPr>
+            <a:r>
+              <a:rPr lang="en" dirty="0">
+                <a:solidFill>
+                  <a:schemeClr val="dk1"/>
+                </a:solidFill>
+              </a:rPr>
+              <a:t>Billboards</a:t>
+            </a:r>
+            <a:endParaRPr dirty="0">
+              <a:solidFill>
+                <a:schemeClr val="dk1"/>
+              </a:solidFill>
+            </a:endParaRPr>
+          </a:p>
+          <a:p>
             <a:pPr marL="0" lvl="0" indent="0" algn="l" rtl="0">
               <a:spcBef>
                 <a:spcPts val="0"/>
@@ -2128,7 +2058,7 @@
               </a:spcAft>
               <a:buNone/>
             </a:pPr>
-            <a:endParaRPr>
+            <a:endParaRPr dirty="0">
               <a:solidFill>
                 <a:schemeClr val="dk1"/>
               </a:solidFill>
@@ -2150,7 +2080,7 @@
               <a:buNone/>
             </a:pPr>
             <a:r>
-              <a:rPr lang="en" b="1">
+              <a:rPr lang="en" b="1" dirty="0">
                 <a:solidFill>
                   <a:schemeClr val="dk1"/>
                 </a:solidFill>
@@ -2158,7 +2088,7 @@
               <a:t>Note to candidate: </a:t>
             </a:r>
             <a:r>
-              <a:rPr lang="en">
+              <a:rPr lang="en" dirty="0">
                 <a:solidFill>
                   <a:schemeClr val="dk1"/>
                 </a:solidFill>
@@ -2166,7 +2096,7 @@
               <a:t>This is a </a:t>
             </a:r>
             <a:r>
-              <a:rPr lang="en" i="1">
+              <a:rPr lang="en" i="1" dirty="0">
                 <a:solidFill>
                   <a:schemeClr val="dk1"/>
                 </a:solidFill>
@@ -2174,14 +2104,14 @@
               <a:t>great </a:t>
             </a:r>
             <a:r>
-              <a:rPr lang="en">
+              <a:rPr lang="en" dirty="0">
                 <a:solidFill>
                   <a:schemeClr val="dk1"/>
                 </a:solidFill>
               </a:rPr>
               <a:t>spot to engage your students!</a:t>
             </a:r>
-            <a:endParaRPr>
+            <a:endParaRPr dirty="0">
               <a:solidFill>
                 <a:schemeClr val="dk1"/>
               </a:solidFill>
@@ -2200,7 +2130,7 @@
               </a:spcAft>
               <a:buNone/>
             </a:pPr>
-            <a:endParaRPr>
+            <a:endParaRPr dirty="0">
               <a:solidFill>
                 <a:schemeClr val="dk1"/>
               </a:solidFill>
@@ -2216,7 +2146,7 @@
 </p:notes>
 </file>
 
-<file path=ppt/notesSlides/notesSlide6.xml><?xml version="1.0" encoding="utf-8"?>
+<file path=ppt/notesSlides/notesSlide5.xml><?xml version="1.0" encoding="utf-8"?>
 <p:notes xmlns:a="http://schemas.openxmlformats.org/drawingml/2006/main" xmlns:r="http://schemas.openxmlformats.org/officeDocument/2006/relationships" xmlns:p="http://schemas.openxmlformats.org/presentationml/2006/main" showMasterSp="0" showMasterPhAnim="0">
   <p:cSld>
     <p:spTree>
@@ -2309,18 +2239,34 @@
               <a:buNone/>
             </a:pPr>
             <a:r>
-              <a:rPr lang="en">
+              <a:rPr lang="en" dirty="0">
                 <a:solidFill>
                   <a:schemeClr val="dk1"/>
                 </a:solidFill>
               </a:rPr>
-              <a:t>Present goal of LiveLab to students: t</a:t>
-            </a:r>
-            <a:r>
-              <a:rPr lang="en"/>
+              <a:t>Present goal of </a:t>
+            </a:r>
+            <a:r>
+              <a:rPr lang="en" dirty="0" err="1">
+                <a:solidFill>
+                  <a:schemeClr val="dk1"/>
+                </a:solidFill>
+              </a:rPr>
+              <a:t>LiveLab</a:t>
+            </a:r>
+            <a:r>
+              <a:rPr lang="en" dirty="0">
+                <a:solidFill>
+                  <a:schemeClr val="dk1"/>
+                </a:solidFill>
+              </a:rPr>
+              <a:t> to students: t</a:t>
+            </a:r>
+            <a:r>
+              <a:rPr lang="en" dirty="0"/>
               <a:t>he Headspace marketing team is super interested in gaining insights on the conversion rates of organic acquisitions compared to paid acquisitions in terms of becoming paid subscribers. </a:t>
             </a:r>
-            <a:endParaRPr/>
+            <a:endParaRPr dirty="0"/>
           </a:p>
           <a:p>
             <a:pPr marL="0" lvl="0" indent="0" algn="l" rtl="0">
@@ -2332,7 +2278,7 @@
               </a:spcAft>
               <a:buNone/>
             </a:pPr>
-            <a:endParaRPr/>
+            <a:endParaRPr dirty="0"/>
           </a:p>
           <a:p>
             <a:pPr marL="0" lvl="0" indent="0" algn="l" rtl="0">
@@ -2345,10 +2291,10 @@
               <a:buNone/>
             </a:pPr>
             <a:r>
-              <a:rPr lang="en"/>
+              <a:rPr lang="en" dirty="0"/>
               <a:t>They believe a better understanding of this will provide valuable insights for future marketing strategies. </a:t>
             </a:r>
-            <a:endParaRPr/>
+            <a:endParaRPr dirty="0"/>
           </a:p>
           <a:p>
             <a:pPr marL="0" lvl="0" indent="0" algn="l" rtl="0">
@@ -2360,79 +2306,233 @@
               </a:spcAft>
               <a:buNone/>
             </a:pPr>
-            <a:endParaRPr/>
-          </a:p>
-          <a:p>
-            <a:pPr marL="0" lvl="0" indent="0" algn="l" rtl="0">
-              <a:spcBef>
-                <a:spcPts val="0"/>
-              </a:spcBef>
-              <a:spcAft>
-                <a:spcPts val="0"/>
-              </a:spcAft>
-              <a:buNone/>
-            </a:pPr>
-            <a:r>
-              <a:rPr lang="en" b="1"/>
-              <a:t>Note to candidate: </a:t>
-            </a:r>
-            <a:r>
-              <a:rPr lang="en"/>
-              <a:t>Transition here to the .ipynb file, walk through the remainder of the LiveLab! We’ve given you a file with solutions in it, but in your sample teach, those solutions should not be there. You’ll arrive at the solutions </a:t>
-            </a:r>
-            <a:r>
-              <a:rPr lang="en" i="1"/>
-              <a:t>with your students.</a:t>
-            </a:r>
-            <a:r>
-              <a:rPr lang="en"/>
-              <a:t> Keep this scenario top of mind. Students </a:t>
-            </a:r>
-            <a:r>
-              <a:rPr lang="en" b="1"/>
-              <a:t>always</a:t>
-            </a:r>
-            <a:r>
-              <a:rPr lang="en"/>
-              <a:t> like to know </a:t>
-            </a:r>
-            <a:r>
-              <a:rPr lang="en" i="1"/>
-              <a:t>why</a:t>
-            </a:r>
-            <a:r>
-              <a:rPr lang="en"/>
-              <a:t> they are doing something. And </a:t>
-            </a:r>
-            <a:r>
-              <a:rPr lang="en">
-                <a:solidFill>
-                  <a:schemeClr val="dk1"/>
-                </a:solidFill>
-              </a:rPr>
-              <a:t> remember: LiveLab is </a:t>
-            </a:r>
-            <a:r>
-              <a:rPr lang="en" b="1">
-                <a:solidFill>
-                  <a:schemeClr val="dk1"/>
-                </a:solidFill>
-              </a:rPr>
-              <a:t>not</a:t>
-            </a:r>
-            <a:r>
-              <a:rPr lang="en">
-                <a:solidFill>
-                  <a:schemeClr val="dk1"/>
-                </a:solidFill>
-              </a:rPr>
-              <a:t> where students are learning content for the first time, it’s where they’re applying what they’re learning in parallel. </a:t>
-            </a:r>
-            <a:endParaRPr/>
+            <a:endParaRPr dirty="0"/>
           </a:p>
         </p:txBody>
       </p:sp>
     </p:spTree>
+  </p:cSld>
+  <p:clrMapOvr>
+    <a:masterClrMapping/>
+  </p:clrMapOvr>
+</p:notes>
+</file>
+
+<file path=ppt/notesSlides/notesSlide6.xml><?xml version="1.0" encoding="utf-8"?>
+<p:notes xmlns:a="http://schemas.openxmlformats.org/drawingml/2006/main" xmlns:r="http://schemas.openxmlformats.org/officeDocument/2006/relationships" xmlns:p="http://schemas.openxmlformats.org/presentationml/2006/main" showMasterSp="0" showMasterPhAnim="0">
+  <p:cSld>
+    <p:spTree>
+      <p:nvGrpSpPr>
+        <p:cNvPr id="1" name="Shape 93">
+          <a:extLst>
+            <a:ext uri="{FF2B5EF4-FFF2-40B4-BE49-F238E27FC236}">
+              <a16:creationId xmlns:a16="http://schemas.microsoft.com/office/drawing/2014/main" id="{8DA1123D-797C-49D1-E811-D6E17BE18E11}"/>
+            </a:ext>
+          </a:extLst>
+        </p:cNvPr>
+        <p:cNvGrpSpPr/>
+        <p:nvPr/>
+      </p:nvGrpSpPr>
+      <p:grpSpPr>
+        <a:xfrm>
+          <a:off x="0" y="0"/>
+          <a:ext cx="0" cy="0"/>
+          <a:chOff x="0" y="0"/>
+          <a:chExt cx="0" cy="0"/>
+        </a:xfrm>
+      </p:grpSpPr>
+      <p:sp>
+        <p:nvSpPr>
+          <p:cNvPr id="94" name="Google Shape;94;g24cca0ebfde_0_218:notes">
+            <a:extLst>
+              <a:ext uri="{FF2B5EF4-FFF2-40B4-BE49-F238E27FC236}">
+                <a16:creationId xmlns:a16="http://schemas.microsoft.com/office/drawing/2014/main" id="{F128EE63-F996-9D1A-0E23-BA235673FA40}"/>
+              </a:ext>
+            </a:extLst>
+          </p:cNvPr>
+          <p:cNvSpPr>
+            <a:spLocks noGrp="1" noRot="1" noChangeAspect="1"/>
+          </p:cNvSpPr>
+          <p:nvPr>
+            <p:ph type="sldImg" idx="2"/>
+          </p:nvPr>
+        </p:nvSpPr>
+        <p:spPr>
+          <a:xfrm>
+            <a:off x="381000" y="685800"/>
+            <a:ext cx="6096000" cy="3429000"/>
+          </a:xfrm>
+          <a:custGeom>
+            <a:avLst/>
+            <a:gdLst/>
+            <a:ahLst/>
+            <a:cxnLst/>
+            <a:rect l="l" t="t" r="r" b="b"/>
+            <a:pathLst>
+              <a:path w="120000" h="120000" extrusionOk="0">
+                <a:moveTo>
+                  <a:pt x="0" y="0"/>
+                </a:moveTo>
+                <a:lnTo>
+                  <a:pt x="120000" y="0"/>
+                </a:lnTo>
+                <a:lnTo>
+                  <a:pt x="120000" y="120000"/>
+                </a:lnTo>
+                <a:lnTo>
+                  <a:pt x="0" y="120000"/>
+                </a:lnTo>
+                <a:close/>
+              </a:path>
+            </a:pathLst>
+          </a:custGeom>
+        </p:spPr>
+      </p:sp>
+      <p:sp>
+        <p:nvSpPr>
+          <p:cNvPr id="95" name="Google Shape;95;g24cca0ebfde_0_218:notes">
+            <a:extLst>
+              <a:ext uri="{FF2B5EF4-FFF2-40B4-BE49-F238E27FC236}">
+                <a16:creationId xmlns:a16="http://schemas.microsoft.com/office/drawing/2014/main" id="{47B63B01-D392-B19A-D5E7-6B5FB702AA78}"/>
+              </a:ext>
+            </a:extLst>
+          </p:cNvPr>
+          <p:cNvSpPr txBox="1">
+            <a:spLocks noGrp="1"/>
+          </p:cNvSpPr>
+          <p:nvPr>
+            <p:ph type="body" idx="1"/>
+          </p:nvPr>
+        </p:nvSpPr>
+        <p:spPr>
+          <a:xfrm>
+            <a:off x="685800" y="4343400"/>
+            <a:ext cx="5486400" cy="4114800"/>
+          </a:xfrm>
+          <a:prstGeom prst="rect">
+            <a:avLst/>
+          </a:prstGeom>
+        </p:spPr>
+        <p:txBody>
+          <a:bodyPr spcFirstLastPara="1" wrap="square" lIns="91425" tIns="91425" rIns="91425" bIns="91425" anchor="t" anchorCtr="0">
+            <a:noAutofit/>
+          </a:bodyPr>
+          <a:lstStyle/>
+          <a:p>
+            <a:pPr marL="0" lvl="0" indent="0" algn="l" rtl="0">
+              <a:spcBef>
+                <a:spcPts val="0"/>
+              </a:spcBef>
+              <a:spcAft>
+                <a:spcPts val="0"/>
+              </a:spcAft>
+              <a:buNone/>
+            </a:pPr>
+            <a:r>
+              <a:rPr lang="en-US" dirty="0">
+                <a:solidFill>
+                  <a:schemeClr val="dk1"/>
+                </a:solidFill>
+              </a:rPr>
+              <a:t>What is the absolute first task a data analyst must complete when starting a data project?  Answer: Look at the available data.  </a:t>
+            </a:r>
+          </a:p>
+          <a:p>
+            <a:pPr marL="0" lvl="0" indent="0" algn="l" rtl="0">
+              <a:spcBef>
+                <a:spcPts val="0"/>
+              </a:spcBef>
+              <a:spcAft>
+                <a:spcPts val="0"/>
+              </a:spcAft>
+              <a:buNone/>
+            </a:pPr>
+            <a:endParaRPr lang="en-US" dirty="0">
+              <a:solidFill>
+                <a:schemeClr val="dk1"/>
+              </a:solidFill>
+            </a:endParaRPr>
+          </a:p>
+          <a:p>
+            <a:pPr marL="0" marR="0" lvl="0" indent="0" algn="l" defTabSz="914400" rtl="0" eaLnBrk="1" fontAlgn="auto" latinLnBrk="0" hangingPunct="1">
+              <a:lnSpc>
+                <a:spcPct val="100000"/>
+              </a:lnSpc>
+              <a:spcBef>
+                <a:spcPts val="0"/>
+              </a:spcBef>
+              <a:spcAft>
+                <a:spcPts val="0"/>
+              </a:spcAft>
+              <a:buClr>
+                <a:srgbClr val="000000"/>
+              </a:buClr>
+              <a:buSzPts val="1100"/>
+              <a:buFont typeface="Arial"/>
+              <a:buNone/>
+              <a:tabLst/>
+              <a:defRPr/>
+            </a:pPr>
+            <a:r>
+              <a:rPr lang="en-US" dirty="0"/>
+              <a:t>What columns or features will be helpful to us in solving the problem?</a:t>
+            </a:r>
+          </a:p>
+          <a:p>
+            <a:pPr marL="0" lvl="0" indent="0" algn="l" rtl="0">
+              <a:spcBef>
+                <a:spcPts val="0"/>
+              </a:spcBef>
+              <a:spcAft>
+                <a:spcPts val="0"/>
+              </a:spcAft>
+              <a:buNone/>
+            </a:pPr>
+            <a:endParaRPr lang="en-US" dirty="0">
+              <a:solidFill>
+                <a:schemeClr val="dk1"/>
+              </a:solidFill>
+            </a:endParaRPr>
+          </a:p>
+          <a:p>
+            <a:pPr marL="0" lvl="0" indent="0" algn="l" rtl="0">
+              <a:spcBef>
+                <a:spcPts val="0"/>
+              </a:spcBef>
+              <a:spcAft>
+                <a:spcPts val="0"/>
+              </a:spcAft>
+              <a:buNone/>
+            </a:pPr>
+            <a:r>
+              <a:rPr lang="en-US" dirty="0">
+                <a:solidFill>
+                  <a:schemeClr val="dk1"/>
+                </a:solidFill>
+              </a:rPr>
+              <a:t>Any thoughts as to how we can use these two columns to calculate conversion rates?</a:t>
+            </a:r>
+          </a:p>
+          <a:p>
+            <a:pPr marL="0" lvl="0" indent="0" algn="l" rtl="0">
+              <a:spcBef>
+                <a:spcPts val="0"/>
+              </a:spcBef>
+              <a:spcAft>
+                <a:spcPts val="0"/>
+              </a:spcAft>
+              <a:buNone/>
+            </a:pPr>
+            <a:endParaRPr lang="en-US" dirty="0"/>
+          </a:p>
+        </p:txBody>
+      </p:sp>
+    </p:spTree>
+    <p:extLst>
+      <p:ext uri="{BB962C8B-B14F-4D97-AF65-F5344CB8AC3E}">
+        <p14:creationId xmlns:p14="http://schemas.microsoft.com/office/powerpoint/2010/main" val="130657084"/>
+      </p:ext>
+    </p:extLst>
   </p:cSld>
   <p:clrMapOvr>
     <a:masterClrMapping/>
@@ -2562,29 +2662,38 @@
               <a:spcAft>
                 <a:spcPts val="0"/>
               </a:spcAft>
-              <a:buClr>
-                <a:schemeClr val="dk1"/>
-              </a:buClr>
-              <a:buSzPts val="1100"/>
-              <a:buFont typeface="Arial"/>
               <a:buNone/>
             </a:pPr>
             <a:r>
-              <a:rPr lang="en" dirty="0">
+              <a:rPr lang="en-US" dirty="0">
                 <a:solidFill>
                   <a:schemeClr val="dk1"/>
                 </a:solidFill>
               </a:rPr>
-              <a:t>Organic acquisition: </a:t>
-            </a:r>
-            <a:endParaRPr dirty="0">
+              <a:t>Engage students here.  How do we calculate conversion rates for each acquisition channel?</a:t>
+            </a:r>
+          </a:p>
+          <a:p>
+            <a:pPr marL="0" lvl="0" indent="0" algn="l" rtl="0">
+              <a:spcBef>
+                <a:spcPts val="0"/>
+              </a:spcBef>
+              <a:spcAft>
+                <a:spcPts val="0"/>
+              </a:spcAft>
+              <a:buNone/>
+            </a:pPr>
+            <a:endParaRPr lang="en-US" dirty="0">
               <a:solidFill>
                 <a:schemeClr val="dk1"/>
               </a:solidFill>
             </a:endParaRPr>
           </a:p>
           <a:p>
-            <a:pPr marL="457200" lvl="0" indent="-298450" algn="l" rtl="0">
+            <a:pPr marL="0" marR="0" lvl="0" indent="0" algn="l" defTabSz="914400" rtl="0" eaLnBrk="1" fontAlgn="auto" latinLnBrk="0" hangingPunct="1">
+              <a:lnSpc>
+                <a:spcPct val="100000"/>
+              </a:lnSpc>
               <a:spcBef>
                 <a:spcPts val="0"/>
               </a:spcBef>
@@ -2592,540 +2701,103 @@
                 <a:spcPts val="0"/>
               </a:spcAft>
               <a:buClr>
-                <a:schemeClr val="dk1"/>
-              </a:buClr>
-              <a:buSzPts val="1100"/>
-              <a:buChar char="-"/>
-            </a:pPr>
-            <a:r>
-              <a:rPr lang="en" dirty="0">
-                <a:solidFill>
-                  <a:schemeClr val="dk1"/>
-                </a:solidFill>
-              </a:rPr>
-              <a:t>generates traffic to your business overtime for free </a:t>
-            </a:r>
-            <a:endParaRPr dirty="0">
-              <a:solidFill>
-                <a:schemeClr val="dk1"/>
-              </a:solidFill>
-            </a:endParaRPr>
-          </a:p>
-          <a:p>
-            <a:pPr marL="457200" lvl="0" indent="-298450" algn="l" rtl="0">
-              <a:spcBef>
-                <a:spcPts val="0"/>
-              </a:spcBef>
-              <a:spcAft>
-                <a:spcPts val="0"/>
-              </a:spcAft>
-              <a:buClr>
-                <a:schemeClr val="dk1"/>
-              </a:buClr>
-              <a:buSzPts val="1100"/>
-              <a:buChar char="-"/>
-            </a:pPr>
-            <a:r>
-              <a:rPr lang="en" dirty="0">
-                <a:solidFill>
-                  <a:schemeClr val="dk1"/>
-                </a:solidFill>
-              </a:rPr>
-              <a:t>Goal: (typically) to build brand awareness. </a:t>
-            </a:r>
-            <a:endParaRPr dirty="0">
-              <a:solidFill>
-                <a:schemeClr val="dk1"/>
-              </a:solidFill>
-            </a:endParaRPr>
-          </a:p>
-          <a:p>
-            <a:pPr marL="457200" lvl="0" indent="-298450" algn="l" rtl="0">
-              <a:spcBef>
-                <a:spcPts val="0"/>
-              </a:spcBef>
-              <a:spcAft>
-                <a:spcPts val="0"/>
-              </a:spcAft>
-              <a:buClr>
-                <a:schemeClr val="dk1"/>
-              </a:buClr>
-              <a:buSzPts val="1100"/>
-              <a:buChar char="-"/>
-            </a:pPr>
-            <a:r>
-              <a:rPr lang="en" dirty="0">
-                <a:solidFill>
-                  <a:schemeClr val="dk1"/>
-                </a:solidFill>
-              </a:rPr>
-              <a:t>Internet search/SEO</a:t>
-            </a:r>
-            <a:endParaRPr dirty="0">
-              <a:solidFill>
-                <a:schemeClr val="dk1"/>
-              </a:solidFill>
-            </a:endParaRPr>
-          </a:p>
-          <a:p>
-            <a:pPr marL="457200" lvl="0" indent="-298450" algn="l" rtl="0">
-              <a:spcBef>
-                <a:spcPts val="0"/>
-              </a:spcBef>
-              <a:spcAft>
-                <a:spcPts val="0"/>
-              </a:spcAft>
-              <a:buClr>
-                <a:schemeClr val="dk1"/>
-              </a:buClr>
-              <a:buSzPts val="1100"/>
-              <a:buChar char="-"/>
-            </a:pPr>
-            <a:r>
-              <a:rPr lang="en" dirty="0">
-                <a:solidFill>
-                  <a:schemeClr val="dk1"/>
-                </a:solidFill>
-              </a:rPr>
-              <a:t>Blogging</a:t>
-            </a:r>
-            <a:endParaRPr dirty="0">
-              <a:solidFill>
-                <a:schemeClr val="dk1"/>
-              </a:solidFill>
-            </a:endParaRPr>
-          </a:p>
-          <a:p>
-            <a:pPr marL="457200" lvl="0" indent="-298450" algn="l" rtl="0">
-              <a:spcBef>
-                <a:spcPts val="0"/>
-              </a:spcBef>
-              <a:spcAft>
-                <a:spcPts val="0"/>
-              </a:spcAft>
-              <a:buClr>
-                <a:schemeClr val="dk1"/>
-              </a:buClr>
-              <a:buSzPts val="1100"/>
-              <a:buChar char="-"/>
-            </a:pPr>
-            <a:r>
-              <a:rPr lang="en" dirty="0">
-                <a:solidFill>
-                  <a:schemeClr val="dk1"/>
-                </a:solidFill>
-              </a:rPr>
-              <a:t>Social media</a:t>
-            </a:r>
-            <a:endParaRPr dirty="0">
-              <a:solidFill>
-                <a:schemeClr val="dk1"/>
-              </a:solidFill>
-            </a:endParaRPr>
-          </a:p>
-          <a:p>
-            <a:pPr marL="457200" lvl="0" indent="-298450" algn="l" rtl="0">
-              <a:spcBef>
-                <a:spcPts val="0"/>
-              </a:spcBef>
-              <a:spcAft>
-                <a:spcPts val="0"/>
-              </a:spcAft>
-              <a:buClr>
-                <a:schemeClr val="dk1"/>
-              </a:buClr>
-              <a:buSzPts val="1100"/>
-              <a:buChar char="-"/>
-            </a:pPr>
-            <a:r>
-              <a:rPr lang="en" dirty="0">
-                <a:solidFill>
-                  <a:schemeClr val="dk1"/>
-                </a:solidFill>
-              </a:rPr>
-              <a:t>Emails</a:t>
-            </a:r>
-            <a:endParaRPr dirty="0">
-              <a:solidFill>
-                <a:schemeClr val="dk1"/>
-              </a:solidFill>
-            </a:endParaRPr>
-          </a:p>
-          <a:p>
-            <a:pPr marL="457200" lvl="0" indent="-298450" algn="l" rtl="0">
-              <a:spcBef>
-                <a:spcPts val="0"/>
-              </a:spcBef>
-              <a:spcAft>
-                <a:spcPts val="0"/>
-              </a:spcAft>
-              <a:buClr>
-                <a:schemeClr val="dk1"/>
-              </a:buClr>
-              <a:buSzPts val="1100"/>
-              <a:buChar char="-"/>
-            </a:pPr>
-            <a:r>
-              <a:rPr lang="en" dirty="0">
-                <a:solidFill>
-                  <a:schemeClr val="dk1"/>
-                </a:solidFill>
-              </a:rPr>
-              <a:t>Referrals </a:t>
-            </a:r>
-            <a:endParaRPr dirty="0">
-              <a:solidFill>
-                <a:schemeClr val="dk1"/>
-              </a:solidFill>
-            </a:endParaRPr>
-          </a:p>
-          <a:p>
-            <a:pPr marL="457200" lvl="0" indent="-298450" algn="l" rtl="0">
-              <a:spcBef>
-                <a:spcPts val="0"/>
-              </a:spcBef>
-              <a:spcAft>
-                <a:spcPts val="0"/>
-              </a:spcAft>
-              <a:buClr>
-                <a:schemeClr val="dk1"/>
-              </a:buClr>
-              <a:buSzPts val="1100"/>
-              <a:buChar char="-"/>
-            </a:pPr>
-            <a:r>
-              <a:rPr lang="en" dirty="0">
-                <a:solidFill>
-                  <a:schemeClr val="dk1"/>
-                </a:solidFill>
-              </a:rPr>
-              <a:t>Influencer marketing</a:t>
-            </a:r>
-            <a:endParaRPr dirty="0">
-              <a:solidFill>
-                <a:schemeClr val="dk1"/>
-              </a:solidFill>
-            </a:endParaRPr>
-          </a:p>
-          <a:p>
-            <a:pPr marL="457200" lvl="0" indent="-298450" algn="l" rtl="0">
-              <a:spcBef>
-                <a:spcPts val="0"/>
-              </a:spcBef>
-              <a:spcAft>
-                <a:spcPts val="0"/>
-              </a:spcAft>
-              <a:buClr>
-                <a:schemeClr val="dk1"/>
-              </a:buClr>
-              <a:buSzPts val="1100"/>
-              <a:buChar char="-"/>
-            </a:pPr>
-            <a:r>
-              <a:rPr lang="en" dirty="0">
-                <a:solidFill>
-                  <a:schemeClr val="dk1"/>
-                </a:solidFill>
-              </a:rPr>
-              <a:t>Longer term play </a:t>
-            </a:r>
-            <a:endParaRPr dirty="0">
-              <a:solidFill>
-                <a:schemeClr val="dk1"/>
-              </a:solidFill>
-            </a:endParaRPr>
-          </a:p>
-          <a:p>
-            <a:pPr marL="0" lvl="0" indent="0" algn="l" rtl="0">
-              <a:spcBef>
-                <a:spcPts val="0"/>
-              </a:spcBef>
-              <a:spcAft>
-                <a:spcPts val="0"/>
-              </a:spcAft>
-              <a:buNone/>
-            </a:pPr>
-            <a:r>
-              <a:rPr lang="en" dirty="0">
-                <a:solidFill>
-                  <a:schemeClr val="dk1"/>
-                </a:solidFill>
-              </a:rPr>
-              <a:t>Paid acquisition:</a:t>
-            </a:r>
-            <a:endParaRPr dirty="0">
-              <a:solidFill>
-                <a:schemeClr val="dk1"/>
-              </a:solidFill>
-            </a:endParaRPr>
-          </a:p>
-          <a:p>
-            <a:pPr marL="457200" lvl="0" indent="-298450" algn="l" rtl="0">
-              <a:spcBef>
-                <a:spcPts val="0"/>
-              </a:spcBef>
-              <a:spcAft>
-                <a:spcPts val="0"/>
-              </a:spcAft>
-              <a:buClr>
-                <a:schemeClr val="dk1"/>
-              </a:buClr>
-              <a:buSzPts val="1100"/>
-              <a:buChar char="-"/>
-            </a:pPr>
-            <a:r>
-              <a:rPr lang="en" dirty="0">
-                <a:solidFill>
-                  <a:schemeClr val="dk1"/>
-                </a:solidFill>
-              </a:rPr>
-              <a:t>generates traffic to your business quickly through paid ads. </a:t>
-            </a:r>
-            <a:endParaRPr dirty="0">
-              <a:solidFill>
-                <a:schemeClr val="dk1"/>
-              </a:solidFill>
-            </a:endParaRPr>
-          </a:p>
-          <a:p>
-            <a:pPr marL="457200" lvl="0" indent="-298450" algn="l" rtl="0">
-              <a:spcBef>
-                <a:spcPts val="0"/>
-              </a:spcBef>
-              <a:spcAft>
-                <a:spcPts val="0"/>
-              </a:spcAft>
-              <a:buClr>
-                <a:schemeClr val="dk1"/>
-              </a:buClr>
-              <a:buSzPts val="1100"/>
-              <a:buChar char="-"/>
-            </a:pPr>
-            <a:r>
-              <a:rPr lang="en" dirty="0">
-                <a:solidFill>
-                  <a:schemeClr val="dk1"/>
-                </a:solidFill>
-              </a:rPr>
-              <a:t>Goal: (typically) to convert audience into sales or leads. </a:t>
-            </a:r>
-            <a:endParaRPr dirty="0">
-              <a:solidFill>
-                <a:schemeClr val="dk1"/>
-              </a:solidFill>
-            </a:endParaRPr>
-          </a:p>
-          <a:p>
-            <a:pPr marL="457200" lvl="0" indent="-298450" algn="l" rtl="0">
-              <a:spcBef>
-                <a:spcPts val="0"/>
-              </a:spcBef>
-              <a:spcAft>
-                <a:spcPts val="0"/>
-              </a:spcAft>
-              <a:buClr>
-                <a:schemeClr val="dk1"/>
-              </a:buClr>
-              <a:buSzPts val="1100"/>
-              <a:buChar char="-"/>
-            </a:pPr>
-            <a:r>
-              <a:rPr lang="en" dirty="0">
-                <a:solidFill>
-                  <a:schemeClr val="dk1"/>
-                </a:solidFill>
-              </a:rPr>
-              <a:t>social media ads</a:t>
-            </a:r>
-            <a:endParaRPr dirty="0">
-              <a:solidFill>
-                <a:schemeClr val="dk1"/>
-              </a:solidFill>
-            </a:endParaRPr>
-          </a:p>
-          <a:p>
-            <a:pPr marL="457200" lvl="0" indent="-298450" algn="l" rtl="0">
-              <a:spcBef>
-                <a:spcPts val="0"/>
-              </a:spcBef>
-              <a:spcAft>
-                <a:spcPts val="0"/>
-              </a:spcAft>
-              <a:buClr>
-                <a:schemeClr val="dk1"/>
-              </a:buClr>
-              <a:buSzPts val="1100"/>
-              <a:buChar char="-"/>
-            </a:pPr>
-            <a:r>
-              <a:rPr lang="en" dirty="0">
-                <a:solidFill>
-                  <a:schemeClr val="dk1"/>
-                </a:solidFill>
-              </a:rPr>
-              <a:t>Google ads</a:t>
-            </a:r>
-            <a:endParaRPr dirty="0">
-              <a:solidFill>
-                <a:schemeClr val="dk1"/>
-              </a:solidFill>
-            </a:endParaRPr>
-          </a:p>
-          <a:p>
-            <a:pPr marL="457200" lvl="0" indent="-298450" algn="l" rtl="0">
-              <a:spcBef>
-                <a:spcPts val="0"/>
-              </a:spcBef>
-              <a:spcAft>
-                <a:spcPts val="0"/>
-              </a:spcAft>
-              <a:buClr>
-                <a:schemeClr val="dk1"/>
-              </a:buClr>
-              <a:buSzPts val="1100"/>
-              <a:buChar char="-"/>
-            </a:pPr>
-            <a:r>
-              <a:rPr lang="en" dirty="0">
-                <a:solidFill>
-                  <a:schemeClr val="dk1"/>
-                </a:solidFill>
-              </a:rPr>
-              <a:t>TV commercials</a:t>
-            </a:r>
-            <a:endParaRPr dirty="0">
-              <a:solidFill>
-                <a:schemeClr val="dk1"/>
-              </a:solidFill>
-            </a:endParaRPr>
-          </a:p>
-          <a:p>
-            <a:pPr marL="457200" lvl="0" indent="-298450" algn="l" rtl="0">
-              <a:spcBef>
-                <a:spcPts val="0"/>
-              </a:spcBef>
-              <a:spcAft>
-                <a:spcPts val="0"/>
-              </a:spcAft>
-              <a:buClr>
-                <a:schemeClr val="dk1"/>
-              </a:buClr>
-              <a:buSzPts val="1100"/>
-              <a:buChar char="-"/>
-            </a:pPr>
-            <a:r>
-              <a:rPr lang="en" dirty="0">
-                <a:solidFill>
-                  <a:schemeClr val="dk1"/>
-                </a:solidFill>
-              </a:rPr>
-              <a:t>Print ads</a:t>
-            </a:r>
-            <a:endParaRPr dirty="0">
-              <a:solidFill>
-                <a:schemeClr val="dk1"/>
-              </a:solidFill>
-            </a:endParaRPr>
-          </a:p>
-          <a:p>
-            <a:pPr marL="457200" lvl="0" indent="-298450" algn="l" rtl="0">
-              <a:spcBef>
-                <a:spcPts val="0"/>
-              </a:spcBef>
-              <a:spcAft>
-                <a:spcPts val="0"/>
-              </a:spcAft>
-              <a:buClr>
-                <a:schemeClr val="dk1"/>
-              </a:buClr>
-              <a:buSzPts val="1100"/>
-              <a:buChar char="-"/>
-            </a:pPr>
-            <a:r>
-              <a:rPr lang="en" dirty="0">
-                <a:solidFill>
-                  <a:schemeClr val="dk1"/>
-                </a:solidFill>
-              </a:rPr>
-              <a:t>Billboards</a:t>
-            </a:r>
-            <a:endParaRPr dirty="0">
-              <a:solidFill>
-                <a:schemeClr val="dk1"/>
-              </a:solidFill>
-            </a:endParaRPr>
-          </a:p>
-          <a:p>
-            <a:pPr marL="0" lvl="0" indent="0" algn="l" rtl="0">
-              <a:spcBef>
-                <a:spcPts val="0"/>
-              </a:spcBef>
-              <a:spcAft>
-                <a:spcPts val="0"/>
-              </a:spcAft>
-              <a:buNone/>
-            </a:pPr>
-            <a:endParaRPr dirty="0">
-              <a:solidFill>
-                <a:schemeClr val="dk1"/>
-              </a:solidFill>
-            </a:endParaRPr>
-          </a:p>
-          <a:p>
-            <a:pPr marL="0" lvl="0" indent="0" algn="l" rtl="0">
-              <a:spcBef>
-                <a:spcPts val="0"/>
-              </a:spcBef>
-              <a:spcAft>
-                <a:spcPts val="0"/>
-              </a:spcAft>
-              <a:buClr>
-                <a:schemeClr val="dk1"/>
+                <a:srgbClr val="000000"/>
               </a:buClr>
               <a:buSzPts val="1100"/>
               <a:buFont typeface="Arial"/>
               <a:buNone/>
+              <a:tabLst/>
+              <a:defRPr/>
             </a:pPr>
             <a:r>
-              <a:rPr lang="en" b="1" dirty="0">
+              <a:rPr lang="en-US" b="1" dirty="0"/>
+              <a:t>Note to candidate: </a:t>
+            </a:r>
+            <a:r>
+              <a:rPr lang="en-US" dirty="0"/>
+              <a:t>Transition here to the .</a:t>
+            </a:r>
+            <a:r>
+              <a:rPr lang="en-US" dirty="0" err="1"/>
+              <a:t>ipynb</a:t>
+            </a:r>
+            <a:r>
+              <a:rPr lang="en-US" dirty="0"/>
+              <a:t> file, walk through the remainder of the </a:t>
+            </a:r>
+            <a:r>
+              <a:rPr lang="en-US" dirty="0" err="1"/>
+              <a:t>LiveLab</a:t>
+            </a:r>
+            <a:r>
+              <a:rPr lang="en-US" dirty="0"/>
+              <a:t>! We’ve given you a file with solutions in it, but in your sample teach, those solutions should not be there. You’ll arrive at the solutions </a:t>
+            </a:r>
+            <a:r>
+              <a:rPr lang="en-US" i="1" dirty="0"/>
+              <a:t>with your students.</a:t>
+            </a:r>
+            <a:r>
+              <a:rPr lang="en-US" dirty="0"/>
+              <a:t> Keep this scenario top of mind. Students </a:t>
+            </a:r>
+            <a:r>
+              <a:rPr lang="en-US" b="1" dirty="0"/>
+              <a:t>always</a:t>
+            </a:r>
+            <a:r>
+              <a:rPr lang="en-US" dirty="0"/>
+              <a:t> like to know </a:t>
+            </a:r>
+            <a:r>
+              <a:rPr lang="en-US" i="1" dirty="0"/>
+              <a:t>why</a:t>
+            </a:r>
+            <a:r>
+              <a:rPr lang="en-US" dirty="0"/>
+              <a:t> they are doing something. And </a:t>
+            </a:r>
+            <a:r>
+              <a:rPr lang="en-US" dirty="0">
                 <a:solidFill>
                   <a:schemeClr val="dk1"/>
                 </a:solidFill>
               </a:rPr>
-              <a:t>Note to candidate: </a:t>
-            </a:r>
-            <a:r>
-              <a:rPr lang="en" dirty="0">
+              <a:t> remember: </a:t>
+            </a:r>
+            <a:r>
+              <a:rPr lang="en-US" dirty="0" err="1">
                 <a:solidFill>
                   <a:schemeClr val="dk1"/>
                 </a:solidFill>
               </a:rPr>
-              <a:t>This is a </a:t>
-            </a:r>
-            <a:r>
-              <a:rPr lang="en" i="1" dirty="0">
+              <a:t>LiveLab</a:t>
+            </a:r>
+            <a:r>
+              <a:rPr lang="en-US" dirty="0">
                 <a:solidFill>
                   <a:schemeClr val="dk1"/>
                 </a:solidFill>
               </a:rPr>
-              <a:t>great </a:t>
-            </a:r>
-            <a:r>
-              <a:rPr lang="en" dirty="0">
+              <a:t> is </a:t>
+            </a:r>
+            <a:r>
+              <a:rPr lang="en-US" b="1" dirty="0">
                 <a:solidFill>
                   <a:schemeClr val="dk1"/>
                 </a:solidFill>
               </a:rPr>
-              <a:t>spot to engage your students!</a:t>
-            </a:r>
-            <a:endParaRPr dirty="0">
-              <a:solidFill>
-                <a:schemeClr val="dk1"/>
-              </a:solidFill>
-              <a:highlight>
-                <a:srgbClr val="F7E141"/>
-              </a:highlight>
-            </a:endParaRPr>
+              <a:t>not</a:t>
+            </a:r>
+            <a:r>
+              <a:rPr lang="en-US" dirty="0">
+                <a:solidFill>
+                  <a:schemeClr val="dk1"/>
+                </a:solidFill>
+              </a:rPr>
+              <a:t> where students are learning content for the first time, it’s where they’re applying what they’re learning in parallel. </a:t>
+            </a:r>
+            <a:endParaRPr lang="en-US" dirty="0"/>
           </a:p>
           <a:p>
             <a:pPr marL="0" lvl="0" indent="0" algn="l" rtl="0">
@@ -3163,13 +2835,7 @@
   <p:cSld>
     <p:spTree>
       <p:nvGrpSpPr>
-        <p:cNvPr id="1" name="Shape 93">
-          <a:extLst>
-            <a:ext uri="{FF2B5EF4-FFF2-40B4-BE49-F238E27FC236}">
-              <a16:creationId xmlns:a16="http://schemas.microsoft.com/office/drawing/2014/main" id="{8DA1123D-797C-49D1-E811-D6E17BE18E11}"/>
-            </a:ext>
-          </a:extLst>
-        </p:cNvPr>
+        <p:cNvPr id="1" name="Shape 50"/>
         <p:cNvGrpSpPr/>
         <p:nvPr/>
       </p:nvGrpSpPr>
@@ -3183,13 +2849,7 @@
       </p:grpSpPr>
       <p:sp>
         <p:nvSpPr>
-          <p:cNvPr id="94" name="Google Shape;94;g24cca0ebfde_0_218:notes">
-            <a:extLst>
-              <a:ext uri="{FF2B5EF4-FFF2-40B4-BE49-F238E27FC236}">
-                <a16:creationId xmlns:a16="http://schemas.microsoft.com/office/drawing/2014/main" id="{F128EE63-F996-9D1A-0E23-BA235673FA40}"/>
-              </a:ext>
-            </a:extLst>
-          </p:cNvPr>
+          <p:cNvPr id="51" name="Google Shape;51;g28b322f775d_0_0:notes"/>
           <p:cNvSpPr>
             <a:spLocks noGrp="1" noRot="1" noChangeAspect="1"/>
           </p:cNvSpPr>
@@ -3230,13 +2890,7 @@
       </p:sp>
       <p:sp>
         <p:nvSpPr>
-          <p:cNvPr id="95" name="Google Shape;95;g24cca0ebfde_0_218:notes">
-            <a:extLst>
-              <a:ext uri="{FF2B5EF4-FFF2-40B4-BE49-F238E27FC236}">
-                <a16:creationId xmlns:a16="http://schemas.microsoft.com/office/drawing/2014/main" id="{47B63B01-D392-B19A-D5E7-6B5FB702AA78}"/>
-              </a:ext>
-            </a:extLst>
-          </p:cNvPr>
+          <p:cNvPr id="52" name="Google Shape;52;g28b322f775d_0_0:notes"/>
           <p:cNvSpPr txBox="1">
             <a:spLocks noGrp="1"/>
           </p:cNvSpPr>
@@ -3268,136 +2922,11 @@
               </a:spcAft>
               <a:buNone/>
             </a:pPr>
-            <a:r>
-              <a:rPr lang="en">
-                <a:solidFill>
-                  <a:schemeClr val="dk1"/>
-                </a:solidFill>
-              </a:rPr>
-              <a:t>Present goal of LiveLab to students: t</a:t>
-            </a:r>
-            <a:r>
-              <a:rPr lang="en"/>
-              <a:t>he Headspace marketing team is super interested in gaining insights on the conversion rates of organic acquisitions compared to paid acquisitions in terms of becoming paid subscribers. </a:t>
-            </a:r>
-            <a:endParaRPr/>
-          </a:p>
-          <a:p>
-            <a:pPr marL="0" lvl="0" indent="0" algn="l" rtl="0">
-              <a:spcBef>
-                <a:spcPts val="0"/>
-              </a:spcBef>
-              <a:spcAft>
-                <a:spcPts val="0"/>
-              </a:spcAft>
-              <a:buNone/>
-            </a:pPr>
-            <a:endParaRPr/>
-          </a:p>
-          <a:p>
-            <a:pPr marL="0" lvl="0" indent="0" algn="l" rtl="0">
-              <a:spcBef>
-                <a:spcPts val="0"/>
-              </a:spcBef>
-              <a:spcAft>
-                <a:spcPts val="0"/>
-              </a:spcAft>
-              <a:buNone/>
-            </a:pPr>
-            <a:r>
-              <a:rPr lang="en"/>
-              <a:t>They believe a better understanding of this will provide valuable insights for future marketing strategies. </a:t>
-            </a:r>
-            <a:endParaRPr/>
-          </a:p>
-          <a:p>
-            <a:pPr marL="0" lvl="0" indent="0" algn="l" rtl="0">
-              <a:spcBef>
-                <a:spcPts val="0"/>
-              </a:spcBef>
-              <a:spcAft>
-                <a:spcPts val="0"/>
-              </a:spcAft>
-              <a:buNone/>
-            </a:pPr>
-            <a:endParaRPr/>
-          </a:p>
-          <a:p>
-            <a:pPr marL="0" lvl="0" indent="0" algn="l" rtl="0">
-              <a:spcBef>
-                <a:spcPts val="0"/>
-              </a:spcBef>
-              <a:spcAft>
-                <a:spcPts val="0"/>
-              </a:spcAft>
-              <a:buNone/>
-            </a:pPr>
-            <a:r>
-              <a:rPr lang="en" b="1"/>
-              <a:t>Note to candidate: </a:t>
-            </a:r>
-            <a:r>
-              <a:rPr lang="en"/>
-              <a:t>Transition here to the .ipynb file, walk through the remainder of the LiveLab! We’ve given you a file with solutions in it, but in your sample teach, those solutions should not be there. You’ll arrive at the solutions </a:t>
-            </a:r>
-            <a:r>
-              <a:rPr lang="en" i="1"/>
-              <a:t>with your students.</a:t>
-            </a:r>
-            <a:r>
-              <a:rPr lang="en"/>
-              <a:t> Keep this scenario top of mind. Students </a:t>
-            </a:r>
-            <a:r>
-              <a:rPr lang="en" b="1"/>
-              <a:t>always</a:t>
-            </a:r>
-            <a:r>
-              <a:rPr lang="en"/>
-              <a:t> like to know </a:t>
-            </a:r>
-            <a:r>
-              <a:rPr lang="en" i="1"/>
-              <a:t>why</a:t>
-            </a:r>
-            <a:r>
-              <a:rPr lang="en"/>
-              <a:t> they are doing something. And </a:t>
-            </a:r>
-            <a:r>
-              <a:rPr lang="en">
-                <a:solidFill>
-                  <a:schemeClr val="dk1"/>
-                </a:solidFill>
-              </a:rPr>
-              <a:t> remember: LiveLab is </a:t>
-            </a:r>
-            <a:r>
-              <a:rPr lang="en" b="1">
-                <a:solidFill>
-                  <a:schemeClr val="dk1"/>
-                </a:solidFill>
-              </a:rPr>
-              <a:t>not</a:t>
-            </a:r>
-            <a:r>
-              <a:rPr lang="en">
-                <a:solidFill>
-                  <a:schemeClr val="dk1"/>
-                </a:solidFill>
-              </a:rPr>
-              <a:t> where students are learning content for the first time, it’s where they’re applying what they’re learning in parallel. </a:t>
-            </a:r>
             <a:endParaRPr/>
           </a:p>
         </p:txBody>
       </p:sp>
     </p:spTree>
-    <p:extLst>
-      <p:ext uri="{BB962C8B-B14F-4D97-AF65-F5344CB8AC3E}">
-        <p14:creationId xmlns:p14="http://schemas.microsoft.com/office/powerpoint/2010/main" val="130657084"/>
-      </p:ext>
-    </p:extLst>
   </p:cSld>
   <p:clrMapOvr>
     <a:masterClrMapping/>
@@ -8157,657 +7686,6 @@
 <file path=ppt/slides/slide1.xml><?xml version="1.0" encoding="utf-8"?>
 <p:sld xmlns:a="http://schemas.openxmlformats.org/drawingml/2006/main" xmlns:r="http://schemas.openxmlformats.org/officeDocument/2006/relationships" xmlns:p="http://schemas.openxmlformats.org/presentationml/2006/main">
   <p:cSld>
-    <p:spTree>
-      <p:nvGrpSpPr>
-        <p:cNvPr id="1" name="Shape 53"/>
-        <p:cNvGrpSpPr/>
-        <p:nvPr/>
-      </p:nvGrpSpPr>
-      <p:grpSpPr>
-        <a:xfrm>
-          <a:off x="0" y="0"/>
-          <a:ext cx="0" cy="0"/>
-          <a:chOff x="0" y="0"/>
-          <a:chExt cx="0" cy="0"/>
-        </a:xfrm>
-      </p:grpSpPr>
-      <p:pic>
-        <p:nvPicPr>
-          <p:cNvPr id="54" name="Google Shape;54;p13"/>
-          <p:cNvPicPr preferRelativeResize="0"/>
-          <p:nvPr/>
-        </p:nvPicPr>
-        <p:blipFill>
-          <a:blip r:embed="rId3">
-            <a:alphaModFix/>
-          </a:blip>
-          <a:stretch>
-            <a:fillRect/>
-          </a:stretch>
-        </p:blipFill>
-        <p:spPr>
-          <a:xfrm>
-            <a:off x="0" y="0"/>
-            <a:ext cx="9144003" cy="5143501"/>
-          </a:xfrm>
-          <a:prstGeom prst="rect">
-            <a:avLst/>
-          </a:prstGeom>
-          <a:noFill/>
-          <a:ln>
-            <a:noFill/>
-          </a:ln>
-        </p:spPr>
-      </p:pic>
-      <p:sp>
-        <p:nvSpPr>
-          <p:cNvPr id="55" name="Google Shape;55;p13"/>
-          <p:cNvSpPr txBox="1"/>
-          <p:nvPr/>
-        </p:nvSpPr>
-        <p:spPr>
-          <a:xfrm>
-            <a:off x="266250" y="345300"/>
-            <a:ext cx="8611500" cy="4468500"/>
-          </a:xfrm>
-          <a:prstGeom prst="rect">
-            <a:avLst/>
-          </a:prstGeom>
-          <a:noFill/>
-          <a:ln>
-            <a:noFill/>
-          </a:ln>
-        </p:spPr>
-        <p:txBody>
-          <a:bodyPr spcFirstLastPara="1" wrap="square" lIns="91425" tIns="91425" rIns="91425" bIns="91425" anchor="t" anchorCtr="0">
-            <a:spAutoFit/>
-          </a:bodyPr>
-          <a:lstStyle/>
-          <a:p>
-            <a:pPr marL="0" lvl="0" indent="0" algn="l" rtl="0">
-              <a:lnSpc>
-                <a:spcPct val="115000"/>
-              </a:lnSpc>
-              <a:spcBef>
-                <a:spcPts val="0"/>
-              </a:spcBef>
-              <a:spcAft>
-                <a:spcPts val="0"/>
-              </a:spcAft>
-              <a:buNone/>
-            </a:pPr>
-            <a:r>
-              <a:rPr lang="en" sz="1050">
-                <a:solidFill>
-                  <a:schemeClr val="dk1"/>
-                </a:solidFill>
-                <a:latin typeface="Plus Jakarta Sans Medium"/>
-                <a:ea typeface="Plus Jakarta Sans Medium"/>
-                <a:cs typeface="Plus Jakarta Sans Medium"/>
-                <a:sym typeface="Plus Jakarta Sans Medium"/>
-              </a:rPr>
-              <a:t>We’re excited to see your sample LiveLab! The slides here are from part of a real LiveLab we deliver to our students! Like you’ve talked about, LiveLab is where we marry the classroom with the “real world”. It’s where students get their hands dirty with real-life, real-world data. Each time students log on, they get to tackle a different problem – or problem(s) – that a real organization might be trying to solve. And the best part? You guessed it: they solve these problems with data.</a:t>
-            </a:r>
-            <a:endParaRPr sz="1050">
-              <a:solidFill>
-                <a:schemeClr val="dk1"/>
-              </a:solidFill>
-              <a:latin typeface="Plus Jakarta Sans Medium"/>
-              <a:ea typeface="Plus Jakarta Sans Medium"/>
-              <a:cs typeface="Plus Jakarta Sans Medium"/>
-              <a:sym typeface="Plus Jakarta Sans Medium"/>
-            </a:endParaRPr>
-          </a:p>
-          <a:p>
-            <a:pPr marL="0" lvl="0" indent="0" algn="l" rtl="0">
-              <a:lnSpc>
-                <a:spcPct val="115000"/>
-              </a:lnSpc>
-              <a:spcBef>
-                <a:spcPts val="0"/>
-              </a:spcBef>
-              <a:spcAft>
-                <a:spcPts val="0"/>
-              </a:spcAft>
-              <a:buClr>
-                <a:schemeClr val="dk1"/>
-              </a:buClr>
-              <a:buSzPts val="1100"/>
-              <a:buFont typeface="Arial"/>
-              <a:buNone/>
-            </a:pPr>
-            <a:endParaRPr sz="1050">
-              <a:solidFill>
-                <a:schemeClr val="dk1"/>
-              </a:solidFill>
-              <a:latin typeface="Plus Jakarta Sans Medium"/>
-              <a:ea typeface="Plus Jakarta Sans Medium"/>
-              <a:cs typeface="Plus Jakarta Sans Medium"/>
-              <a:sym typeface="Plus Jakarta Sans Medium"/>
-            </a:endParaRPr>
-          </a:p>
-          <a:p>
-            <a:pPr marL="0" lvl="0" indent="0" algn="l" rtl="0">
-              <a:lnSpc>
-                <a:spcPct val="115000"/>
-              </a:lnSpc>
-              <a:spcBef>
-                <a:spcPts val="0"/>
-              </a:spcBef>
-              <a:spcAft>
-                <a:spcPts val="0"/>
-              </a:spcAft>
-              <a:buNone/>
-            </a:pPr>
-            <a:r>
-              <a:rPr lang="en" sz="1050">
-                <a:solidFill>
-                  <a:schemeClr val="dk1"/>
-                </a:solidFill>
-                <a:latin typeface="Plus Jakarta Sans Medium"/>
-                <a:ea typeface="Plus Jakarta Sans Medium"/>
-                <a:cs typeface="Plus Jakarta Sans Medium"/>
-                <a:sym typeface="Plus Jakarta Sans Medium"/>
-              </a:rPr>
-              <a:t>LiveLab is all about practicing thinking like data analysts, asking the right questions, and using tools (python/sql) to find the story that’s hiding in the data. And, maybe even most importantly, also practicing how to communicate that data story.</a:t>
-            </a:r>
-            <a:endParaRPr sz="1050">
-              <a:solidFill>
-                <a:schemeClr val="dk1"/>
-              </a:solidFill>
-              <a:latin typeface="Plus Jakarta Sans Medium"/>
-              <a:ea typeface="Plus Jakarta Sans Medium"/>
-              <a:cs typeface="Plus Jakarta Sans Medium"/>
-              <a:sym typeface="Plus Jakarta Sans Medium"/>
-            </a:endParaRPr>
-          </a:p>
-          <a:p>
-            <a:pPr marL="0" lvl="0" indent="0" algn="l" rtl="0">
-              <a:lnSpc>
-                <a:spcPct val="115000"/>
-              </a:lnSpc>
-              <a:spcBef>
-                <a:spcPts val="0"/>
-              </a:spcBef>
-              <a:spcAft>
-                <a:spcPts val="0"/>
-              </a:spcAft>
-              <a:buClr>
-                <a:schemeClr val="dk1"/>
-              </a:buClr>
-              <a:buSzPts val="1100"/>
-              <a:buFont typeface="Arial"/>
-              <a:buNone/>
-            </a:pPr>
-            <a:endParaRPr sz="1050">
-              <a:solidFill>
-                <a:schemeClr val="dk1"/>
-              </a:solidFill>
-              <a:latin typeface="Plus Jakarta Sans Medium"/>
-              <a:ea typeface="Plus Jakarta Sans Medium"/>
-              <a:cs typeface="Plus Jakarta Sans Medium"/>
-              <a:sym typeface="Plus Jakarta Sans Medium"/>
-            </a:endParaRPr>
-          </a:p>
-          <a:p>
-            <a:pPr marL="0" lvl="0" indent="0" algn="l" rtl="0">
-              <a:lnSpc>
-                <a:spcPct val="115000"/>
-              </a:lnSpc>
-              <a:spcBef>
-                <a:spcPts val="0"/>
-              </a:spcBef>
-              <a:spcAft>
-                <a:spcPts val="0"/>
-              </a:spcAft>
-              <a:buClr>
-                <a:schemeClr val="dk1"/>
-              </a:buClr>
-              <a:buSzPts val="1100"/>
-              <a:buFont typeface="Arial"/>
-              <a:buNone/>
-            </a:pPr>
-            <a:r>
-              <a:rPr lang="en" sz="1050">
-                <a:solidFill>
-                  <a:schemeClr val="dk1"/>
-                </a:solidFill>
-                <a:latin typeface="Plus Jakarta Sans Medium"/>
-                <a:ea typeface="Plus Jakarta Sans Medium"/>
-                <a:cs typeface="Plus Jakarta Sans Medium"/>
-                <a:sym typeface="Plus Jakarta Sans Medium"/>
-              </a:rPr>
-              <a:t>The following slides are to aid in setting up the company and the problem. The problem (on Slide #6) is about comparing and evaluating the conversion rates of organic acquisitions and paid acquisitions at Headspace. The </a:t>
-            </a:r>
-            <a:r>
-              <a:rPr lang="en" sz="1150">
-                <a:solidFill>
-                  <a:schemeClr val="dk1"/>
-                </a:solidFill>
-                <a:latin typeface="Inconsolata Medium"/>
-                <a:ea typeface="Inconsolata Medium"/>
-                <a:cs typeface="Inconsolata Medium"/>
-                <a:sym typeface="Inconsolata Medium"/>
-              </a:rPr>
-              <a:t>.csv</a:t>
-            </a:r>
-            <a:r>
-              <a:rPr lang="en" sz="1050">
-                <a:solidFill>
-                  <a:schemeClr val="dk1"/>
-                </a:solidFill>
-                <a:latin typeface="Plus Jakarta Sans Medium"/>
-                <a:ea typeface="Plus Jakarta Sans Medium"/>
-                <a:cs typeface="Plus Jakarta Sans Medium"/>
-                <a:sym typeface="Plus Jakarta Sans Medium"/>
-              </a:rPr>
-              <a:t> and the </a:t>
-            </a:r>
-            <a:r>
-              <a:rPr lang="en" sz="1150">
-                <a:solidFill>
-                  <a:schemeClr val="dk1"/>
-                </a:solidFill>
-                <a:latin typeface="Inconsolata Medium"/>
-                <a:ea typeface="Inconsolata Medium"/>
-                <a:cs typeface="Inconsolata Medium"/>
-                <a:sym typeface="Inconsolata Medium"/>
-              </a:rPr>
-              <a:t>.ipynb</a:t>
-            </a:r>
-            <a:r>
-              <a:rPr lang="en" sz="1050">
-                <a:solidFill>
-                  <a:schemeClr val="dk1"/>
-                </a:solidFill>
-                <a:latin typeface="Plus Jakarta Sans Medium"/>
-                <a:ea typeface="Plus Jakarta Sans Medium"/>
-                <a:cs typeface="Plus Jakarta Sans Medium"/>
-                <a:sym typeface="Plus Jakarta Sans Medium"/>
-              </a:rPr>
-              <a:t> (also linked below!) are used to solve the problem and find that story hidden in the data.</a:t>
-            </a:r>
-            <a:endParaRPr sz="1050">
-              <a:solidFill>
-                <a:schemeClr val="dk1"/>
-              </a:solidFill>
-              <a:latin typeface="Plus Jakarta Sans Medium"/>
-              <a:ea typeface="Plus Jakarta Sans Medium"/>
-              <a:cs typeface="Plus Jakarta Sans Medium"/>
-              <a:sym typeface="Plus Jakarta Sans Medium"/>
-            </a:endParaRPr>
-          </a:p>
-          <a:p>
-            <a:pPr marL="0" lvl="0" indent="0" algn="l" rtl="0">
-              <a:lnSpc>
-                <a:spcPct val="115000"/>
-              </a:lnSpc>
-              <a:spcBef>
-                <a:spcPts val="0"/>
-              </a:spcBef>
-              <a:spcAft>
-                <a:spcPts val="0"/>
-              </a:spcAft>
-              <a:buNone/>
-            </a:pPr>
-            <a:r>
-              <a:rPr lang="en" sz="1050">
-                <a:solidFill>
-                  <a:schemeClr val="dk1"/>
-                </a:solidFill>
-                <a:latin typeface="Plus Jakarta Sans Medium"/>
-                <a:ea typeface="Plus Jakarta Sans Medium"/>
-                <a:cs typeface="Plus Jakarta Sans Medium"/>
-                <a:sym typeface="Plus Jakarta Sans Medium"/>
-              </a:rPr>
-              <a:t> </a:t>
-            </a:r>
-            <a:endParaRPr sz="1050">
-              <a:solidFill>
-                <a:schemeClr val="dk1"/>
-              </a:solidFill>
-              <a:latin typeface="Plus Jakarta Sans Medium"/>
-              <a:ea typeface="Plus Jakarta Sans Medium"/>
-              <a:cs typeface="Plus Jakarta Sans Medium"/>
-              <a:sym typeface="Plus Jakarta Sans Medium"/>
-            </a:endParaRPr>
-          </a:p>
-          <a:p>
-            <a:pPr marL="0" lvl="0" indent="0" algn="l" rtl="0">
-              <a:lnSpc>
-                <a:spcPct val="115000"/>
-              </a:lnSpc>
-              <a:spcBef>
-                <a:spcPts val="0"/>
-              </a:spcBef>
-              <a:spcAft>
-                <a:spcPts val="0"/>
-              </a:spcAft>
-              <a:buNone/>
-            </a:pPr>
-            <a:r>
-              <a:rPr lang="en" sz="1050">
-                <a:solidFill>
-                  <a:schemeClr val="dk1"/>
-                </a:solidFill>
-                <a:latin typeface="Plus Jakarta Sans Medium"/>
-                <a:ea typeface="Plus Jakarta Sans Medium"/>
-                <a:cs typeface="Plus Jakarta Sans Medium"/>
-                <a:sym typeface="Plus Jakarta Sans Medium"/>
-              </a:rPr>
-              <a:t>You’ll use them – with your own flare – to deliver it for your Sample Teach Interview. We’re looking for a rockstar teacher who will incorporate their passion for data analytics and their “real-world” experiences into the learning topic we teach.</a:t>
-            </a:r>
-            <a:endParaRPr sz="1050">
-              <a:solidFill>
-                <a:schemeClr val="dk1"/>
-              </a:solidFill>
-              <a:latin typeface="Plus Jakarta Sans Medium"/>
-              <a:ea typeface="Plus Jakarta Sans Medium"/>
-              <a:cs typeface="Plus Jakarta Sans Medium"/>
-              <a:sym typeface="Plus Jakarta Sans Medium"/>
-            </a:endParaRPr>
-          </a:p>
-          <a:p>
-            <a:pPr marL="0" lvl="0" indent="0" algn="l" rtl="0">
-              <a:lnSpc>
-                <a:spcPct val="115000"/>
-              </a:lnSpc>
-              <a:spcBef>
-                <a:spcPts val="0"/>
-              </a:spcBef>
-              <a:spcAft>
-                <a:spcPts val="0"/>
-              </a:spcAft>
-              <a:buNone/>
-            </a:pPr>
-            <a:endParaRPr sz="1050">
-              <a:solidFill>
-                <a:schemeClr val="dk1"/>
-              </a:solidFill>
-              <a:latin typeface="Plus Jakarta Sans Medium"/>
-              <a:ea typeface="Plus Jakarta Sans Medium"/>
-              <a:cs typeface="Plus Jakarta Sans Medium"/>
-              <a:sym typeface="Plus Jakarta Sans Medium"/>
-            </a:endParaRPr>
-          </a:p>
-          <a:p>
-            <a:pPr marL="0" lvl="0" indent="0" algn="l" rtl="0">
-              <a:lnSpc>
-                <a:spcPct val="115000"/>
-              </a:lnSpc>
-              <a:spcBef>
-                <a:spcPts val="0"/>
-              </a:spcBef>
-              <a:spcAft>
-                <a:spcPts val="0"/>
-              </a:spcAft>
-              <a:buNone/>
-            </a:pPr>
-            <a:r>
-              <a:rPr lang="en" sz="1050">
-                <a:solidFill>
-                  <a:schemeClr val="dk1"/>
-                </a:solidFill>
-                <a:latin typeface="Plus Jakarta Sans Medium"/>
-                <a:ea typeface="Plus Jakarta Sans Medium"/>
-                <a:cs typeface="Plus Jakarta Sans Medium"/>
-                <a:sym typeface="Plus Jakarta Sans Medium"/>
-              </a:rPr>
-              <a:t>You’ll find some speaker notes in each slide, but we ask you to put your own spin on delivering this lesson to students. Make sure you’re keeping your “students” engaged. Invite us to come off mute, encourage participation in the chat, lean on techniques you know and use.  If you’re so inclined, feel free to make a copy of these slides and edit them to be your own. We can’t wait to see what you come up with!</a:t>
-            </a:r>
-            <a:endParaRPr sz="1050">
-              <a:solidFill>
-                <a:schemeClr val="dk1"/>
-              </a:solidFill>
-              <a:latin typeface="Plus Jakarta Sans Medium"/>
-              <a:ea typeface="Plus Jakarta Sans Medium"/>
-              <a:cs typeface="Plus Jakarta Sans Medium"/>
-              <a:sym typeface="Plus Jakarta Sans Medium"/>
-            </a:endParaRPr>
-          </a:p>
-          <a:p>
-            <a:pPr marL="0" lvl="0" indent="0" algn="l" rtl="0">
-              <a:lnSpc>
-                <a:spcPct val="115000"/>
-              </a:lnSpc>
-              <a:spcBef>
-                <a:spcPts val="0"/>
-              </a:spcBef>
-              <a:spcAft>
-                <a:spcPts val="0"/>
-              </a:spcAft>
-              <a:buNone/>
-            </a:pPr>
-            <a:endParaRPr sz="1050">
-              <a:solidFill>
-                <a:schemeClr val="dk1"/>
-              </a:solidFill>
-              <a:latin typeface="Plus Jakarta Sans Medium"/>
-              <a:ea typeface="Plus Jakarta Sans Medium"/>
-              <a:cs typeface="Plus Jakarta Sans Medium"/>
-              <a:sym typeface="Plus Jakarta Sans Medium"/>
-            </a:endParaRPr>
-          </a:p>
-          <a:p>
-            <a:pPr marL="0" lvl="0" indent="0" algn="l" rtl="0">
-              <a:lnSpc>
-                <a:spcPct val="115000"/>
-              </a:lnSpc>
-              <a:spcBef>
-                <a:spcPts val="0"/>
-              </a:spcBef>
-              <a:spcAft>
-                <a:spcPts val="0"/>
-              </a:spcAft>
-              <a:buNone/>
-            </a:pPr>
-            <a:r>
-              <a:rPr lang="en" sz="1050">
-                <a:solidFill>
-                  <a:schemeClr val="dk1"/>
-                </a:solidFill>
-                <a:latin typeface="Plus Jakarta Sans Medium"/>
-                <a:ea typeface="Plus Jakarta Sans Medium"/>
-                <a:cs typeface="Plus Jakarta Sans Medium"/>
-                <a:sym typeface="Plus Jakarta Sans Medium"/>
-              </a:rPr>
-              <a:t>p.s. You might find it more effective to use a Jupyter Notebook and make use of markdown. We’re perfectly okay with that, too!</a:t>
-            </a:r>
-            <a:endParaRPr sz="1050">
-              <a:solidFill>
-                <a:schemeClr val="dk1"/>
-              </a:solidFill>
-              <a:latin typeface="Plus Jakarta Sans Medium"/>
-              <a:ea typeface="Plus Jakarta Sans Medium"/>
-              <a:cs typeface="Plus Jakarta Sans Medium"/>
-              <a:sym typeface="Plus Jakarta Sans Medium"/>
-            </a:endParaRPr>
-          </a:p>
-          <a:p>
-            <a:pPr marL="0" lvl="0" indent="0" algn="l" rtl="0">
-              <a:lnSpc>
-                <a:spcPct val="115000"/>
-              </a:lnSpc>
-              <a:spcBef>
-                <a:spcPts val="0"/>
-              </a:spcBef>
-              <a:spcAft>
-                <a:spcPts val="0"/>
-              </a:spcAft>
-              <a:buNone/>
-            </a:pPr>
-            <a:endParaRPr sz="1050">
-              <a:solidFill>
-                <a:schemeClr val="dk1"/>
-              </a:solidFill>
-              <a:latin typeface="Plus Jakarta Sans Medium"/>
-              <a:ea typeface="Plus Jakarta Sans Medium"/>
-              <a:cs typeface="Plus Jakarta Sans Medium"/>
-              <a:sym typeface="Plus Jakarta Sans Medium"/>
-            </a:endParaRPr>
-          </a:p>
-          <a:p>
-            <a:pPr marL="0" lvl="0" indent="0" algn="l" rtl="0">
-              <a:lnSpc>
-                <a:spcPct val="115000"/>
-              </a:lnSpc>
-              <a:spcBef>
-                <a:spcPts val="0"/>
-              </a:spcBef>
-              <a:spcAft>
-                <a:spcPts val="0"/>
-              </a:spcAft>
-              <a:buNone/>
-            </a:pPr>
-            <a:r>
-              <a:rPr lang="en" sz="1050">
-                <a:solidFill>
-                  <a:schemeClr val="dk1"/>
-                </a:solidFill>
-                <a:latin typeface="Plus Jakarta Sans Medium"/>
-                <a:ea typeface="Plus Jakarta Sans Medium"/>
-                <a:cs typeface="Plus Jakarta Sans Medium"/>
-                <a:sym typeface="Plus Jakarta Sans Medium"/>
-              </a:rPr>
-              <a:t>p.p.s. </a:t>
-            </a:r>
-            <a:r>
-              <a:rPr lang="en" sz="1050" b="1" u="sng">
-                <a:solidFill>
-                  <a:srgbClr val="B67AE5"/>
-                </a:solidFill>
-                <a:latin typeface="Plus Jakarta Sans"/>
-                <a:ea typeface="Plus Jakarta Sans"/>
-                <a:cs typeface="Plus Jakarta Sans"/>
-                <a:sym typeface="Plus Jakarta Sans"/>
-                <a:hlinkClick r:id="rId4">
-                  <a:extLst>
-                    <a:ext uri="{A12FA001-AC4F-418D-AE19-62706E023703}">
-                      <ahyp:hlinkClr xmlns:ahyp="http://schemas.microsoft.com/office/drawing/2018/hyperlinkcolor" val="tx"/>
-                    </a:ext>
-                  </a:extLst>
-                </a:hlinkClick>
-              </a:rPr>
-              <a:t>Here</a:t>
-            </a:r>
-            <a:r>
-              <a:rPr lang="en" sz="1050">
-                <a:solidFill>
-                  <a:schemeClr val="dk1"/>
-                </a:solidFill>
-                <a:latin typeface="Plus Jakarta Sans Medium"/>
-                <a:ea typeface="Plus Jakarta Sans Medium"/>
-                <a:cs typeface="Plus Jakarta Sans Medium"/>
-                <a:sym typeface="Plus Jakarta Sans Medium"/>
-              </a:rPr>
-              <a:t> is a direct-to-download link of a corresponding </a:t>
-            </a:r>
-            <a:r>
-              <a:rPr lang="en" sz="1150">
-                <a:solidFill>
-                  <a:schemeClr val="dk1"/>
-                </a:solidFill>
-                <a:latin typeface="Inconsolata Medium"/>
-                <a:ea typeface="Inconsolata Medium"/>
-                <a:cs typeface="Inconsolata Medium"/>
-                <a:sym typeface="Inconsolata Medium"/>
-              </a:rPr>
-              <a:t>.ipynb</a:t>
-            </a:r>
-            <a:r>
-              <a:rPr lang="en" sz="1050">
-                <a:solidFill>
-                  <a:schemeClr val="dk1"/>
-                </a:solidFill>
-                <a:latin typeface="Plus Jakarta Sans Medium"/>
-                <a:ea typeface="Plus Jakarta Sans Medium"/>
-                <a:cs typeface="Plus Jakarta Sans Medium"/>
-                <a:sym typeface="Plus Jakarta Sans Medium"/>
-              </a:rPr>
-              <a:t> file and </a:t>
-            </a:r>
-            <a:r>
-              <a:rPr lang="en" sz="1050" b="1" u="sng">
-                <a:solidFill>
-                  <a:srgbClr val="B67AE5"/>
-                </a:solidFill>
-                <a:latin typeface="Plus Jakarta Sans"/>
-                <a:ea typeface="Plus Jakarta Sans"/>
-                <a:cs typeface="Plus Jakarta Sans"/>
-                <a:sym typeface="Plus Jakarta Sans"/>
-                <a:hlinkClick r:id="rId5">
-                  <a:extLst>
-                    <a:ext uri="{A12FA001-AC4F-418D-AE19-62706E023703}">
-                      <ahyp:hlinkClr xmlns:ahyp="http://schemas.microsoft.com/office/drawing/2018/hyperlinkcolor" val="tx"/>
-                    </a:ext>
-                  </a:extLst>
-                </a:hlinkClick>
-              </a:rPr>
-              <a:t>here</a:t>
-            </a:r>
-            <a:r>
-              <a:rPr lang="en" sz="1050">
-                <a:solidFill>
-                  <a:schemeClr val="dk1"/>
-                </a:solidFill>
-                <a:latin typeface="Plus Jakarta Sans Medium"/>
-                <a:ea typeface="Plus Jakarta Sans Medium"/>
-                <a:cs typeface="Plus Jakarta Sans Medium"/>
-                <a:sym typeface="Plus Jakarta Sans Medium"/>
-              </a:rPr>
-              <a:t> of the dataset.</a:t>
-            </a:r>
-            <a:endParaRPr sz="1050">
-              <a:solidFill>
-                <a:schemeClr val="dk1"/>
-              </a:solidFill>
-              <a:latin typeface="Plus Jakarta Sans Medium"/>
-              <a:ea typeface="Plus Jakarta Sans Medium"/>
-              <a:cs typeface="Plus Jakarta Sans Medium"/>
-              <a:sym typeface="Plus Jakarta Sans Medium"/>
-            </a:endParaRPr>
-          </a:p>
-        </p:txBody>
-      </p:sp>
-      <p:pic>
-        <p:nvPicPr>
-          <p:cNvPr id="56" name="Google Shape;56;p13"/>
-          <p:cNvPicPr preferRelativeResize="0"/>
-          <p:nvPr/>
-        </p:nvPicPr>
-        <p:blipFill>
-          <a:blip r:embed="rId6">
-            <a:alphaModFix/>
-          </a:blip>
-          <a:stretch>
-            <a:fillRect/>
-          </a:stretch>
-        </p:blipFill>
-        <p:spPr>
-          <a:xfrm>
-            <a:off x="8094245" y="4120272"/>
-            <a:ext cx="864725" cy="857500"/>
-          </a:xfrm>
-          <a:prstGeom prst="rect">
-            <a:avLst/>
-          </a:prstGeom>
-          <a:noFill/>
-          <a:ln>
-            <a:noFill/>
-          </a:ln>
-        </p:spPr>
-      </p:pic>
-    </p:spTree>
-  </p:cSld>
-  <p:clrMapOvr>
-    <a:masterClrMapping/>
-  </p:clrMapOvr>
-</p:sld>
-</file>
-
-<file path=ppt/slides/slide2.xml><?xml version="1.0" encoding="utf-8"?>
-<p:sld xmlns:a="http://schemas.openxmlformats.org/drawingml/2006/main" xmlns:r="http://schemas.openxmlformats.org/officeDocument/2006/relationships" xmlns:p="http://schemas.openxmlformats.org/presentationml/2006/main">
-  <p:cSld>
     <p:bg>
       <p:bgPr>
         <a:solidFill>
@@ -9084,7 +7962,7 @@
 </p:sld>
 </file>
 
-<file path=ppt/slides/slide3.xml><?xml version="1.0" encoding="utf-8"?>
+<file path=ppt/slides/slide2.xml><?xml version="1.0" encoding="utf-8"?>
 <p:sld xmlns:a="http://schemas.openxmlformats.org/drawingml/2006/main" xmlns:r="http://schemas.openxmlformats.org/officeDocument/2006/relationships" xmlns:p="http://schemas.openxmlformats.org/presentationml/2006/main">
   <p:cSld>
     <p:bg>
@@ -9200,7 +8078,7 @@
 </p:sld>
 </file>
 
-<file path=ppt/slides/slide4.xml><?xml version="1.0" encoding="utf-8"?>
+<file path=ppt/slides/slide3.xml><?xml version="1.0" encoding="utf-8"?>
 <p:sld xmlns:a="http://schemas.openxmlformats.org/drawingml/2006/main" xmlns:r="http://schemas.openxmlformats.org/officeDocument/2006/relationships" xmlns:p="http://schemas.openxmlformats.org/presentationml/2006/main">
   <p:cSld>
     <p:bg>
@@ -9460,7 +8338,7 @@
 </p:sld>
 </file>
 
-<file path=ppt/slides/slide5.xml><?xml version="1.0" encoding="utf-8"?>
+<file path=ppt/slides/slide4.xml><?xml version="1.0" encoding="utf-8"?>
 <p:sld xmlns:a="http://schemas.openxmlformats.org/drawingml/2006/main" xmlns:r="http://schemas.openxmlformats.org/officeDocument/2006/relationships" xmlns:p="http://schemas.openxmlformats.org/presentationml/2006/main">
   <p:cSld>
     <p:bg>
@@ -10170,7 +9048,7 @@
 </p:sld>
 </file>
 
-<file path=ppt/slides/slide6.xml><?xml version="1.0" encoding="utf-8"?>
+<file path=ppt/slides/slide5.xml><?xml version="1.0" encoding="utf-8"?>
 <p:sld xmlns:a="http://schemas.openxmlformats.org/drawingml/2006/main" xmlns:r="http://schemas.openxmlformats.org/officeDocument/2006/relationships" xmlns:p="http://schemas.openxmlformats.org/presentationml/2006/main">
   <p:cSld>
     <p:bg>
@@ -10440,7 +9318,7 @@
                 <a:cs typeface="Plus Jakarta Sans"/>
                 <a:sym typeface="Plus Jakarta Sans"/>
               </a:rPr>
-              <a:t> Headspace subscribers, the marketing team has requested that we compare and evaluate the </a:t>
+              <a:t> Headspace subscribers, the marketing team has asked that we compare and evaluate the </a:t>
             </a:r>
             <a:r>
               <a:rPr lang="en" sz="2400" dirty="0">
@@ -10469,11 +9347,11 @@
             <a:r>
               <a:rPr lang="en" sz="2400" dirty="0">
                 <a:solidFill>
-                  <a:schemeClr val="accent6"/>
-                </a:solidFill>
-                <a:latin typeface="Plus Jakarta Sans ExtraBold"/>
-                <a:ea typeface="Plus Jakarta Sans ExtraBold"/>
-                <a:cs typeface="Plus Jakarta Sans ExtraBold"/>
+                  <a:srgbClr val="FFFF00"/>
+                </a:solidFill>
+                <a:latin typeface="Plus Jakarta Sans"/>
+                <a:ea typeface="Plus Jakarta Sans"/>
+                <a:cs typeface="Plus Jakarta Sans"/>
                 <a:sym typeface="Plus Jakarta Sans ExtraBold"/>
               </a:rPr>
               <a:t>organic acquisitions </a:t>
@@ -10493,31 +9371,21 @@
             <a:r>
               <a:rPr lang="en" sz="2400" dirty="0">
                 <a:solidFill>
-                  <a:schemeClr val="accent6"/>
-                </a:solidFill>
-                <a:latin typeface="Plus Jakarta Sans ExtraBold"/>
-                <a:ea typeface="Plus Jakarta Sans ExtraBold"/>
-                <a:cs typeface="Plus Jakarta Sans ExtraBold"/>
-                <a:sym typeface="Plus Jakarta Sans ExtraBold"/>
-              </a:rPr>
-              <a:t>paid acquisitions</a:t>
-            </a:r>
-            <a:r>
-              <a:rPr lang="en" sz="2400" dirty="0">
-                <a:solidFill>
-                  <a:schemeClr val="lt1"/>
+                  <a:srgbClr val="FFFF00"/>
                 </a:solidFill>
                 <a:latin typeface="Plus Jakarta Sans"/>
+                <a:ea typeface="Plus Jakarta Sans"/>
                 <a:cs typeface="Plus Jakarta Sans"/>
                 <a:sym typeface="Plus Jakarta Sans ExtraBold"/>
               </a:rPr>
-              <a:t>.</a:t>
+              <a:t>paid acquisitions.</a:t>
             </a:r>
             <a:endParaRPr sz="2400" dirty="0">
               <a:solidFill>
-                <a:schemeClr val="lt1"/>
+                <a:srgbClr val="FFFF00"/>
               </a:solidFill>
               <a:latin typeface="Plus Jakarta Sans"/>
+              <a:ea typeface="Plus Jakarta Sans"/>
               <a:cs typeface="Plus Jakarta Sans"/>
               <a:sym typeface="Plus Jakarta Sans"/>
             </a:endParaRPr>
@@ -10580,7 +9448,7 @@
                 <a:cs typeface="Poppins"/>
                 <a:sym typeface="Poppins"/>
               </a:rPr>
-              <a:t>Problem Statement</a:t>
+              <a:t>Our Job…</a:t>
             </a:r>
             <a:endParaRPr sz="2400" b="1" i="0" u="none" strike="noStrike" cap="none" dirty="0">
               <a:solidFill>
@@ -10655,6 +9523,597 @@
         </p:txBody>
       </p:sp>
     </p:spTree>
+  </p:cSld>
+  <p:clrMapOvr>
+    <a:masterClrMapping/>
+  </p:clrMapOvr>
+  <p:timing>
+    <p:tnLst>
+      <p:par>
+        <p:cTn id="1" dur="indefinite" restart="never" nodeType="tmRoot">
+          <p:childTnLst>
+            <p:seq concurrent="1" nextAc="seek">
+              <p:cTn id="2" dur="indefinite" nodeType="mainSeq">
+                <p:childTnLst>
+                  <p:par>
+                    <p:cTn id="3" fill="hold">
+                      <p:stCondLst>
+                        <p:cond delay="indefinite"/>
+                      </p:stCondLst>
+                      <p:childTnLst>
+                        <p:par>
+                          <p:cTn id="4" fill="hold">
+                            <p:stCondLst>
+                              <p:cond delay="0"/>
+                            </p:stCondLst>
+                            <p:childTnLst>
+                              <p:par>
+                                <p:cTn id="5" presetID="9" presetClass="entr" presetSubtype="0" fill="hold" grpId="0" nodeType="clickEffect">
+                                  <p:stCondLst>
+                                    <p:cond delay="0"/>
+                                  </p:stCondLst>
+                                  <p:childTnLst>
+                                    <p:set>
+                                      <p:cBhvr>
+                                        <p:cTn id="6" dur="1" fill="hold">
+                                          <p:stCondLst>
+                                            <p:cond delay="0"/>
+                                          </p:stCondLst>
+                                        </p:cTn>
+                                        <p:tgtEl>
+                                          <p:spTgt spid="101"/>
+                                        </p:tgtEl>
+                                        <p:attrNameLst>
+                                          <p:attrName>style.visibility</p:attrName>
+                                        </p:attrNameLst>
+                                      </p:cBhvr>
+                                      <p:to>
+                                        <p:strVal val="visible"/>
+                                      </p:to>
+                                    </p:set>
+                                    <p:animEffect transition="in" filter="dissolve">
+                                      <p:cBhvr>
+                                        <p:cTn id="7" dur="500"/>
+                                        <p:tgtEl>
+                                          <p:spTgt spid="101"/>
+                                        </p:tgtEl>
+                                      </p:cBhvr>
+                                    </p:animEffect>
+                                  </p:childTnLst>
+                                </p:cTn>
+                              </p:par>
+                            </p:childTnLst>
+                          </p:cTn>
+                        </p:par>
+                      </p:childTnLst>
+                    </p:cTn>
+                  </p:par>
+                </p:childTnLst>
+              </p:cTn>
+              <p:prevCondLst>
+                <p:cond evt="onPrev" delay="0">
+                  <p:tgtEl>
+                    <p:sldTgt/>
+                  </p:tgtEl>
+                </p:cond>
+              </p:prevCondLst>
+              <p:nextCondLst>
+                <p:cond evt="onNext" delay="0">
+                  <p:tgtEl>
+                    <p:sldTgt/>
+                  </p:tgtEl>
+                </p:cond>
+              </p:nextCondLst>
+            </p:seq>
+          </p:childTnLst>
+        </p:cTn>
+      </p:par>
+    </p:tnLst>
+    <p:bldLst>
+      <p:bldP spid="101" grpId="0" animBg="1"/>
+    </p:bldLst>
+  </p:timing>
+</p:sld>
+</file>
+
+<file path=ppt/slides/slide6.xml><?xml version="1.0" encoding="utf-8"?>
+<p:sld xmlns:a="http://schemas.openxmlformats.org/drawingml/2006/main" xmlns:r="http://schemas.openxmlformats.org/officeDocument/2006/relationships" xmlns:p="http://schemas.openxmlformats.org/presentationml/2006/main">
+  <p:cSld>
+    <p:bg>
+      <p:bgPr>
+        <a:solidFill>
+          <a:schemeClr val="dk1"/>
+        </a:solidFill>
+        <a:effectLst/>
+      </p:bgPr>
+    </p:bg>
+    <p:spTree>
+      <p:nvGrpSpPr>
+        <p:cNvPr id="1" name="Shape 96">
+          <a:extLst>
+            <a:ext uri="{FF2B5EF4-FFF2-40B4-BE49-F238E27FC236}">
+              <a16:creationId xmlns:a16="http://schemas.microsoft.com/office/drawing/2014/main" id="{C6D9C94D-8BF8-DA5E-6222-64AE48D11A98}"/>
+            </a:ext>
+          </a:extLst>
+        </p:cNvPr>
+        <p:cNvGrpSpPr/>
+        <p:nvPr/>
+      </p:nvGrpSpPr>
+      <p:grpSpPr>
+        <a:xfrm>
+          <a:off x="0" y="0"/>
+          <a:ext cx="0" cy="0"/>
+          <a:chOff x="0" y="0"/>
+          <a:chExt cx="0" cy="0"/>
+        </a:xfrm>
+      </p:grpSpPr>
+      <p:pic>
+        <p:nvPicPr>
+          <p:cNvPr id="97" name="Google Shape;97;p18">
+            <a:extLst>
+              <a:ext uri="{FF2B5EF4-FFF2-40B4-BE49-F238E27FC236}">
+                <a16:creationId xmlns:a16="http://schemas.microsoft.com/office/drawing/2014/main" id="{90E0A4E4-9AB0-F2C3-46CE-5BCE750679AF}"/>
+              </a:ext>
+            </a:extLst>
+          </p:cNvPr>
+          <p:cNvPicPr preferRelativeResize="0"/>
+          <p:nvPr/>
+        </p:nvPicPr>
+        <p:blipFill rotWithShape="1">
+          <a:blip r:embed="rId3">
+            <a:alphaModFix/>
+          </a:blip>
+          <a:srcRect/>
+          <a:stretch/>
+        </p:blipFill>
+        <p:spPr>
+          <a:xfrm rot="-7200012">
+            <a:off x="-239314" y="3069734"/>
+            <a:ext cx="3461853" cy="4147532"/>
+          </a:xfrm>
+          <a:prstGeom prst="rect">
+            <a:avLst/>
+          </a:prstGeom>
+          <a:noFill/>
+          <a:ln>
+            <a:noFill/>
+          </a:ln>
+        </p:spPr>
+      </p:pic>
+      <p:pic>
+        <p:nvPicPr>
+          <p:cNvPr id="98" name="Google Shape;98;p18">
+            <a:extLst>
+              <a:ext uri="{FF2B5EF4-FFF2-40B4-BE49-F238E27FC236}">
+                <a16:creationId xmlns:a16="http://schemas.microsoft.com/office/drawing/2014/main" id="{06A93DB0-E3BF-E7E4-966D-B246469F54DC}"/>
+              </a:ext>
+            </a:extLst>
+          </p:cNvPr>
+          <p:cNvPicPr preferRelativeResize="0"/>
+          <p:nvPr/>
+        </p:nvPicPr>
+        <p:blipFill rotWithShape="1">
+          <a:blip r:embed="rId4">
+            <a:alphaModFix/>
+          </a:blip>
+          <a:srcRect/>
+          <a:stretch/>
+        </p:blipFill>
+        <p:spPr>
+          <a:xfrm>
+            <a:off x="3965" y="0"/>
+            <a:ext cx="9136072" cy="5143501"/>
+          </a:xfrm>
+          <a:prstGeom prst="rect">
+            <a:avLst/>
+          </a:prstGeom>
+          <a:noFill/>
+          <a:ln>
+            <a:noFill/>
+          </a:ln>
+        </p:spPr>
+      </p:pic>
+      <p:sp>
+        <p:nvSpPr>
+          <p:cNvPr id="99" name="Google Shape;99;p18">
+            <a:extLst>
+              <a:ext uri="{FF2B5EF4-FFF2-40B4-BE49-F238E27FC236}">
+                <a16:creationId xmlns:a16="http://schemas.microsoft.com/office/drawing/2014/main" id="{E6EBC91A-FC8F-3082-F24A-DB7BA12355A1}"/>
+              </a:ext>
+            </a:extLst>
+          </p:cNvPr>
+          <p:cNvSpPr txBox="1"/>
+          <p:nvPr/>
+        </p:nvSpPr>
+        <p:spPr>
+          <a:xfrm>
+            <a:off x="576900" y="258012"/>
+            <a:ext cx="1951800" cy="338700"/>
+          </a:xfrm>
+          <a:prstGeom prst="rect">
+            <a:avLst/>
+          </a:prstGeom>
+          <a:noFill/>
+          <a:ln>
+            <a:noFill/>
+          </a:ln>
+        </p:spPr>
+        <p:txBody>
+          <a:bodyPr spcFirstLastPara="1" wrap="square" lIns="91425" tIns="91425" rIns="91425" bIns="91425" anchor="t" anchorCtr="0">
+            <a:spAutoFit/>
+          </a:bodyPr>
+          <a:lstStyle/>
+          <a:p>
+            <a:pPr marL="0" marR="0" lvl="0" indent="0" algn="l" rtl="0">
+              <a:lnSpc>
+                <a:spcPct val="100000"/>
+              </a:lnSpc>
+              <a:spcBef>
+                <a:spcPts val="0"/>
+              </a:spcBef>
+              <a:spcAft>
+                <a:spcPts val="0"/>
+              </a:spcAft>
+              <a:buClr>
+                <a:srgbClr val="000000"/>
+              </a:buClr>
+              <a:buSzPts val="1000"/>
+              <a:buFont typeface="Arial"/>
+              <a:buNone/>
+            </a:pPr>
+            <a:endParaRPr sz="1000" b="0" i="1" u="none" strike="noStrike" cap="none">
+              <a:solidFill>
+                <a:schemeClr val="dk1"/>
+              </a:solidFill>
+              <a:latin typeface="Plus Jakarta Sans Medium"/>
+              <a:ea typeface="Plus Jakarta Sans Medium"/>
+              <a:cs typeface="Plus Jakarta Sans Medium"/>
+              <a:sym typeface="Plus Jakarta Sans Medium"/>
+            </a:endParaRPr>
+          </a:p>
+        </p:txBody>
+      </p:sp>
+      <p:cxnSp>
+        <p:nvCxnSpPr>
+          <p:cNvPr id="100" name="Google Shape;100;p18">
+            <a:extLst>
+              <a:ext uri="{FF2B5EF4-FFF2-40B4-BE49-F238E27FC236}">
+                <a16:creationId xmlns:a16="http://schemas.microsoft.com/office/drawing/2014/main" id="{BB743CEA-D927-D4AB-ED6C-70B4CB2AB767}"/>
+              </a:ext>
+            </a:extLst>
+          </p:cNvPr>
+          <p:cNvCxnSpPr/>
+          <p:nvPr/>
+        </p:nvCxnSpPr>
+        <p:spPr>
+          <a:xfrm rot="10800000">
+            <a:off x="145800" y="418013"/>
+            <a:ext cx="431100" cy="0"/>
+          </a:xfrm>
+          <a:prstGeom prst="straightConnector1">
+            <a:avLst/>
+          </a:prstGeom>
+          <a:noFill/>
+          <a:ln w="28575" cap="flat" cmpd="sng">
+            <a:solidFill>
+              <a:srgbClr val="EA476D"/>
+            </a:solidFill>
+            <a:prstDash val="solid"/>
+            <a:round/>
+            <a:headEnd type="none" w="sm" len="sm"/>
+            <a:tailEnd type="none" w="sm" len="sm"/>
+          </a:ln>
+        </p:spPr>
+      </p:cxnSp>
+      <p:sp>
+        <p:nvSpPr>
+          <p:cNvPr id="101" name="Google Shape;101;p18">
+            <a:extLst>
+              <a:ext uri="{FF2B5EF4-FFF2-40B4-BE49-F238E27FC236}">
+                <a16:creationId xmlns:a16="http://schemas.microsoft.com/office/drawing/2014/main" id="{989D89E9-DD30-425B-AADC-9F005205A065}"/>
+              </a:ext>
+            </a:extLst>
+          </p:cNvPr>
+          <p:cNvSpPr/>
+          <p:nvPr/>
+        </p:nvSpPr>
+        <p:spPr>
+          <a:xfrm>
+            <a:off x="905550" y="1749919"/>
+            <a:ext cx="7332900" cy="2219100"/>
+          </a:xfrm>
+          <a:prstGeom prst="roundRect">
+            <a:avLst>
+              <a:gd name="adj" fmla="val 10085"/>
+            </a:avLst>
+          </a:prstGeom>
+          <a:solidFill>
+            <a:schemeClr val="dk1"/>
+          </a:solidFill>
+          <a:ln w="9525" cap="flat" cmpd="sng">
+            <a:solidFill>
+              <a:schemeClr val="lt1"/>
+            </a:solidFill>
+            <a:prstDash val="solid"/>
+            <a:round/>
+            <a:headEnd type="none" w="sm" len="sm"/>
+            <a:tailEnd type="none" w="sm" len="sm"/>
+          </a:ln>
+        </p:spPr>
+        <p:txBody>
+          <a:bodyPr spcFirstLastPara="1" wrap="square" lIns="91425" tIns="91425" rIns="91425" bIns="91425" anchor="ctr" anchorCtr="0">
+            <a:noAutofit/>
+          </a:bodyPr>
+          <a:lstStyle/>
+          <a:p>
+            <a:pPr marL="342900" marR="0" lvl="0" indent="-342900" algn="l" rtl="0">
+              <a:lnSpc>
+                <a:spcPct val="115000"/>
+              </a:lnSpc>
+              <a:spcBef>
+                <a:spcPts val="0"/>
+              </a:spcBef>
+              <a:spcAft>
+                <a:spcPts val="0"/>
+              </a:spcAft>
+              <a:buClr>
+                <a:srgbClr val="FFFF00"/>
+              </a:buClr>
+              <a:buSzPts val="1800"/>
+              <a:buFont typeface="Arial" panose="020B0604020202020204" pitchFamily="34" charset="0"/>
+              <a:buChar char="•"/>
+            </a:pPr>
+            <a:r>
+              <a:rPr lang="en" sz="2400" i="0" u="none" strike="noStrike" cap="none" dirty="0" err="1">
+                <a:solidFill>
+                  <a:srgbClr val="FFFF00"/>
+                </a:solidFill>
+                <a:latin typeface="Plus Jakarta Sans"/>
+                <a:ea typeface="Plus Jakarta Sans"/>
+                <a:cs typeface="Plus Jakarta Sans"/>
+                <a:sym typeface="Plus Jakarta Sans"/>
+              </a:rPr>
+              <a:t>acquisition_type</a:t>
+            </a:r>
+            <a:r>
+              <a:rPr lang="en" sz="2400" i="0" u="none" strike="noStrike" cap="none" dirty="0">
+                <a:solidFill>
+                  <a:srgbClr val="FFFF00"/>
+                </a:solidFill>
+                <a:latin typeface="Plus Jakarta Sans"/>
+                <a:ea typeface="Plus Jakarta Sans"/>
+                <a:cs typeface="Plus Jakarta Sans"/>
+                <a:sym typeface="Plus Jakarta Sans"/>
+              </a:rPr>
+              <a:t>     </a:t>
+            </a:r>
+            <a:r>
+              <a:rPr lang="en" sz="2400" i="0" u="none" strike="noStrike" cap="none" dirty="0">
+                <a:solidFill>
+                  <a:schemeClr val="bg1"/>
+                </a:solidFill>
+                <a:latin typeface="Plus Jakarta Sans"/>
+                <a:ea typeface="Plus Jakarta Sans"/>
+                <a:cs typeface="Plus Jakarta Sans"/>
+                <a:sym typeface="Plus Jakarta Sans"/>
+              </a:rPr>
+              <a:t>[‘Organic’, ‘Paid’]</a:t>
+            </a:r>
+          </a:p>
+          <a:p>
+            <a:pPr marL="342900" marR="0" lvl="0" indent="-342900" algn="l" rtl="0">
+              <a:lnSpc>
+                <a:spcPct val="115000"/>
+              </a:lnSpc>
+              <a:spcBef>
+                <a:spcPts val="0"/>
+              </a:spcBef>
+              <a:spcAft>
+                <a:spcPts val="0"/>
+              </a:spcAft>
+              <a:buClr>
+                <a:srgbClr val="FFFF00"/>
+              </a:buClr>
+              <a:buSzPts val="1800"/>
+              <a:buFont typeface="Arial" panose="020B0604020202020204" pitchFamily="34" charset="0"/>
+              <a:buChar char="•"/>
+            </a:pPr>
+            <a:r>
+              <a:rPr lang="en-US" sz="2400" dirty="0" err="1">
+                <a:solidFill>
+                  <a:srgbClr val="FFFF00"/>
+                </a:solidFill>
+                <a:latin typeface="Plus Jakarta Sans"/>
+                <a:ea typeface="Plus Jakarta Sans"/>
+                <a:cs typeface="Plus Jakarta Sans"/>
+                <a:sym typeface="Plus Jakarta Sans"/>
+              </a:rPr>
+              <a:t>membership_type</a:t>
+            </a:r>
+            <a:r>
+              <a:rPr lang="en-US" sz="2400" dirty="0">
+                <a:solidFill>
+                  <a:srgbClr val="FFFF00"/>
+                </a:solidFill>
+                <a:latin typeface="Plus Jakarta Sans"/>
+                <a:ea typeface="Plus Jakarta Sans"/>
+                <a:cs typeface="Plus Jakarta Sans"/>
+                <a:sym typeface="Plus Jakarta Sans"/>
+              </a:rPr>
+              <a:t>    </a:t>
+            </a:r>
+            <a:r>
+              <a:rPr lang="en-US" sz="2400" dirty="0">
+                <a:solidFill>
+                  <a:schemeClr val="bg1"/>
+                </a:solidFill>
+                <a:latin typeface="Plus Jakarta Sans"/>
+                <a:ea typeface="Plus Jakarta Sans"/>
+                <a:cs typeface="Plus Jakarta Sans"/>
+                <a:sym typeface="Plus Jakarta Sans"/>
+              </a:rPr>
+              <a:t>[‘paid’, ‘free’]</a:t>
+            </a:r>
+            <a:endParaRPr sz="2400" i="0" u="none" strike="noStrike" cap="none" dirty="0">
+              <a:solidFill>
+                <a:schemeClr val="bg1"/>
+              </a:solidFill>
+              <a:latin typeface="Plus Jakarta Sans"/>
+              <a:ea typeface="Plus Jakarta Sans"/>
+              <a:cs typeface="Plus Jakarta Sans"/>
+              <a:sym typeface="Plus Jakarta Sans"/>
+            </a:endParaRPr>
+          </a:p>
+        </p:txBody>
+      </p:sp>
+      <p:sp>
+        <p:nvSpPr>
+          <p:cNvPr id="102" name="Google Shape;102;p18">
+            <a:extLst>
+              <a:ext uri="{FF2B5EF4-FFF2-40B4-BE49-F238E27FC236}">
+                <a16:creationId xmlns:a16="http://schemas.microsoft.com/office/drawing/2014/main" id="{51512AC2-99B7-C5F1-625C-99C1046C70AD}"/>
+              </a:ext>
+            </a:extLst>
+          </p:cNvPr>
+          <p:cNvSpPr/>
+          <p:nvPr/>
+        </p:nvSpPr>
+        <p:spPr>
+          <a:xfrm>
+            <a:off x="2133601" y="957501"/>
+            <a:ext cx="4700954" cy="555300"/>
+          </a:xfrm>
+          <a:prstGeom prst="roundRect">
+            <a:avLst>
+              <a:gd name="adj" fmla="val 50000"/>
+            </a:avLst>
+          </a:prstGeom>
+          <a:solidFill>
+            <a:srgbClr val="EA476D"/>
+          </a:solidFill>
+          <a:ln>
+            <a:noFill/>
+          </a:ln>
+        </p:spPr>
+        <p:txBody>
+          <a:bodyPr spcFirstLastPara="1" wrap="square" lIns="45725" tIns="45725" rIns="45725" bIns="45725" anchor="ctr" anchorCtr="0">
+            <a:noAutofit/>
+          </a:bodyPr>
+          <a:lstStyle/>
+          <a:p>
+            <a:pPr marL="0" marR="0" lvl="0" indent="0" algn="ctr" rtl="0">
+              <a:lnSpc>
+                <a:spcPct val="100000"/>
+              </a:lnSpc>
+              <a:spcBef>
+                <a:spcPts val="0"/>
+              </a:spcBef>
+              <a:spcAft>
+                <a:spcPts val="0"/>
+              </a:spcAft>
+              <a:buClr>
+                <a:srgbClr val="000000"/>
+              </a:buClr>
+              <a:buSzPts val="1800"/>
+              <a:buFont typeface="Arial"/>
+              <a:buNone/>
+            </a:pPr>
+            <a:r>
+              <a:rPr lang="en" sz="2400" b="1" i="0" u="none" strike="noStrike" cap="none" dirty="0">
+                <a:solidFill>
+                  <a:srgbClr val="FFFFFF"/>
+                </a:solidFill>
+                <a:latin typeface="Poppins"/>
+                <a:ea typeface="Poppins"/>
+                <a:cs typeface="Poppins"/>
+                <a:sym typeface="Poppins"/>
+              </a:rPr>
+              <a:t>Dataset Features of Interest</a:t>
+            </a:r>
+            <a:endParaRPr sz="2400" b="1" i="0" u="none" strike="noStrike" cap="none" dirty="0">
+              <a:solidFill>
+                <a:srgbClr val="FFFFFF"/>
+              </a:solidFill>
+              <a:latin typeface="Poppins"/>
+              <a:ea typeface="Poppins"/>
+              <a:cs typeface="Poppins"/>
+              <a:sym typeface="Poppins"/>
+            </a:endParaRPr>
+          </a:p>
+        </p:txBody>
+      </p:sp>
+      <p:sp>
+        <p:nvSpPr>
+          <p:cNvPr id="103" name="Google Shape;103;p18">
+            <a:extLst>
+              <a:ext uri="{FF2B5EF4-FFF2-40B4-BE49-F238E27FC236}">
+                <a16:creationId xmlns:a16="http://schemas.microsoft.com/office/drawing/2014/main" id="{C8FE9A87-E313-AB1B-71D9-8BA8AAE60ED6}"/>
+              </a:ext>
+            </a:extLst>
+          </p:cNvPr>
+          <p:cNvSpPr/>
+          <p:nvPr/>
+        </p:nvSpPr>
+        <p:spPr>
+          <a:xfrm>
+            <a:off x="6343375" y="-2771428"/>
+            <a:ext cx="3933600" cy="3933600"/>
+          </a:xfrm>
+          <a:prstGeom prst="ellipse">
+            <a:avLst/>
+          </a:prstGeom>
+          <a:noFill/>
+          <a:ln w="38100" cap="flat" cmpd="sng">
+            <a:solidFill>
+              <a:srgbClr val="72CFED"/>
+            </a:solidFill>
+            <a:prstDash val="solid"/>
+            <a:round/>
+            <a:headEnd type="none" w="sm" len="sm"/>
+            <a:tailEnd type="none" w="sm" len="sm"/>
+          </a:ln>
+        </p:spPr>
+        <p:txBody>
+          <a:bodyPr spcFirstLastPara="1" wrap="square" lIns="91425" tIns="91425" rIns="91425" bIns="91425" anchor="ctr" anchorCtr="0">
+            <a:noAutofit/>
+          </a:bodyPr>
+          <a:lstStyle/>
+          <a:p>
+            <a:pPr marL="0" marR="0" lvl="0" indent="0" algn="l" rtl="0">
+              <a:lnSpc>
+                <a:spcPct val="100000"/>
+              </a:lnSpc>
+              <a:spcBef>
+                <a:spcPts val="0"/>
+              </a:spcBef>
+              <a:spcAft>
+                <a:spcPts val="0"/>
+              </a:spcAft>
+              <a:buClr>
+                <a:srgbClr val="000000"/>
+              </a:buClr>
+              <a:buSzPts val="1400"/>
+              <a:buFont typeface="Arial"/>
+              <a:buNone/>
+            </a:pPr>
+            <a:endParaRPr sz="1400" b="0" i="0" u="none" strike="noStrike" cap="none">
+              <a:solidFill>
+                <a:srgbClr val="000000"/>
+              </a:solidFill>
+              <a:latin typeface="Arial"/>
+              <a:ea typeface="Arial"/>
+              <a:cs typeface="Arial"/>
+              <a:sym typeface="Arial"/>
+            </a:endParaRPr>
+          </a:p>
+        </p:txBody>
+      </p:sp>
+    </p:spTree>
+    <p:extLst>
+      <p:ext uri="{BB962C8B-B14F-4D97-AF65-F5344CB8AC3E}">
+        <p14:creationId xmlns:p14="http://schemas.microsoft.com/office/powerpoint/2010/main" val="308343373"/>
+      </p:ext>
+    </p:extLst>
   </p:cSld>
   <p:clrMapOvr>
     <a:masterClrMapping/>
@@ -11717,25 +11176,11 @@
 </file>
 
 <file path=ppt/slides/slide8.xml><?xml version="1.0" encoding="utf-8"?>
-<p:sld xmlns:a="http://schemas.openxmlformats.org/drawingml/2006/main" xmlns:r="http://schemas.openxmlformats.org/officeDocument/2006/relationships" xmlns:p="http://schemas.openxmlformats.org/presentationml/2006/main">
+<p:sld xmlns:a="http://schemas.openxmlformats.org/drawingml/2006/main" xmlns:r="http://schemas.openxmlformats.org/officeDocument/2006/relationships" xmlns:p="http://schemas.openxmlformats.org/presentationml/2006/main" show="0">
   <p:cSld>
-    <p:bg>
-      <p:bgPr>
-        <a:solidFill>
-          <a:schemeClr val="dk1"/>
-        </a:solidFill>
-        <a:effectLst/>
-      </p:bgPr>
-    </p:bg>
     <p:spTree>
       <p:nvGrpSpPr>
-        <p:cNvPr id="1" name="Shape 96">
-          <a:extLst>
-            <a:ext uri="{FF2B5EF4-FFF2-40B4-BE49-F238E27FC236}">
-              <a16:creationId xmlns:a16="http://schemas.microsoft.com/office/drawing/2014/main" id="{C6D9C94D-8BF8-DA5E-6222-64AE48D11A98}"/>
-            </a:ext>
-          </a:extLst>
-        </p:cNvPr>
+        <p:cNvPr id="1" name="Shape 53"/>
         <p:cNvGrpSpPr/>
         <p:nvPr/>
       </p:nvGrpSpPr>
@@ -11749,60 +11194,22 @@
       </p:grpSpPr>
       <p:pic>
         <p:nvPicPr>
-          <p:cNvPr id="97" name="Google Shape;97;p18">
-            <a:extLst>
-              <a:ext uri="{FF2B5EF4-FFF2-40B4-BE49-F238E27FC236}">
-                <a16:creationId xmlns:a16="http://schemas.microsoft.com/office/drawing/2014/main" id="{90E0A4E4-9AB0-F2C3-46CE-5BCE750679AF}"/>
-              </a:ext>
-            </a:extLst>
-          </p:cNvPr>
+          <p:cNvPr id="54" name="Google Shape;54;p13"/>
           <p:cNvPicPr preferRelativeResize="0"/>
           <p:nvPr/>
         </p:nvPicPr>
-        <p:blipFill rotWithShape="1">
+        <p:blipFill>
           <a:blip r:embed="rId3">
             <a:alphaModFix/>
           </a:blip>
-          <a:srcRect/>
-          <a:stretch/>
-        </p:blipFill>
-        <p:spPr>
-          <a:xfrm rot="-7200012">
-            <a:off x="-239314" y="3069734"/>
-            <a:ext cx="3461853" cy="4147532"/>
-          </a:xfrm>
-          <a:prstGeom prst="rect">
-            <a:avLst/>
-          </a:prstGeom>
-          <a:noFill/>
-          <a:ln>
-            <a:noFill/>
-          </a:ln>
-        </p:spPr>
-      </p:pic>
-      <p:pic>
-        <p:nvPicPr>
-          <p:cNvPr id="98" name="Google Shape;98;p18">
-            <a:extLst>
-              <a:ext uri="{FF2B5EF4-FFF2-40B4-BE49-F238E27FC236}">
-                <a16:creationId xmlns:a16="http://schemas.microsoft.com/office/drawing/2014/main" id="{06A93DB0-E3BF-E7E4-966D-B246469F54DC}"/>
-              </a:ext>
-            </a:extLst>
-          </p:cNvPr>
-          <p:cNvPicPr preferRelativeResize="0"/>
-          <p:nvPr/>
-        </p:nvPicPr>
-        <p:blipFill rotWithShape="1">
-          <a:blip r:embed="rId4">
-            <a:alphaModFix/>
-          </a:blip>
-          <a:srcRect/>
-          <a:stretch/>
+          <a:stretch>
+            <a:fillRect/>
+          </a:stretch>
         </p:blipFill>
         <p:spPr>
           <a:xfrm>
-            <a:off x="3965" y="0"/>
-            <a:ext cx="9136072" cy="5143501"/>
+            <a:off x="0" y="0"/>
+            <a:ext cx="9144003" cy="5143501"/>
           </a:xfrm>
           <a:prstGeom prst="rect">
             <a:avLst/>
@@ -11815,20 +11222,14 @@
       </p:pic>
       <p:sp>
         <p:nvSpPr>
-          <p:cNvPr id="99" name="Google Shape;99;p18">
-            <a:extLst>
-              <a:ext uri="{FF2B5EF4-FFF2-40B4-BE49-F238E27FC236}">
-                <a16:creationId xmlns:a16="http://schemas.microsoft.com/office/drawing/2014/main" id="{E6EBC91A-FC8F-3082-F24A-DB7BA12355A1}"/>
-              </a:ext>
-            </a:extLst>
-          </p:cNvPr>
+          <p:cNvPr id="55" name="Google Shape;55;p13"/>
           <p:cNvSpPr txBox="1"/>
           <p:nvPr/>
         </p:nvSpPr>
         <p:spPr>
           <a:xfrm>
-            <a:off x="576900" y="258012"/>
-            <a:ext cx="1951800" cy="338700"/>
+            <a:off x="266250" y="345300"/>
+            <a:ext cx="8611500" cy="4468500"/>
           </a:xfrm>
           <a:prstGeom prst="rect">
             <a:avLst/>
@@ -11844,9 +11245,9 @@
           </a:bodyPr>
           <a:lstStyle/>
           <a:p>
-            <a:pPr marL="0" marR="0" lvl="0" indent="0" algn="l" rtl="0">
+            <a:pPr marL="0" lvl="0" indent="0" algn="l" rtl="0">
               <a:lnSpc>
-                <a:spcPct val="100000"/>
+                <a:spcPct val="115000"/>
               </a:lnSpc>
               <a:spcBef>
                 <a:spcPts val="0"/>
@@ -11854,14 +11255,21 @@
               <a:spcAft>
                 <a:spcPts val="0"/>
               </a:spcAft>
-              <a:buClr>
-                <a:srgbClr val="000000"/>
-              </a:buClr>
-              <a:buSzPts val="1000"/>
-              <a:buFont typeface="Arial"/>
               <a:buNone/>
             </a:pPr>
-            <a:endParaRPr sz="1000" b="0" i="1" u="none" strike="noStrike" cap="none">
+            <a:r>
+              <a:rPr lang="en" sz="1050">
+                <a:solidFill>
+                  <a:schemeClr val="dk1"/>
+                </a:solidFill>
+                <a:latin typeface="Plus Jakarta Sans Medium"/>
+                <a:ea typeface="Plus Jakarta Sans Medium"/>
+                <a:cs typeface="Plus Jakarta Sans Medium"/>
+                <a:sym typeface="Plus Jakarta Sans Medium"/>
+              </a:rPr>
+              <a:t>We’re excited to see your sample LiveLab! The slides here are from part of a real LiveLab we deliver to our students! Like you’ve talked about, LiveLab is where we marry the classroom with the “real world”. It’s where students get their hands dirty with real-life, real-world data. Each time students log on, they get to tackle a different problem – or problem(s) – that a real organization might be trying to solve. And the best part? You guessed it: they solve these problems with data.</a:t>
+            </a:r>
+            <a:endParaRPr sz="1050">
               <a:solidFill>
                 <a:schemeClr val="dk1"/>
               </a:solidFill>
@@ -11871,82 +11279,8 @@
               <a:sym typeface="Plus Jakarta Sans Medium"/>
             </a:endParaRPr>
           </a:p>
-        </p:txBody>
-      </p:sp>
-      <p:cxnSp>
-        <p:nvCxnSpPr>
-          <p:cNvPr id="100" name="Google Shape;100;p18">
-            <a:extLst>
-              <a:ext uri="{FF2B5EF4-FFF2-40B4-BE49-F238E27FC236}">
-                <a16:creationId xmlns:a16="http://schemas.microsoft.com/office/drawing/2014/main" id="{BB743CEA-D927-D4AB-ED6C-70B4CB2AB767}"/>
-              </a:ext>
-            </a:extLst>
-          </p:cNvPr>
-          <p:cNvCxnSpPr/>
-          <p:nvPr/>
-        </p:nvCxnSpPr>
-        <p:spPr>
-          <a:xfrm rot="10800000">
-            <a:off x="145800" y="418013"/>
-            <a:ext cx="431100" cy="0"/>
-          </a:xfrm>
-          <a:prstGeom prst="straightConnector1">
-            <a:avLst/>
-          </a:prstGeom>
-          <a:noFill/>
-          <a:ln w="28575" cap="flat" cmpd="sng">
-            <a:solidFill>
-              <a:srgbClr val="EA476D"/>
-            </a:solidFill>
-            <a:prstDash val="solid"/>
-            <a:round/>
-            <a:headEnd type="none" w="sm" len="sm"/>
-            <a:tailEnd type="none" w="sm" len="sm"/>
-          </a:ln>
-        </p:spPr>
-      </p:cxnSp>
-      <p:sp>
-        <p:nvSpPr>
-          <p:cNvPr id="101" name="Google Shape;101;p18">
-            <a:extLst>
-              <a:ext uri="{FF2B5EF4-FFF2-40B4-BE49-F238E27FC236}">
-                <a16:creationId xmlns:a16="http://schemas.microsoft.com/office/drawing/2014/main" id="{989D89E9-DD30-425B-AADC-9F005205A065}"/>
-              </a:ext>
-            </a:extLst>
-          </p:cNvPr>
-          <p:cNvSpPr/>
-          <p:nvPr/>
-        </p:nvSpPr>
-        <p:spPr>
-          <a:xfrm>
-            <a:off x="905550" y="1778200"/>
-            <a:ext cx="7332900" cy="2219100"/>
-          </a:xfrm>
-          <a:prstGeom prst="roundRect">
-            <a:avLst>
-              <a:gd name="adj" fmla="val 10085"/>
-            </a:avLst>
-          </a:prstGeom>
-          <a:solidFill>
-            <a:schemeClr val="dk1"/>
-          </a:solidFill>
-          <a:ln w="9525" cap="flat" cmpd="sng">
-            <a:solidFill>
-              <a:schemeClr val="lt1"/>
-            </a:solidFill>
-            <a:prstDash val="solid"/>
-            <a:round/>
-            <a:headEnd type="none" w="sm" len="sm"/>
-            <a:tailEnd type="none" w="sm" len="sm"/>
-          </a:ln>
-        </p:spPr>
-        <p:txBody>
-          <a:bodyPr spcFirstLastPara="1" wrap="square" lIns="91425" tIns="91425" rIns="91425" bIns="91425" anchor="ctr" anchorCtr="0">
-            <a:noAutofit/>
-          </a:bodyPr>
-          <a:lstStyle/>
-          <a:p>
-            <a:pPr marL="0" marR="0" lvl="0" indent="0" algn="l" rtl="0">
+          <a:p>
+            <a:pPr marL="0" lvl="0" indent="0" algn="l" rtl="0">
               <a:lnSpc>
                 <a:spcPct val="115000"/>
               </a:lnSpc>
@@ -11957,316 +11291,534 @@
                 <a:spcPts val="0"/>
               </a:spcAft>
               <a:buClr>
-                <a:srgbClr val="000000"/>
+                <a:schemeClr val="dk1"/>
               </a:buClr>
-              <a:buSzPts val="1800"/>
+              <a:buSzPts val="1100"/>
               <a:buFont typeface="Arial"/>
               <a:buNone/>
             </a:pPr>
-            <a:r>
-              <a:rPr lang="en" sz="2400" dirty="0">
-                <a:solidFill>
-                  <a:schemeClr val="lt1"/>
+            <a:endParaRPr sz="1050">
+              <a:solidFill>
+                <a:schemeClr val="dk1"/>
+              </a:solidFill>
+              <a:latin typeface="Plus Jakarta Sans Medium"/>
+              <a:ea typeface="Plus Jakarta Sans Medium"/>
+              <a:cs typeface="Plus Jakarta Sans Medium"/>
+              <a:sym typeface="Plus Jakarta Sans Medium"/>
+            </a:endParaRPr>
+          </a:p>
+          <a:p>
+            <a:pPr marL="0" lvl="0" indent="0" algn="l" rtl="0">
+              <a:lnSpc>
+                <a:spcPct val="115000"/>
+              </a:lnSpc>
+              <a:spcBef>
+                <a:spcPts val="0"/>
+              </a:spcBef>
+              <a:spcAft>
+                <a:spcPts val="0"/>
+              </a:spcAft>
+              <a:buNone/>
+            </a:pPr>
+            <a:r>
+              <a:rPr lang="en" sz="1050">
+                <a:solidFill>
+                  <a:schemeClr val="dk1"/>
+                </a:solidFill>
+                <a:latin typeface="Plus Jakarta Sans Medium"/>
+                <a:ea typeface="Plus Jakarta Sans Medium"/>
+                <a:cs typeface="Plus Jakarta Sans Medium"/>
+                <a:sym typeface="Plus Jakarta Sans Medium"/>
+              </a:rPr>
+              <a:t>LiveLab is all about practicing thinking like data analysts, asking the right questions, and using tools (python/sql) to find the story that’s hiding in the data. And, maybe even most importantly, also practicing how to communicate that data story.</a:t>
+            </a:r>
+            <a:endParaRPr sz="1050">
+              <a:solidFill>
+                <a:schemeClr val="dk1"/>
+              </a:solidFill>
+              <a:latin typeface="Plus Jakarta Sans Medium"/>
+              <a:ea typeface="Plus Jakarta Sans Medium"/>
+              <a:cs typeface="Plus Jakarta Sans Medium"/>
+              <a:sym typeface="Plus Jakarta Sans Medium"/>
+            </a:endParaRPr>
+          </a:p>
+          <a:p>
+            <a:pPr marL="0" lvl="0" indent="0" algn="l" rtl="0">
+              <a:lnSpc>
+                <a:spcPct val="115000"/>
+              </a:lnSpc>
+              <a:spcBef>
+                <a:spcPts val="0"/>
+              </a:spcBef>
+              <a:spcAft>
+                <a:spcPts val="0"/>
+              </a:spcAft>
+              <a:buClr>
+                <a:schemeClr val="dk1"/>
+              </a:buClr>
+              <a:buSzPts val="1100"/>
+              <a:buFont typeface="Arial"/>
+              <a:buNone/>
+            </a:pPr>
+            <a:endParaRPr sz="1050">
+              <a:solidFill>
+                <a:schemeClr val="dk1"/>
+              </a:solidFill>
+              <a:latin typeface="Plus Jakarta Sans Medium"/>
+              <a:ea typeface="Plus Jakarta Sans Medium"/>
+              <a:cs typeface="Plus Jakarta Sans Medium"/>
+              <a:sym typeface="Plus Jakarta Sans Medium"/>
+            </a:endParaRPr>
+          </a:p>
+          <a:p>
+            <a:pPr marL="0" lvl="0" indent="0" algn="l" rtl="0">
+              <a:lnSpc>
+                <a:spcPct val="115000"/>
+              </a:lnSpc>
+              <a:spcBef>
+                <a:spcPts val="0"/>
+              </a:spcBef>
+              <a:spcAft>
+                <a:spcPts val="0"/>
+              </a:spcAft>
+              <a:buClr>
+                <a:schemeClr val="dk1"/>
+              </a:buClr>
+              <a:buSzPts val="1100"/>
+              <a:buFont typeface="Arial"/>
+              <a:buNone/>
+            </a:pPr>
+            <a:r>
+              <a:rPr lang="en" sz="1050">
+                <a:solidFill>
+                  <a:schemeClr val="dk1"/>
+                </a:solidFill>
+                <a:latin typeface="Plus Jakarta Sans Medium"/>
+                <a:ea typeface="Plus Jakarta Sans Medium"/>
+                <a:cs typeface="Plus Jakarta Sans Medium"/>
+                <a:sym typeface="Plus Jakarta Sans Medium"/>
+              </a:rPr>
+              <a:t>The following slides are to aid in setting up the company and the problem. The problem (on Slide #6) is about comparing and evaluating the conversion rates of organic acquisitions and paid acquisitions at Headspace. The </a:t>
+            </a:r>
+            <a:r>
+              <a:rPr lang="en" sz="1150">
+                <a:solidFill>
+                  <a:schemeClr val="dk1"/>
+                </a:solidFill>
+                <a:latin typeface="Inconsolata Medium"/>
+                <a:ea typeface="Inconsolata Medium"/>
+                <a:cs typeface="Inconsolata Medium"/>
+                <a:sym typeface="Inconsolata Medium"/>
+              </a:rPr>
+              <a:t>.csv</a:t>
+            </a:r>
+            <a:r>
+              <a:rPr lang="en" sz="1050">
+                <a:solidFill>
+                  <a:schemeClr val="dk1"/>
+                </a:solidFill>
+                <a:latin typeface="Plus Jakarta Sans Medium"/>
+                <a:ea typeface="Plus Jakarta Sans Medium"/>
+                <a:cs typeface="Plus Jakarta Sans Medium"/>
+                <a:sym typeface="Plus Jakarta Sans Medium"/>
+              </a:rPr>
+              <a:t> and the </a:t>
+            </a:r>
+            <a:r>
+              <a:rPr lang="en" sz="1150">
+                <a:solidFill>
+                  <a:schemeClr val="dk1"/>
+                </a:solidFill>
+                <a:latin typeface="Inconsolata Medium"/>
+                <a:ea typeface="Inconsolata Medium"/>
+                <a:cs typeface="Inconsolata Medium"/>
+                <a:sym typeface="Inconsolata Medium"/>
+              </a:rPr>
+              <a:t>.ipynb</a:t>
+            </a:r>
+            <a:r>
+              <a:rPr lang="en" sz="1050">
+                <a:solidFill>
+                  <a:schemeClr val="dk1"/>
+                </a:solidFill>
+                <a:latin typeface="Plus Jakarta Sans Medium"/>
+                <a:ea typeface="Plus Jakarta Sans Medium"/>
+                <a:cs typeface="Plus Jakarta Sans Medium"/>
+                <a:sym typeface="Plus Jakarta Sans Medium"/>
+              </a:rPr>
+              <a:t> (also linked below!) are used to solve the problem and find that story hidden in the data.</a:t>
+            </a:r>
+            <a:endParaRPr sz="1050">
+              <a:solidFill>
+                <a:schemeClr val="dk1"/>
+              </a:solidFill>
+              <a:latin typeface="Plus Jakarta Sans Medium"/>
+              <a:ea typeface="Plus Jakarta Sans Medium"/>
+              <a:cs typeface="Plus Jakarta Sans Medium"/>
+              <a:sym typeface="Plus Jakarta Sans Medium"/>
+            </a:endParaRPr>
+          </a:p>
+          <a:p>
+            <a:pPr marL="0" lvl="0" indent="0" algn="l" rtl="0">
+              <a:lnSpc>
+                <a:spcPct val="115000"/>
+              </a:lnSpc>
+              <a:spcBef>
+                <a:spcPts val="0"/>
+              </a:spcBef>
+              <a:spcAft>
+                <a:spcPts val="0"/>
+              </a:spcAft>
+              <a:buNone/>
+            </a:pPr>
+            <a:r>
+              <a:rPr lang="en" sz="1050">
+                <a:solidFill>
+                  <a:schemeClr val="dk1"/>
+                </a:solidFill>
+                <a:latin typeface="Plus Jakarta Sans Medium"/>
+                <a:ea typeface="Plus Jakarta Sans Medium"/>
+                <a:cs typeface="Plus Jakarta Sans Medium"/>
+                <a:sym typeface="Plus Jakarta Sans Medium"/>
+              </a:rPr>
+              <a:t> </a:t>
+            </a:r>
+            <a:endParaRPr sz="1050">
+              <a:solidFill>
+                <a:schemeClr val="dk1"/>
+              </a:solidFill>
+              <a:latin typeface="Plus Jakarta Sans Medium"/>
+              <a:ea typeface="Plus Jakarta Sans Medium"/>
+              <a:cs typeface="Plus Jakarta Sans Medium"/>
+              <a:sym typeface="Plus Jakarta Sans Medium"/>
+            </a:endParaRPr>
+          </a:p>
+          <a:p>
+            <a:pPr marL="0" lvl="0" indent="0" algn="l" rtl="0">
+              <a:lnSpc>
+                <a:spcPct val="115000"/>
+              </a:lnSpc>
+              <a:spcBef>
+                <a:spcPts val="0"/>
+              </a:spcBef>
+              <a:spcAft>
+                <a:spcPts val="0"/>
+              </a:spcAft>
+              <a:buNone/>
+            </a:pPr>
+            <a:r>
+              <a:rPr lang="en" sz="1050">
+                <a:solidFill>
+                  <a:schemeClr val="dk1"/>
+                </a:solidFill>
+                <a:latin typeface="Plus Jakarta Sans Medium"/>
+                <a:ea typeface="Plus Jakarta Sans Medium"/>
+                <a:cs typeface="Plus Jakarta Sans Medium"/>
+                <a:sym typeface="Plus Jakarta Sans Medium"/>
+              </a:rPr>
+              <a:t>You’ll use them – with your own flare – to deliver it for your Sample Teach Interview. We’re looking for a rockstar teacher who will incorporate their passion for data analytics and their “real-world” experiences into the learning topic we teach.</a:t>
+            </a:r>
+            <a:endParaRPr sz="1050">
+              <a:solidFill>
+                <a:schemeClr val="dk1"/>
+              </a:solidFill>
+              <a:latin typeface="Plus Jakarta Sans Medium"/>
+              <a:ea typeface="Plus Jakarta Sans Medium"/>
+              <a:cs typeface="Plus Jakarta Sans Medium"/>
+              <a:sym typeface="Plus Jakarta Sans Medium"/>
+            </a:endParaRPr>
+          </a:p>
+          <a:p>
+            <a:pPr marL="0" lvl="0" indent="0" algn="l" rtl="0">
+              <a:lnSpc>
+                <a:spcPct val="115000"/>
+              </a:lnSpc>
+              <a:spcBef>
+                <a:spcPts val="0"/>
+              </a:spcBef>
+              <a:spcAft>
+                <a:spcPts val="0"/>
+              </a:spcAft>
+              <a:buNone/>
+            </a:pPr>
+            <a:endParaRPr sz="1050">
+              <a:solidFill>
+                <a:schemeClr val="dk1"/>
+              </a:solidFill>
+              <a:latin typeface="Plus Jakarta Sans Medium"/>
+              <a:ea typeface="Plus Jakarta Sans Medium"/>
+              <a:cs typeface="Plus Jakarta Sans Medium"/>
+              <a:sym typeface="Plus Jakarta Sans Medium"/>
+            </a:endParaRPr>
+          </a:p>
+          <a:p>
+            <a:pPr marL="0" lvl="0" indent="0" algn="l" rtl="0">
+              <a:lnSpc>
+                <a:spcPct val="115000"/>
+              </a:lnSpc>
+              <a:spcBef>
+                <a:spcPts val="0"/>
+              </a:spcBef>
+              <a:spcAft>
+                <a:spcPts val="0"/>
+              </a:spcAft>
+              <a:buNone/>
+            </a:pPr>
+            <a:r>
+              <a:rPr lang="en" sz="1050">
+                <a:solidFill>
+                  <a:schemeClr val="dk1"/>
+                </a:solidFill>
+                <a:latin typeface="Plus Jakarta Sans Medium"/>
+                <a:ea typeface="Plus Jakarta Sans Medium"/>
+                <a:cs typeface="Plus Jakarta Sans Medium"/>
+                <a:sym typeface="Plus Jakarta Sans Medium"/>
+              </a:rPr>
+              <a:t>You’ll find some speaker notes in each slide, but we ask you to put your own spin on delivering this lesson to students. Make sure you’re keeping your “students” engaged. Invite us to come off mute, encourage participation in the chat, lean on techniques you know and use.  If you’re so inclined, feel free to make a copy of these slides and edit them to be your own. We can’t wait to see what you come up with!</a:t>
+            </a:r>
+            <a:endParaRPr sz="1050">
+              <a:solidFill>
+                <a:schemeClr val="dk1"/>
+              </a:solidFill>
+              <a:latin typeface="Plus Jakarta Sans Medium"/>
+              <a:ea typeface="Plus Jakarta Sans Medium"/>
+              <a:cs typeface="Plus Jakarta Sans Medium"/>
+              <a:sym typeface="Plus Jakarta Sans Medium"/>
+            </a:endParaRPr>
+          </a:p>
+          <a:p>
+            <a:pPr marL="0" lvl="0" indent="0" algn="l" rtl="0">
+              <a:lnSpc>
+                <a:spcPct val="115000"/>
+              </a:lnSpc>
+              <a:spcBef>
+                <a:spcPts val="0"/>
+              </a:spcBef>
+              <a:spcAft>
+                <a:spcPts val="0"/>
+              </a:spcAft>
+              <a:buNone/>
+            </a:pPr>
+            <a:endParaRPr sz="1050">
+              <a:solidFill>
+                <a:schemeClr val="dk1"/>
+              </a:solidFill>
+              <a:latin typeface="Plus Jakarta Sans Medium"/>
+              <a:ea typeface="Plus Jakarta Sans Medium"/>
+              <a:cs typeface="Plus Jakarta Sans Medium"/>
+              <a:sym typeface="Plus Jakarta Sans Medium"/>
+            </a:endParaRPr>
+          </a:p>
+          <a:p>
+            <a:pPr marL="0" lvl="0" indent="0" algn="l" rtl="0">
+              <a:lnSpc>
+                <a:spcPct val="115000"/>
+              </a:lnSpc>
+              <a:spcBef>
+                <a:spcPts val="0"/>
+              </a:spcBef>
+              <a:spcAft>
+                <a:spcPts val="0"/>
+              </a:spcAft>
+              <a:buNone/>
+            </a:pPr>
+            <a:r>
+              <a:rPr lang="en" sz="1050">
+                <a:solidFill>
+                  <a:schemeClr val="dk1"/>
+                </a:solidFill>
+                <a:latin typeface="Plus Jakarta Sans Medium"/>
+                <a:ea typeface="Plus Jakarta Sans Medium"/>
+                <a:cs typeface="Plus Jakarta Sans Medium"/>
+                <a:sym typeface="Plus Jakarta Sans Medium"/>
+              </a:rPr>
+              <a:t>p.s. You might find it more effective to use a Jupyter Notebook and make use of markdown. We’re perfectly okay with that, too!</a:t>
+            </a:r>
+            <a:endParaRPr sz="1050">
+              <a:solidFill>
+                <a:schemeClr val="dk1"/>
+              </a:solidFill>
+              <a:latin typeface="Plus Jakarta Sans Medium"/>
+              <a:ea typeface="Plus Jakarta Sans Medium"/>
+              <a:cs typeface="Plus Jakarta Sans Medium"/>
+              <a:sym typeface="Plus Jakarta Sans Medium"/>
+            </a:endParaRPr>
+          </a:p>
+          <a:p>
+            <a:pPr marL="0" lvl="0" indent="0" algn="l" rtl="0">
+              <a:lnSpc>
+                <a:spcPct val="115000"/>
+              </a:lnSpc>
+              <a:spcBef>
+                <a:spcPts val="0"/>
+              </a:spcBef>
+              <a:spcAft>
+                <a:spcPts val="0"/>
+              </a:spcAft>
+              <a:buNone/>
+            </a:pPr>
+            <a:endParaRPr sz="1050">
+              <a:solidFill>
+                <a:schemeClr val="dk1"/>
+              </a:solidFill>
+              <a:latin typeface="Plus Jakarta Sans Medium"/>
+              <a:ea typeface="Plus Jakarta Sans Medium"/>
+              <a:cs typeface="Plus Jakarta Sans Medium"/>
+              <a:sym typeface="Plus Jakarta Sans Medium"/>
+            </a:endParaRPr>
+          </a:p>
+          <a:p>
+            <a:pPr marL="0" lvl="0" indent="0" algn="l" rtl="0">
+              <a:lnSpc>
+                <a:spcPct val="115000"/>
+              </a:lnSpc>
+              <a:spcBef>
+                <a:spcPts val="0"/>
+              </a:spcBef>
+              <a:spcAft>
+                <a:spcPts val="0"/>
+              </a:spcAft>
+              <a:buNone/>
+            </a:pPr>
+            <a:r>
+              <a:rPr lang="en" sz="1050">
+                <a:solidFill>
+                  <a:schemeClr val="dk1"/>
+                </a:solidFill>
+                <a:latin typeface="Plus Jakarta Sans Medium"/>
+                <a:ea typeface="Plus Jakarta Sans Medium"/>
+                <a:cs typeface="Plus Jakarta Sans Medium"/>
+                <a:sym typeface="Plus Jakarta Sans Medium"/>
+              </a:rPr>
+              <a:t>p.p.s. </a:t>
+            </a:r>
+            <a:r>
+              <a:rPr lang="en" sz="1050" b="1" u="sng">
+                <a:solidFill>
+                  <a:srgbClr val="B67AE5"/>
                 </a:solidFill>
                 <a:latin typeface="Plus Jakarta Sans"/>
                 <a:ea typeface="Plus Jakarta Sans"/>
                 <a:cs typeface="Plus Jakarta Sans"/>
                 <a:sym typeface="Plus Jakarta Sans"/>
+                <a:hlinkClick r:id="rId4">
+                  <a:extLst>
+                    <a:ext uri="{A12FA001-AC4F-418D-AE19-62706E023703}">
+                      <ahyp:hlinkClr xmlns:ahyp="http://schemas.microsoft.com/office/drawing/2018/hyperlinkcolor" val="tx"/>
+                    </a:ext>
+                  </a:extLst>
+                </a:hlinkClick>
               </a:rPr>
-              <a:t>The marketing team wants to compare and evaluate the </a:t>
-            </a:r>
-            <a:r>
-              <a:rPr lang="en" sz="2400" dirty="0">
-                <a:solidFill>
-                  <a:schemeClr val="accent6"/>
+              <a:t>Here</a:t>
+            </a:r>
+            <a:r>
+              <a:rPr lang="en" sz="1050">
+                <a:solidFill>
+                  <a:schemeClr val="dk1"/>
+                </a:solidFill>
+                <a:latin typeface="Plus Jakarta Sans Medium"/>
+                <a:ea typeface="Plus Jakarta Sans Medium"/>
+                <a:cs typeface="Plus Jakarta Sans Medium"/>
+                <a:sym typeface="Plus Jakarta Sans Medium"/>
+              </a:rPr>
+              <a:t> is a direct-to-download link of a corresponding </a:t>
+            </a:r>
+            <a:r>
+              <a:rPr lang="en" sz="1150">
+                <a:solidFill>
+                  <a:schemeClr val="dk1"/>
+                </a:solidFill>
+                <a:latin typeface="Inconsolata Medium"/>
+                <a:ea typeface="Inconsolata Medium"/>
+                <a:cs typeface="Inconsolata Medium"/>
+                <a:sym typeface="Inconsolata Medium"/>
+              </a:rPr>
+              <a:t>.ipynb</a:t>
+            </a:r>
+            <a:r>
+              <a:rPr lang="en" sz="1050">
+                <a:solidFill>
+                  <a:schemeClr val="dk1"/>
+                </a:solidFill>
+                <a:latin typeface="Plus Jakarta Sans Medium"/>
+                <a:ea typeface="Plus Jakarta Sans Medium"/>
+                <a:cs typeface="Plus Jakarta Sans Medium"/>
+                <a:sym typeface="Plus Jakarta Sans Medium"/>
+              </a:rPr>
+              <a:t> file and </a:t>
+            </a:r>
+            <a:r>
+              <a:rPr lang="en" sz="1050" b="1" u="sng">
+                <a:solidFill>
+                  <a:srgbClr val="B67AE5"/>
                 </a:solidFill>
                 <a:latin typeface="Plus Jakarta Sans"/>
                 <a:ea typeface="Plus Jakarta Sans"/>
                 <a:cs typeface="Plus Jakarta Sans"/>
                 <a:sym typeface="Plus Jakarta Sans"/>
+                <a:hlinkClick r:id="rId5">
+                  <a:extLst>
+                    <a:ext uri="{A12FA001-AC4F-418D-AE19-62706E023703}">
+                      <ahyp:hlinkClr xmlns:ahyp="http://schemas.microsoft.com/office/drawing/2018/hyperlinkcolor" val="tx"/>
+                    </a:ext>
+                  </a:extLst>
+                </a:hlinkClick>
               </a:rPr>
-              <a:t>conversion rates </a:t>
-            </a:r>
-            <a:r>
-              <a:rPr lang="en" sz="2400" dirty="0">
-                <a:solidFill>
-                  <a:schemeClr val="lt1"/>
-                </a:solidFill>
-                <a:latin typeface="Plus Jakarta Sans"/>
-                <a:ea typeface="Plus Jakarta Sans"/>
-                <a:cs typeface="Plus Jakarta Sans"/>
-                <a:sym typeface="Plus Jakarta Sans"/>
+              <a:t>here</a:t>
+            </a:r>
+            <a:r>
+              <a:rPr lang="en" sz="1050">
+                <a:solidFill>
+                  <a:schemeClr val="dk1"/>
+                </a:solidFill>
+                <a:latin typeface="Plus Jakarta Sans Medium"/>
+                <a:ea typeface="Plus Jakarta Sans Medium"/>
+                <a:cs typeface="Plus Jakarta Sans Medium"/>
+                <a:sym typeface="Plus Jakarta Sans Medium"/>
               </a:rPr>
-              <a:t>of </a:t>
-            </a:r>
-            <a:r>
-              <a:rPr lang="en" sz="2400" dirty="0">
-                <a:solidFill>
-                  <a:schemeClr val="accent6"/>
-                </a:solidFill>
-                <a:latin typeface="Plus Jakarta Sans ExtraBold"/>
-                <a:ea typeface="Plus Jakarta Sans ExtraBold"/>
-                <a:cs typeface="Plus Jakarta Sans ExtraBold"/>
-                <a:sym typeface="Plus Jakarta Sans ExtraBold"/>
-              </a:rPr>
-              <a:t>organic acquisitions </a:t>
-            </a:r>
-            <a:r>
-              <a:rPr lang="en" sz="2400" dirty="0">
-                <a:solidFill>
-                  <a:schemeClr val="lt1"/>
-                </a:solidFill>
-                <a:latin typeface="Plus Jakarta Sans"/>
-                <a:ea typeface="Plus Jakarta Sans"/>
-                <a:cs typeface="Plus Jakarta Sans"/>
-                <a:sym typeface="Plus Jakarta Sans"/>
-              </a:rPr>
-              <a:t>and </a:t>
-            </a:r>
-            <a:r>
-              <a:rPr lang="en" sz="2400" dirty="0">
-                <a:solidFill>
-                  <a:schemeClr val="accent6"/>
-                </a:solidFill>
-                <a:latin typeface="Plus Jakarta Sans ExtraBold"/>
-                <a:ea typeface="Plus Jakarta Sans ExtraBold"/>
-                <a:cs typeface="Plus Jakarta Sans ExtraBold"/>
-                <a:sym typeface="Plus Jakarta Sans ExtraBold"/>
-              </a:rPr>
-              <a:t>paid acquisitions</a:t>
-            </a:r>
-            <a:r>
-              <a:rPr lang="en" sz="2400" dirty="0">
-                <a:solidFill>
-                  <a:schemeClr val="accent6"/>
-                </a:solidFill>
-                <a:latin typeface="Plus Jakarta Sans"/>
-                <a:ea typeface="Plus Jakarta Sans"/>
-                <a:cs typeface="Plus Jakarta Sans"/>
-                <a:sym typeface="Plus Jakarta Sans"/>
-              </a:rPr>
-              <a:t> </a:t>
-            </a:r>
-            <a:r>
-              <a:rPr lang="en" sz="2400" dirty="0">
-                <a:solidFill>
-                  <a:schemeClr val="lt1"/>
-                </a:solidFill>
-                <a:latin typeface="Plus Jakarta Sans"/>
-                <a:ea typeface="Plus Jakarta Sans"/>
-                <a:cs typeface="Plus Jakarta Sans"/>
-                <a:sym typeface="Plus Jakarta Sans"/>
-              </a:rPr>
-              <a:t>to determine which group is more likely to become </a:t>
-            </a:r>
-            <a:r>
-              <a:rPr lang="en" sz="2400" i="1" dirty="0">
-                <a:solidFill>
-                  <a:schemeClr val="accent6"/>
-                </a:solidFill>
-                <a:latin typeface="Plus Jakarta Sans"/>
-                <a:ea typeface="Plus Jakarta Sans"/>
-                <a:cs typeface="Plus Jakarta Sans"/>
-                <a:sym typeface="Plus Jakarta Sans"/>
-              </a:rPr>
-              <a:t>paid</a:t>
-            </a:r>
-            <a:r>
-              <a:rPr lang="en" sz="2400" dirty="0">
-                <a:solidFill>
-                  <a:schemeClr val="lt1"/>
-                </a:solidFill>
-                <a:latin typeface="Plus Jakarta Sans"/>
-                <a:ea typeface="Plus Jakarta Sans"/>
-                <a:cs typeface="Plus Jakarta Sans"/>
-                <a:sym typeface="Plus Jakarta Sans"/>
-              </a:rPr>
-              <a:t> Headspace subscribers.</a:t>
-            </a:r>
-            <a:endParaRPr sz="2400" i="0" u="none" strike="noStrike" cap="none" dirty="0">
+              <a:t> of the dataset.</a:t>
+            </a:r>
+            <a:endParaRPr sz="1050">
               <a:solidFill>
-                <a:schemeClr val="lt1"/>
+                <a:schemeClr val="dk1"/>
               </a:solidFill>
-              <a:latin typeface="Plus Jakarta Sans"/>
-              <a:ea typeface="Plus Jakarta Sans"/>
-              <a:cs typeface="Plus Jakarta Sans"/>
-              <a:sym typeface="Plus Jakarta Sans"/>
+              <a:latin typeface="Plus Jakarta Sans Medium"/>
+              <a:ea typeface="Plus Jakarta Sans Medium"/>
+              <a:cs typeface="Plus Jakarta Sans Medium"/>
+              <a:sym typeface="Plus Jakarta Sans Medium"/>
             </a:endParaRPr>
           </a:p>
         </p:txBody>
       </p:sp>
-      <p:sp>
-        <p:nvSpPr>
-          <p:cNvPr id="102" name="Google Shape;102;p18">
-            <a:extLst>
-              <a:ext uri="{FF2B5EF4-FFF2-40B4-BE49-F238E27FC236}">
-                <a16:creationId xmlns:a16="http://schemas.microsoft.com/office/drawing/2014/main" id="{51512AC2-99B7-C5F1-625C-99C1046C70AD}"/>
-              </a:ext>
-            </a:extLst>
-          </p:cNvPr>
-          <p:cNvSpPr/>
+      <p:pic>
+        <p:nvPicPr>
+          <p:cNvPr id="56" name="Google Shape;56;p13"/>
+          <p:cNvPicPr preferRelativeResize="0"/>
           <p:nvPr/>
-        </p:nvSpPr>
+        </p:nvPicPr>
+        <p:blipFill>
+          <a:blip r:embed="rId6">
+            <a:alphaModFix/>
+          </a:blip>
+          <a:stretch>
+            <a:fillRect/>
+          </a:stretch>
+        </p:blipFill>
         <p:spPr>
           <a:xfrm>
-            <a:off x="2686756" y="969455"/>
-            <a:ext cx="3010733" cy="555300"/>
+            <a:off x="8094245" y="4120272"/>
+            <a:ext cx="864725" cy="857500"/>
           </a:xfrm>
-          <a:prstGeom prst="roundRect">
-            <a:avLst>
-              <a:gd name="adj" fmla="val 50000"/>
-            </a:avLst>
+          <a:prstGeom prst="rect">
+            <a:avLst/>
           </a:prstGeom>
-          <a:solidFill>
-            <a:srgbClr val="EA476D"/>
-          </a:solidFill>
+          <a:noFill/>
           <a:ln>
             <a:noFill/>
           </a:ln>
         </p:spPr>
-        <p:txBody>
-          <a:bodyPr spcFirstLastPara="1" wrap="square" lIns="45725" tIns="45725" rIns="45725" bIns="45725" anchor="ctr" anchorCtr="0">
-            <a:noAutofit/>
-          </a:bodyPr>
-          <a:lstStyle/>
-          <a:p>
-            <a:pPr marL="0" marR="0" lvl="0" indent="0" algn="ctr" rtl="0">
-              <a:lnSpc>
-                <a:spcPct val="100000"/>
-              </a:lnSpc>
-              <a:spcBef>
-                <a:spcPts val="0"/>
-              </a:spcBef>
-              <a:spcAft>
-                <a:spcPts val="0"/>
-              </a:spcAft>
-              <a:buClr>
-                <a:srgbClr val="000000"/>
-              </a:buClr>
-              <a:buSzPts val="1800"/>
-              <a:buFont typeface="Arial"/>
-              <a:buNone/>
-            </a:pPr>
-            <a:r>
-              <a:rPr lang="en" sz="2400" b="1" i="0" u="none" strike="noStrike" cap="none" dirty="0" err="1">
-                <a:solidFill>
-                  <a:srgbClr val="FFFFFF"/>
-                </a:solidFill>
-                <a:latin typeface="Poppins"/>
-                <a:ea typeface="Poppins"/>
-                <a:cs typeface="Poppins"/>
-                <a:sym typeface="Poppins"/>
-              </a:rPr>
-              <a:t>Ps</a:t>
-            </a:r>
-            <a:r>
-              <a:rPr lang="en" sz="2400" b="1" dirty="0" err="1">
-                <a:solidFill>
-                  <a:srgbClr val="FFFFFF"/>
-                </a:solidFill>
-                <a:latin typeface="Poppins"/>
-                <a:ea typeface="Poppins"/>
-                <a:cs typeface="Poppins"/>
-                <a:sym typeface="Poppins"/>
-              </a:rPr>
-              <a:t>eudoCode</a:t>
-            </a:r>
-            <a:r>
-              <a:rPr lang="en" sz="2400" b="1">
-                <a:solidFill>
-                  <a:srgbClr val="FFFFFF"/>
-                </a:solidFill>
-                <a:latin typeface="Poppins"/>
-                <a:ea typeface="Poppins"/>
-                <a:cs typeface="Poppins"/>
-                <a:sym typeface="Poppins"/>
-              </a:rPr>
-              <a:t> </a:t>
-            </a:r>
-            <a:endParaRPr sz="2400" b="1" i="0" u="none" strike="noStrike" cap="none" dirty="0">
-              <a:solidFill>
-                <a:srgbClr val="FFFFFF"/>
-              </a:solidFill>
-              <a:latin typeface="Poppins"/>
-              <a:ea typeface="Poppins"/>
-              <a:cs typeface="Poppins"/>
-              <a:sym typeface="Poppins"/>
-            </a:endParaRPr>
-          </a:p>
-        </p:txBody>
-      </p:sp>
-      <p:sp>
-        <p:nvSpPr>
-          <p:cNvPr id="103" name="Google Shape;103;p18">
-            <a:extLst>
-              <a:ext uri="{FF2B5EF4-FFF2-40B4-BE49-F238E27FC236}">
-                <a16:creationId xmlns:a16="http://schemas.microsoft.com/office/drawing/2014/main" id="{C8FE9A87-E313-AB1B-71D9-8BA8AAE60ED6}"/>
-              </a:ext>
-            </a:extLst>
-          </p:cNvPr>
-          <p:cNvSpPr/>
-          <p:nvPr/>
-        </p:nvSpPr>
-        <p:spPr>
-          <a:xfrm>
-            <a:off x="6343375" y="-2771428"/>
-            <a:ext cx="3933600" cy="3933600"/>
-          </a:xfrm>
-          <a:prstGeom prst="ellipse">
-            <a:avLst/>
-          </a:prstGeom>
-          <a:noFill/>
-          <a:ln w="38100" cap="flat" cmpd="sng">
-            <a:solidFill>
-              <a:srgbClr val="72CFED"/>
-            </a:solidFill>
-            <a:prstDash val="solid"/>
-            <a:round/>
-            <a:headEnd type="none" w="sm" len="sm"/>
-            <a:tailEnd type="none" w="sm" len="sm"/>
-          </a:ln>
-        </p:spPr>
-        <p:txBody>
-          <a:bodyPr spcFirstLastPara="1" wrap="square" lIns="91425" tIns="91425" rIns="91425" bIns="91425" anchor="ctr" anchorCtr="0">
-            <a:noAutofit/>
-          </a:bodyPr>
-          <a:lstStyle/>
-          <a:p>
-            <a:pPr marL="0" marR="0" lvl="0" indent="0" algn="l" rtl="0">
-              <a:lnSpc>
-                <a:spcPct val="100000"/>
-              </a:lnSpc>
-              <a:spcBef>
-                <a:spcPts val="0"/>
-              </a:spcBef>
-              <a:spcAft>
-                <a:spcPts val="0"/>
-              </a:spcAft>
-              <a:buClr>
-                <a:srgbClr val="000000"/>
-              </a:buClr>
-              <a:buSzPts val="1400"/>
-              <a:buFont typeface="Arial"/>
-              <a:buNone/>
-            </a:pPr>
-            <a:endParaRPr sz="1400" b="0" i="0" u="none" strike="noStrike" cap="none">
-              <a:solidFill>
-                <a:srgbClr val="000000"/>
-              </a:solidFill>
-              <a:latin typeface="Arial"/>
-              <a:ea typeface="Arial"/>
-              <a:cs typeface="Arial"/>
-              <a:sym typeface="Arial"/>
-            </a:endParaRPr>
-          </a:p>
-        </p:txBody>
-      </p:sp>
+      </p:pic>
     </p:spTree>
-    <p:extLst>
-      <p:ext uri="{BB962C8B-B14F-4D97-AF65-F5344CB8AC3E}">
-        <p14:creationId xmlns:p14="http://schemas.microsoft.com/office/powerpoint/2010/main" val="308343373"/>
-      </p:ext>
-    </p:extLst>
   </p:cSld>
   <p:clrMapOvr>
     <a:masterClrMapping/>

</xml_diff>